<commit_message>
working on example JavaScript bug fix
</commit_message>
<xml_diff>
--- a/testing-javascript/testing-javascript.pptx
+++ b/testing-javascript/testing-javascript.pptx
@@ -32,6 +32,14 @@
     <p:sldId id="281" r:id="rId26"/>
     <p:sldId id="283" r:id="rId27"/>
     <p:sldId id="282" r:id="rId28"/>
+    <p:sldId id="297" r:id="rId29"/>
+    <p:sldId id="298" r:id="rId30"/>
+    <p:sldId id="299" r:id="rId31"/>
+    <p:sldId id="300" r:id="rId32"/>
+    <p:sldId id="301" r:id="rId33"/>
+    <p:sldId id="302" r:id="rId34"/>
+    <p:sldId id="303" r:id="rId35"/>
+    <p:sldId id="296" r:id="rId36"/>
   </p:sldIdLst>
   <p:sldSz cx="9144000" cy="6858000" type="screen4x3"/>
   <p:notesSz cx="6858000" cy="9144000"/>
@@ -2801,7 +2809,7 @@
       </p:sp>
     </p:spTree>
   </p:cSld>
-  <p:clrMap bg1="lt1" tx1="dk1" bg2="lt2" tx2="dk2" accent1="accent1" accent2="accent2" accent3="accent3" accent4="accent4" accent5="accent5" accent6="accent6" hlink="hlink" folHlink="folHlink"/>
+  <p:clrMap bg1="dk1" tx1="lt1" bg2="dk2" tx2="lt2" accent1="accent1" accent2="accent2" accent3="accent3" accent4="accent4" accent5="accent5" accent6="accent6" hlink="hlink" folHlink="folHlink"/>
   <p:sldLayoutIdLst>
     <p:sldLayoutId id="2147483649" r:id="rId1"/>
     <p:sldLayoutId id="2147483650" r:id="rId2"/>
@@ -3178,11 +3186,7 @@
           <a:p>
             <a:r>
               <a:rPr lang="en-US" dirty="0" smtClean="0"/>
-              <a:t>and </a:t>
-            </a:r>
-            <a:r>
-              <a:rPr lang="en-US" dirty="0" smtClean="0"/>
-              <a:t>refactor our JavaScript code</a:t>
+              <a:t>and refactor our JavaScript code</a:t>
             </a:r>
             <a:endParaRPr lang="en-US" dirty="0"/>
           </a:p>
@@ -4634,6 +4638,14 @@
           <a:bodyPr/>
           <a:lstStyle/>
           <a:p>
+            <a:r>
+              <a:rPr lang="en-US" dirty="0" err="1" smtClean="0"/>
+              <a:t>SpecRunner</a:t>
+            </a:r>
+            <a:r>
+              <a:rPr lang="en-US" dirty="0" smtClean="0"/>
+              <a:t> stuff here</a:t>
+            </a:r>
             <a:endParaRPr lang="en-US" dirty="0"/>
           </a:p>
         </p:txBody>
@@ -4653,6 +4665,10 @@
           <a:bodyPr/>
           <a:lstStyle/>
           <a:p>
+            <a:r>
+              <a:rPr lang="en-US" dirty="0" smtClean="0"/>
+              <a:t>TODO</a:t>
+            </a:r>
             <a:endParaRPr lang="en-US" dirty="0"/>
           </a:p>
         </p:txBody>
@@ -4667,6 +4683,271 @@
   <p:clrMapOvr>
     <a:masterClrMapping/>
   </p:clrMapOvr>
+  <p:timing>
+    <p:tnLst>
+      <p:par>
+        <p:cTn id="1" dur="indefinite" restart="never" nodeType="tmRoot"/>
+      </p:par>
+    </p:tnLst>
+  </p:timing>
+</p:sld>
+</file>
+
+<file path=ppt/slides/slide28.xml><?xml version="1.0" encoding="utf-8"?>
+<p:sld xmlns:a="http://schemas.openxmlformats.org/drawingml/2006/main" xmlns:r="http://schemas.openxmlformats.org/officeDocument/2006/relationships" xmlns:p="http://schemas.openxmlformats.org/presentationml/2006/main">
+  <p:cSld>
+    <p:spTree>
+      <p:nvGrpSpPr>
+        <p:cNvPr id="1" name=""/>
+        <p:cNvGrpSpPr/>
+        <p:nvPr/>
+      </p:nvGrpSpPr>
+      <p:grpSpPr>
+        <a:xfrm>
+          <a:off x="0" y="0"/>
+          <a:ext cx="0" cy="0"/>
+          <a:chOff x="0" y="0"/>
+          <a:chExt cx="0" cy="0"/>
+        </a:xfrm>
+      </p:grpSpPr>
+      <p:sp>
+        <p:nvSpPr>
+          <p:cNvPr id="4" name="Title 1"/>
+          <p:cNvSpPr>
+            <a:spLocks noGrp="1"/>
+          </p:cNvSpPr>
+          <p:nvPr>
+            <p:ph type="ctrTitle"/>
+          </p:nvPr>
+        </p:nvSpPr>
+        <p:spPr>
+          <a:xfrm>
+            <a:off x="685006" y="304800"/>
+            <a:ext cx="7772400" cy="1470025"/>
+          </a:xfrm>
+        </p:spPr>
+        <p:txBody>
+          <a:bodyPr/>
+          <a:lstStyle/>
+          <a:p>
+            <a:r>
+              <a:rPr lang="en-US" dirty="0" smtClean="0"/>
+              <a:t>Buggy code</a:t>
+            </a:r>
+            <a:endParaRPr lang="en-US" dirty="0"/>
+          </a:p>
+        </p:txBody>
+      </p:sp>
+      <p:pic>
+        <p:nvPicPr>
+          <p:cNvPr id="2051" name="Picture 3"/>
+          <p:cNvPicPr>
+            <a:picLocks noChangeAspect="1" noChangeArrowheads="1"/>
+          </p:cNvPicPr>
+          <p:nvPr/>
+        </p:nvPicPr>
+        <p:blipFill>
+          <a:blip r:embed="rId2">
+            <a:extLst>
+              <a:ext uri="{28A0092B-C50C-407E-A947-70E740481C1C}">
+                <a14:useLocalDpi xmlns:a14="http://schemas.microsoft.com/office/drawing/2010/main" val="0"/>
+              </a:ext>
+            </a:extLst>
+          </a:blip>
+          <a:srcRect/>
+          <a:stretch>
+            <a:fillRect/>
+          </a:stretch>
+        </p:blipFill>
+        <p:spPr bwMode="auto">
+          <a:xfrm>
+            <a:off x="285750" y="2076450"/>
+            <a:ext cx="8570913" cy="2705100"/>
+          </a:xfrm>
+          <a:prstGeom prst="rect">
+            <a:avLst/>
+          </a:prstGeom>
+          <a:noFill/>
+          <a:ln>
+            <a:noFill/>
+          </a:ln>
+          <a:effectLst/>
+          <a:extLst>
+            <a:ext uri="{909E8E84-426E-40DD-AFC4-6F175D3DCCD1}">
+              <a14:hiddenFill xmlns:a14="http://schemas.microsoft.com/office/drawing/2010/main">
+                <a:solidFill>
+                  <a:schemeClr val="accent1"/>
+                </a:solidFill>
+              </a14:hiddenFill>
+            </a:ext>
+            <a:ext uri="{91240B29-F687-4F45-9708-019B960494DF}">
+              <a14:hiddenLine xmlns:a14="http://schemas.microsoft.com/office/drawing/2010/main" w="9525">
+                <a:solidFill>
+                  <a:schemeClr val="tx1"/>
+                </a:solidFill>
+                <a:miter lim="800000"/>
+                <a:headEnd/>
+                <a:tailEnd/>
+              </a14:hiddenLine>
+            </a:ext>
+            <a:ext uri="{AF507438-7753-43E0-B8FC-AC1667EBCBE1}">
+              <a14:hiddenEffects xmlns:a14="http://schemas.microsoft.com/office/drawing/2010/main">
+                <a:effectLst>
+                  <a:outerShdw dist="35921" dir="2700000" algn="ctr" rotWithShape="0">
+                    <a:schemeClr val="bg2"/>
+                  </a:outerShdw>
+                </a:effectLst>
+              </a14:hiddenEffects>
+            </a:ext>
+          </a:extLst>
+        </p:spPr>
+      </p:pic>
+    </p:spTree>
+    <p:extLst>
+      <p:ext uri="{BB962C8B-B14F-4D97-AF65-F5344CB8AC3E}">
+        <p14:creationId xmlns:p14="http://schemas.microsoft.com/office/powerpoint/2010/main" val="4176549004"/>
+      </p:ext>
+    </p:extLst>
+  </p:cSld>
+  <p:clrMapOvr>
+    <a:masterClrMapping/>
+  </p:clrMapOvr>
+  <p:timing>
+    <p:tnLst>
+      <p:par>
+        <p:cTn id="1" dur="indefinite" restart="never" nodeType="tmRoot"/>
+      </p:par>
+    </p:tnLst>
+  </p:timing>
+</p:sld>
+</file>
+
+<file path=ppt/slides/slide29.xml><?xml version="1.0" encoding="utf-8"?>
+<p:sld xmlns:a="http://schemas.openxmlformats.org/drawingml/2006/main" xmlns:r="http://schemas.openxmlformats.org/officeDocument/2006/relationships" xmlns:p="http://schemas.openxmlformats.org/presentationml/2006/main">
+  <p:cSld>
+    <p:spTree>
+      <p:nvGrpSpPr>
+        <p:cNvPr id="1" name=""/>
+        <p:cNvGrpSpPr/>
+        <p:nvPr/>
+      </p:nvGrpSpPr>
+      <p:grpSpPr>
+        <a:xfrm>
+          <a:off x="0" y="0"/>
+          <a:ext cx="0" cy="0"/>
+          <a:chOff x="0" y="0"/>
+          <a:chExt cx="0" cy="0"/>
+        </a:xfrm>
+      </p:grpSpPr>
+      <p:sp>
+        <p:nvSpPr>
+          <p:cNvPr id="4" name="Title 1"/>
+          <p:cNvSpPr>
+            <a:spLocks noGrp="1"/>
+          </p:cNvSpPr>
+          <p:nvPr>
+            <p:ph type="ctrTitle"/>
+          </p:nvPr>
+        </p:nvSpPr>
+        <p:spPr>
+          <a:xfrm>
+            <a:off x="685006" y="304800"/>
+            <a:ext cx="7772400" cy="1470025"/>
+          </a:xfrm>
+        </p:spPr>
+        <p:txBody>
+          <a:bodyPr/>
+          <a:lstStyle/>
+          <a:p>
+            <a:r>
+              <a:rPr lang="en-US" dirty="0" smtClean="0"/>
+              <a:t>Write a failing test</a:t>
+            </a:r>
+            <a:endParaRPr lang="en-US" dirty="0"/>
+          </a:p>
+        </p:txBody>
+      </p:sp>
+      <p:pic>
+        <p:nvPicPr>
+          <p:cNvPr id="3076" name="Picture 4"/>
+          <p:cNvPicPr>
+            <a:picLocks noChangeAspect="1" noChangeArrowheads="1"/>
+          </p:cNvPicPr>
+          <p:nvPr/>
+        </p:nvPicPr>
+        <p:blipFill>
+          <a:blip r:embed="rId2">
+            <a:extLst>
+              <a:ext uri="{28A0092B-C50C-407E-A947-70E740481C1C}">
+                <a14:useLocalDpi xmlns:a14="http://schemas.microsoft.com/office/drawing/2010/main" val="0"/>
+              </a:ext>
+            </a:extLst>
+          </a:blip>
+          <a:srcRect/>
+          <a:stretch>
+            <a:fillRect/>
+          </a:stretch>
+        </p:blipFill>
+        <p:spPr bwMode="auto">
+          <a:xfrm>
+            <a:off x="200025" y="2152650"/>
+            <a:ext cx="8743950" cy="2552700"/>
+          </a:xfrm>
+          <a:prstGeom prst="rect">
+            <a:avLst/>
+          </a:prstGeom>
+          <a:noFill/>
+          <a:ln>
+            <a:noFill/>
+          </a:ln>
+          <a:effectLst/>
+          <a:extLst>
+            <a:ext uri="{909E8E84-426E-40DD-AFC4-6F175D3DCCD1}">
+              <a14:hiddenFill xmlns:a14="http://schemas.microsoft.com/office/drawing/2010/main">
+                <a:solidFill>
+                  <a:schemeClr val="accent1"/>
+                </a:solidFill>
+              </a14:hiddenFill>
+            </a:ext>
+            <a:ext uri="{91240B29-F687-4F45-9708-019B960494DF}">
+              <a14:hiddenLine xmlns:a14="http://schemas.microsoft.com/office/drawing/2010/main" w="9525">
+                <a:solidFill>
+                  <a:schemeClr val="tx1"/>
+                </a:solidFill>
+                <a:miter lim="800000"/>
+                <a:headEnd/>
+                <a:tailEnd/>
+              </a14:hiddenLine>
+            </a:ext>
+            <a:ext uri="{AF507438-7753-43E0-B8FC-AC1667EBCBE1}">
+              <a14:hiddenEffects xmlns:a14="http://schemas.microsoft.com/office/drawing/2010/main">
+                <a:effectLst>
+                  <a:outerShdw dist="35921" dir="2700000" algn="ctr" rotWithShape="0">
+                    <a:schemeClr val="bg2"/>
+                  </a:outerShdw>
+                </a:effectLst>
+              </a14:hiddenEffects>
+            </a:ext>
+          </a:extLst>
+        </p:spPr>
+      </p:pic>
+    </p:spTree>
+    <p:extLst>
+      <p:ext uri="{BB962C8B-B14F-4D97-AF65-F5344CB8AC3E}">
+        <p14:creationId xmlns:p14="http://schemas.microsoft.com/office/powerpoint/2010/main" val="948130184"/>
+      </p:ext>
+    </p:extLst>
+  </p:cSld>
+  <p:clrMapOvr>
+    <a:masterClrMapping/>
+  </p:clrMapOvr>
+  <p:timing>
+    <p:tnLst>
+      <p:par>
+        <p:cTn id="1" dur="indefinite" restart="never" nodeType="tmRoot"/>
+      </p:par>
+    </p:tnLst>
+  </p:timing>
 </p:sld>
 </file>
 
@@ -4739,6 +5020,818 @@
   <p:clrMapOvr>
     <a:masterClrMapping/>
   </p:clrMapOvr>
+</p:sld>
+</file>
+
+<file path=ppt/slides/slide30.xml><?xml version="1.0" encoding="utf-8"?>
+<p:sld xmlns:a="http://schemas.openxmlformats.org/drawingml/2006/main" xmlns:r="http://schemas.openxmlformats.org/officeDocument/2006/relationships" xmlns:p="http://schemas.openxmlformats.org/presentationml/2006/main">
+  <p:cSld>
+    <p:spTree>
+      <p:nvGrpSpPr>
+        <p:cNvPr id="1" name=""/>
+        <p:cNvGrpSpPr/>
+        <p:nvPr/>
+      </p:nvGrpSpPr>
+      <p:grpSpPr>
+        <a:xfrm>
+          <a:off x="0" y="0"/>
+          <a:ext cx="0" cy="0"/>
+          <a:chOff x="0" y="0"/>
+          <a:chExt cx="0" cy="0"/>
+        </a:xfrm>
+      </p:grpSpPr>
+      <p:sp>
+        <p:nvSpPr>
+          <p:cNvPr id="4" name="Title 1"/>
+          <p:cNvSpPr>
+            <a:spLocks noGrp="1"/>
+          </p:cNvSpPr>
+          <p:nvPr>
+            <p:ph type="ctrTitle"/>
+          </p:nvPr>
+        </p:nvSpPr>
+        <p:spPr>
+          <a:xfrm>
+            <a:off x="685006" y="304800"/>
+            <a:ext cx="7772400" cy="1470025"/>
+          </a:xfrm>
+        </p:spPr>
+        <p:txBody>
+          <a:bodyPr/>
+          <a:lstStyle/>
+          <a:p>
+            <a:r>
+              <a:rPr lang="en-US" dirty="0" smtClean="0"/>
+              <a:t>Yay!</a:t>
+            </a:r>
+            <a:endParaRPr lang="en-US" dirty="0"/>
+          </a:p>
+        </p:txBody>
+      </p:sp>
+      <p:pic>
+        <p:nvPicPr>
+          <p:cNvPr id="4099" name="Picture 3"/>
+          <p:cNvPicPr>
+            <a:picLocks noChangeAspect="1" noChangeArrowheads="1"/>
+          </p:cNvPicPr>
+          <p:nvPr/>
+        </p:nvPicPr>
+        <p:blipFill>
+          <a:blip r:embed="rId2">
+            <a:extLst>
+              <a:ext uri="{28A0092B-C50C-407E-A947-70E740481C1C}">
+                <a14:useLocalDpi xmlns:a14="http://schemas.microsoft.com/office/drawing/2010/main" val="0"/>
+              </a:ext>
+            </a:extLst>
+          </a:blip>
+          <a:srcRect/>
+          <a:stretch>
+            <a:fillRect/>
+          </a:stretch>
+        </p:blipFill>
+        <p:spPr bwMode="auto">
+          <a:xfrm>
+            <a:off x="304800" y="2209800"/>
+            <a:ext cx="8543925" cy="3600450"/>
+          </a:xfrm>
+          <a:prstGeom prst="rect">
+            <a:avLst/>
+          </a:prstGeom>
+          <a:noFill/>
+          <a:ln>
+            <a:noFill/>
+          </a:ln>
+          <a:effectLst/>
+          <a:extLst>
+            <a:ext uri="{909E8E84-426E-40DD-AFC4-6F175D3DCCD1}">
+              <a14:hiddenFill xmlns:a14="http://schemas.microsoft.com/office/drawing/2010/main">
+                <a:solidFill>
+                  <a:schemeClr val="accent1"/>
+                </a:solidFill>
+              </a14:hiddenFill>
+            </a:ext>
+            <a:ext uri="{91240B29-F687-4F45-9708-019B960494DF}">
+              <a14:hiddenLine xmlns:a14="http://schemas.microsoft.com/office/drawing/2010/main" w="9525">
+                <a:solidFill>
+                  <a:schemeClr val="tx1"/>
+                </a:solidFill>
+                <a:miter lim="800000"/>
+                <a:headEnd/>
+                <a:tailEnd/>
+              </a14:hiddenLine>
+            </a:ext>
+            <a:ext uri="{AF507438-7753-43E0-B8FC-AC1667EBCBE1}">
+              <a14:hiddenEffects xmlns:a14="http://schemas.microsoft.com/office/drawing/2010/main">
+                <a:effectLst>
+                  <a:outerShdw dist="35921" dir="2700000" algn="ctr" rotWithShape="0">
+                    <a:schemeClr val="bg2"/>
+                  </a:outerShdw>
+                </a:effectLst>
+              </a14:hiddenEffects>
+            </a:ext>
+          </a:extLst>
+        </p:spPr>
+      </p:pic>
+    </p:spTree>
+    <p:extLst>
+      <p:ext uri="{BB962C8B-B14F-4D97-AF65-F5344CB8AC3E}">
+        <p14:creationId xmlns:p14="http://schemas.microsoft.com/office/powerpoint/2010/main" val="2641567179"/>
+      </p:ext>
+    </p:extLst>
+  </p:cSld>
+  <p:clrMapOvr>
+    <a:masterClrMapping/>
+  </p:clrMapOvr>
+  <p:timing>
+    <p:tnLst>
+      <p:par>
+        <p:cTn id="1" dur="indefinite" restart="never" nodeType="tmRoot"/>
+      </p:par>
+    </p:tnLst>
+  </p:timing>
+</p:sld>
+</file>
+
+<file path=ppt/slides/slide31.xml><?xml version="1.0" encoding="utf-8"?>
+<p:sld xmlns:a="http://schemas.openxmlformats.org/drawingml/2006/main" xmlns:r="http://schemas.openxmlformats.org/officeDocument/2006/relationships" xmlns:p="http://schemas.openxmlformats.org/presentationml/2006/main">
+  <p:cSld>
+    <p:spTree>
+      <p:nvGrpSpPr>
+        <p:cNvPr id="1" name=""/>
+        <p:cNvGrpSpPr/>
+        <p:nvPr/>
+      </p:nvGrpSpPr>
+      <p:grpSpPr>
+        <a:xfrm>
+          <a:off x="0" y="0"/>
+          <a:ext cx="0" cy="0"/>
+          <a:chOff x="0" y="0"/>
+          <a:chExt cx="0" cy="0"/>
+        </a:xfrm>
+      </p:grpSpPr>
+      <p:sp>
+        <p:nvSpPr>
+          <p:cNvPr id="4" name="Title 1"/>
+          <p:cNvSpPr>
+            <a:spLocks noGrp="1"/>
+          </p:cNvSpPr>
+          <p:nvPr>
+            <p:ph type="ctrTitle"/>
+          </p:nvPr>
+        </p:nvSpPr>
+        <p:spPr>
+          <a:xfrm>
+            <a:off x="685006" y="304800"/>
+            <a:ext cx="7772400" cy="1470025"/>
+          </a:xfrm>
+        </p:spPr>
+        <p:txBody>
+          <a:bodyPr/>
+          <a:lstStyle/>
+          <a:p>
+            <a:r>
+              <a:rPr lang="en-US" dirty="0" smtClean="0"/>
+              <a:t>Squash the bug</a:t>
+            </a:r>
+            <a:endParaRPr lang="en-US" dirty="0"/>
+          </a:p>
+        </p:txBody>
+      </p:sp>
+      <p:pic>
+        <p:nvPicPr>
+          <p:cNvPr id="5124" name="Picture 4"/>
+          <p:cNvPicPr>
+            <a:picLocks noChangeAspect="1" noChangeArrowheads="1"/>
+          </p:cNvPicPr>
+          <p:nvPr/>
+        </p:nvPicPr>
+        <p:blipFill>
+          <a:blip r:embed="rId2">
+            <a:extLst>
+              <a:ext uri="{28A0092B-C50C-407E-A947-70E740481C1C}">
+                <a14:useLocalDpi xmlns:a14="http://schemas.microsoft.com/office/drawing/2010/main" val="0"/>
+              </a:ext>
+            </a:extLst>
+          </a:blip>
+          <a:srcRect/>
+          <a:stretch>
+            <a:fillRect/>
+          </a:stretch>
+        </p:blipFill>
+        <p:spPr bwMode="auto">
+          <a:xfrm>
+            <a:off x="228600" y="1936750"/>
+            <a:ext cx="8685213" cy="2984500"/>
+          </a:xfrm>
+          <a:prstGeom prst="rect">
+            <a:avLst/>
+          </a:prstGeom>
+          <a:noFill/>
+          <a:ln>
+            <a:noFill/>
+          </a:ln>
+          <a:effectLst/>
+          <a:extLst>
+            <a:ext uri="{909E8E84-426E-40DD-AFC4-6F175D3DCCD1}">
+              <a14:hiddenFill xmlns:a14="http://schemas.microsoft.com/office/drawing/2010/main">
+                <a:solidFill>
+                  <a:schemeClr val="accent1"/>
+                </a:solidFill>
+              </a14:hiddenFill>
+            </a:ext>
+            <a:ext uri="{91240B29-F687-4F45-9708-019B960494DF}">
+              <a14:hiddenLine xmlns:a14="http://schemas.microsoft.com/office/drawing/2010/main" w="9525">
+                <a:solidFill>
+                  <a:schemeClr val="tx1"/>
+                </a:solidFill>
+                <a:miter lim="800000"/>
+                <a:headEnd/>
+                <a:tailEnd/>
+              </a14:hiddenLine>
+            </a:ext>
+            <a:ext uri="{AF507438-7753-43E0-B8FC-AC1667EBCBE1}">
+              <a14:hiddenEffects xmlns:a14="http://schemas.microsoft.com/office/drawing/2010/main">
+                <a:effectLst>
+                  <a:outerShdw dist="35921" dir="2700000" algn="ctr" rotWithShape="0">
+                    <a:schemeClr val="bg2"/>
+                  </a:outerShdw>
+                </a:effectLst>
+              </a14:hiddenEffects>
+            </a:ext>
+          </a:extLst>
+        </p:spPr>
+      </p:pic>
+    </p:spTree>
+    <p:extLst>
+      <p:ext uri="{BB962C8B-B14F-4D97-AF65-F5344CB8AC3E}">
+        <p14:creationId xmlns:p14="http://schemas.microsoft.com/office/powerpoint/2010/main" val="911457934"/>
+      </p:ext>
+    </p:extLst>
+  </p:cSld>
+  <p:clrMapOvr>
+    <a:masterClrMapping/>
+  </p:clrMapOvr>
+  <p:timing>
+    <p:tnLst>
+      <p:par>
+        <p:cTn id="1" dur="indefinite" restart="never" nodeType="tmRoot"/>
+      </p:par>
+    </p:tnLst>
+  </p:timing>
+</p:sld>
+</file>
+
+<file path=ppt/slides/slide32.xml><?xml version="1.0" encoding="utf-8"?>
+<p:sld xmlns:a="http://schemas.openxmlformats.org/drawingml/2006/main" xmlns:r="http://schemas.openxmlformats.org/officeDocument/2006/relationships" xmlns:p="http://schemas.openxmlformats.org/presentationml/2006/main">
+  <p:cSld>
+    <p:spTree>
+      <p:nvGrpSpPr>
+        <p:cNvPr id="1" name=""/>
+        <p:cNvGrpSpPr/>
+        <p:nvPr/>
+      </p:nvGrpSpPr>
+      <p:grpSpPr>
+        <a:xfrm>
+          <a:off x="0" y="0"/>
+          <a:ext cx="0" cy="0"/>
+          <a:chOff x="0" y="0"/>
+          <a:chExt cx="0" cy="0"/>
+        </a:xfrm>
+      </p:grpSpPr>
+      <p:sp>
+        <p:nvSpPr>
+          <p:cNvPr id="4" name="Title 1"/>
+          <p:cNvSpPr>
+            <a:spLocks noGrp="1"/>
+          </p:cNvSpPr>
+          <p:nvPr>
+            <p:ph type="ctrTitle"/>
+          </p:nvPr>
+        </p:nvSpPr>
+        <p:spPr>
+          <a:xfrm>
+            <a:off x="685006" y="304800"/>
+            <a:ext cx="7772400" cy="1470025"/>
+          </a:xfrm>
+        </p:spPr>
+        <p:txBody>
+          <a:bodyPr/>
+          <a:lstStyle/>
+          <a:p>
+            <a:r>
+              <a:rPr lang="en-US" dirty="0" smtClean="0"/>
+              <a:t>Success!</a:t>
+            </a:r>
+            <a:endParaRPr lang="en-US" dirty="0"/>
+          </a:p>
+        </p:txBody>
+      </p:sp>
+      <p:pic>
+        <p:nvPicPr>
+          <p:cNvPr id="6146" name="Picture 2"/>
+          <p:cNvPicPr>
+            <a:picLocks noChangeAspect="1" noChangeArrowheads="1"/>
+          </p:cNvPicPr>
+          <p:nvPr/>
+        </p:nvPicPr>
+        <p:blipFill>
+          <a:blip r:embed="rId2">
+            <a:extLst>
+              <a:ext uri="{28A0092B-C50C-407E-A947-70E740481C1C}">
+                <a14:useLocalDpi xmlns:a14="http://schemas.microsoft.com/office/drawing/2010/main" val="0"/>
+              </a:ext>
+            </a:extLst>
+          </a:blip>
+          <a:srcRect/>
+          <a:stretch>
+            <a:fillRect/>
+          </a:stretch>
+        </p:blipFill>
+        <p:spPr bwMode="auto">
+          <a:xfrm>
+            <a:off x="300038" y="1628775"/>
+            <a:ext cx="8543925" cy="3600450"/>
+          </a:xfrm>
+          <a:prstGeom prst="rect">
+            <a:avLst/>
+          </a:prstGeom>
+          <a:noFill/>
+          <a:ln>
+            <a:noFill/>
+          </a:ln>
+          <a:effectLst/>
+          <a:extLst>
+            <a:ext uri="{909E8E84-426E-40DD-AFC4-6F175D3DCCD1}">
+              <a14:hiddenFill xmlns:a14="http://schemas.microsoft.com/office/drawing/2010/main">
+                <a:solidFill>
+                  <a:schemeClr val="accent1"/>
+                </a:solidFill>
+              </a14:hiddenFill>
+            </a:ext>
+            <a:ext uri="{91240B29-F687-4F45-9708-019B960494DF}">
+              <a14:hiddenLine xmlns:a14="http://schemas.microsoft.com/office/drawing/2010/main" w="9525">
+                <a:solidFill>
+                  <a:schemeClr val="tx1"/>
+                </a:solidFill>
+                <a:miter lim="800000"/>
+                <a:headEnd/>
+                <a:tailEnd/>
+              </a14:hiddenLine>
+            </a:ext>
+            <a:ext uri="{AF507438-7753-43E0-B8FC-AC1667EBCBE1}">
+              <a14:hiddenEffects xmlns:a14="http://schemas.microsoft.com/office/drawing/2010/main">
+                <a:effectLst>
+                  <a:outerShdw dist="35921" dir="2700000" algn="ctr" rotWithShape="0">
+                    <a:schemeClr val="bg2"/>
+                  </a:outerShdw>
+                </a:effectLst>
+              </a14:hiddenEffects>
+            </a:ext>
+          </a:extLst>
+        </p:spPr>
+      </p:pic>
+    </p:spTree>
+    <p:extLst>
+      <p:ext uri="{BB962C8B-B14F-4D97-AF65-F5344CB8AC3E}">
+        <p14:creationId xmlns:p14="http://schemas.microsoft.com/office/powerpoint/2010/main" val="2201957250"/>
+      </p:ext>
+    </p:extLst>
+  </p:cSld>
+  <p:clrMapOvr>
+    <a:masterClrMapping/>
+  </p:clrMapOvr>
+  <p:timing>
+    <p:tnLst>
+      <p:par>
+        <p:cTn id="1" dur="indefinite" restart="never" nodeType="tmRoot"/>
+      </p:par>
+    </p:tnLst>
+  </p:timing>
+</p:sld>
+</file>
+
+<file path=ppt/slides/slide33.xml><?xml version="1.0" encoding="utf-8"?>
+<p:sld xmlns:a="http://schemas.openxmlformats.org/drawingml/2006/main" xmlns:r="http://schemas.openxmlformats.org/officeDocument/2006/relationships" xmlns:p="http://schemas.openxmlformats.org/presentationml/2006/main">
+  <p:cSld>
+    <p:spTree>
+      <p:nvGrpSpPr>
+        <p:cNvPr id="1" name=""/>
+        <p:cNvGrpSpPr/>
+        <p:nvPr/>
+      </p:nvGrpSpPr>
+      <p:grpSpPr>
+        <a:xfrm>
+          <a:off x="0" y="0"/>
+          <a:ext cx="0" cy="0"/>
+          <a:chOff x="0" y="0"/>
+          <a:chExt cx="0" cy="0"/>
+        </a:xfrm>
+      </p:grpSpPr>
+      <p:sp>
+        <p:nvSpPr>
+          <p:cNvPr id="4" name="Title 1"/>
+          <p:cNvSpPr>
+            <a:spLocks noGrp="1"/>
+          </p:cNvSpPr>
+          <p:nvPr>
+            <p:ph type="ctrTitle"/>
+          </p:nvPr>
+        </p:nvSpPr>
+        <p:spPr>
+          <a:xfrm>
+            <a:off x="685006" y="304800"/>
+            <a:ext cx="7772400" cy="1470025"/>
+          </a:xfrm>
+        </p:spPr>
+        <p:txBody>
+          <a:bodyPr/>
+          <a:lstStyle/>
+          <a:p>
+            <a:r>
+              <a:rPr lang="en-US" dirty="0" smtClean="0"/>
+              <a:t>Add more tests</a:t>
+            </a:r>
+            <a:endParaRPr lang="en-US" dirty="0"/>
+          </a:p>
+        </p:txBody>
+      </p:sp>
+      <p:pic>
+        <p:nvPicPr>
+          <p:cNvPr id="7171" name="Picture 3"/>
+          <p:cNvPicPr>
+            <a:picLocks noChangeAspect="1" noChangeArrowheads="1"/>
+          </p:cNvPicPr>
+          <p:nvPr/>
+        </p:nvPicPr>
+        <p:blipFill>
+          <a:blip r:embed="rId2">
+            <a:extLst>
+              <a:ext uri="{28A0092B-C50C-407E-A947-70E740481C1C}">
+                <a14:useLocalDpi xmlns:a14="http://schemas.microsoft.com/office/drawing/2010/main" val="0"/>
+              </a:ext>
+            </a:extLst>
+          </a:blip>
+          <a:srcRect/>
+          <a:stretch>
+            <a:fillRect/>
+          </a:stretch>
+        </p:blipFill>
+        <p:spPr bwMode="auto">
+          <a:xfrm>
+            <a:off x="376238" y="1600200"/>
+            <a:ext cx="8391525" cy="3657600"/>
+          </a:xfrm>
+          <a:prstGeom prst="rect">
+            <a:avLst/>
+          </a:prstGeom>
+          <a:noFill/>
+          <a:ln>
+            <a:noFill/>
+          </a:ln>
+          <a:effectLst/>
+          <a:extLst>
+            <a:ext uri="{909E8E84-426E-40DD-AFC4-6F175D3DCCD1}">
+              <a14:hiddenFill xmlns:a14="http://schemas.microsoft.com/office/drawing/2010/main">
+                <a:solidFill>
+                  <a:schemeClr val="accent1"/>
+                </a:solidFill>
+              </a14:hiddenFill>
+            </a:ext>
+            <a:ext uri="{91240B29-F687-4F45-9708-019B960494DF}">
+              <a14:hiddenLine xmlns:a14="http://schemas.microsoft.com/office/drawing/2010/main" w="9525">
+                <a:solidFill>
+                  <a:schemeClr val="tx1"/>
+                </a:solidFill>
+                <a:miter lim="800000"/>
+                <a:headEnd/>
+                <a:tailEnd/>
+              </a14:hiddenLine>
+            </a:ext>
+            <a:ext uri="{AF507438-7753-43E0-B8FC-AC1667EBCBE1}">
+              <a14:hiddenEffects xmlns:a14="http://schemas.microsoft.com/office/drawing/2010/main">
+                <a:effectLst>
+                  <a:outerShdw dist="35921" dir="2700000" algn="ctr" rotWithShape="0">
+                    <a:schemeClr val="bg2"/>
+                  </a:outerShdw>
+                </a:effectLst>
+              </a14:hiddenEffects>
+            </a:ext>
+          </a:extLst>
+        </p:spPr>
+      </p:pic>
+    </p:spTree>
+    <p:extLst>
+      <p:ext uri="{BB962C8B-B14F-4D97-AF65-F5344CB8AC3E}">
+        <p14:creationId xmlns:p14="http://schemas.microsoft.com/office/powerpoint/2010/main" val="1600708222"/>
+      </p:ext>
+    </p:extLst>
+  </p:cSld>
+  <p:clrMapOvr>
+    <a:masterClrMapping/>
+  </p:clrMapOvr>
+  <p:timing>
+    <p:tnLst>
+      <p:par>
+        <p:cTn id="1" dur="indefinite" restart="never" nodeType="tmRoot"/>
+      </p:par>
+    </p:tnLst>
+  </p:timing>
+</p:sld>
+</file>
+
+<file path=ppt/slides/slide34.xml><?xml version="1.0" encoding="utf-8"?>
+<p:sld xmlns:a="http://schemas.openxmlformats.org/drawingml/2006/main" xmlns:r="http://schemas.openxmlformats.org/officeDocument/2006/relationships" xmlns:p="http://schemas.openxmlformats.org/presentationml/2006/main">
+  <p:cSld>
+    <p:spTree>
+      <p:nvGrpSpPr>
+        <p:cNvPr id="1" name=""/>
+        <p:cNvGrpSpPr/>
+        <p:nvPr/>
+      </p:nvGrpSpPr>
+      <p:grpSpPr>
+        <a:xfrm>
+          <a:off x="0" y="0"/>
+          <a:ext cx="0" cy="0"/>
+          <a:chOff x="0" y="0"/>
+          <a:chExt cx="0" cy="0"/>
+        </a:xfrm>
+      </p:grpSpPr>
+      <p:sp>
+        <p:nvSpPr>
+          <p:cNvPr id="4" name="Title 1"/>
+          <p:cNvSpPr>
+            <a:spLocks noGrp="1"/>
+          </p:cNvSpPr>
+          <p:nvPr>
+            <p:ph type="ctrTitle"/>
+          </p:nvPr>
+        </p:nvSpPr>
+        <p:spPr>
+          <a:xfrm>
+            <a:off x="685006" y="304800"/>
+            <a:ext cx="7772400" cy="1470025"/>
+          </a:xfrm>
+        </p:spPr>
+        <p:txBody>
+          <a:bodyPr/>
+          <a:lstStyle/>
+          <a:p>
+            <a:r>
+              <a:rPr lang="en-US" dirty="0" smtClean="0"/>
+              <a:t>Win!</a:t>
+            </a:r>
+            <a:endParaRPr lang="en-US" dirty="0"/>
+          </a:p>
+        </p:txBody>
+      </p:sp>
+      <p:pic>
+        <p:nvPicPr>
+          <p:cNvPr id="8194" name="Picture 2"/>
+          <p:cNvPicPr>
+            <a:picLocks noChangeAspect="1" noChangeArrowheads="1"/>
+          </p:cNvPicPr>
+          <p:nvPr/>
+        </p:nvPicPr>
+        <p:blipFill>
+          <a:blip r:embed="rId2">
+            <a:extLst>
+              <a:ext uri="{28A0092B-C50C-407E-A947-70E740481C1C}">
+                <a14:useLocalDpi xmlns:a14="http://schemas.microsoft.com/office/drawing/2010/main" val="0"/>
+              </a:ext>
+            </a:extLst>
+          </a:blip>
+          <a:srcRect/>
+          <a:stretch>
+            <a:fillRect/>
+          </a:stretch>
+        </p:blipFill>
+        <p:spPr bwMode="auto">
+          <a:xfrm>
+            <a:off x="300038" y="1628775"/>
+            <a:ext cx="8543925" cy="3600450"/>
+          </a:xfrm>
+          <a:prstGeom prst="rect">
+            <a:avLst/>
+          </a:prstGeom>
+          <a:noFill/>
+          <a:ln>
+            <a:noFill/>
+          </a:ln>
+          <a:effectLst/>
+          <a:extLst>
+            <a:ext uri="{909E8E84-426E-40DD-AFC4-6F175D3DCCD1}">
+              <a14:hiddenFill xmlns:a14="http://schemas.microsoft.com/office/drawing/2010/main">
+                <a:solidFill>
+                  <a:schemeClr val="accent1"/>
+                </a:solidFill>
+              </a14:hiddenFill>
+            </a:ext>
+            <a:ext uri="{91240B29-F687-4F45-9708-019B960494DF}">
+              <a14:hiddenLine xmlns:a14="http://schemas.microsoft.com/office/drawing/2010/main" w="9525">
+                <a:solidFill>
+                  <a:schemeClr val="tx1"/>
+                </a:solidFill>
+                <a:miter lim="800000"/>
+                <a:headEnd/>
+                <a:tailEnd/>
+              </a14:hiddenLine>
+            </a:ext>
+            <a:ext uri="{AF507438-7753-43E0-B8FC-AC1667EBCBE1}">
+              <a14:hiddenEffects xmlns:a14="http://schemas.microsoft.com/office/drawing/2010/main">
+                <a:effectLst>
+                  <a:outerShdw dist="35921" dir="2700000" algn="ctr" rotWithShape="0">
+                    <a:schemeClr val="bg2"/>
+                  </a:outerShdw>
+                </a:effectLst>
+              </a14:hiddenEffects>
+            </a:ext>
+          </a:extLst>
+        </p:spPr>
+      </p:pic>
+      <p:pic>
+        <p:nvPicPr>
+          <p:cNvPr id="8196" name="Picture 4"/>
+          <p:cNvPicPr>
+            <a:picLocks noChangeAspect="1" noChangeArrowheads="1"/>
+          </p:cNvPicPr>
+          <p:nvPr/>
+        </p:nvPicPr>
+        <p:blipFill>
+          <a:blip r:embed="rId3">
+            <a:extLst>
+              <a:ext uri="{28A0092B-C50C-407E-A947-70E740481C1C}">
+                <a14:useLocalDpi xmlns:a14="http://schemas.microsoft.com/office/drawing/2010/main" val="0"/>
+              </a:ext>
+            </a:extLst>
+          </a:blip>
+          <a:srcRect/>
+          <a:stretch>
+            <a:fillRect/>
+          </a:stretch>
+        </p:blipFill>
+        <p:spPr bwMode="auto">
+          <a:xfrm>
+            <a:off x="321809" y="5359102"/>
+            <a:ext cx="1964191" cy="1327448"/>
+          </a:xfrm>
+          <a:prstGeom prst="rect">
+            <a:avLst/>
+          </a:prstGeom>
+          <a:noFill/>
+          <a:ln>
+            <a:noFill/>
+          </a:ln>
+          <a:effectLst/>
+          <a:extLst>
+            <a:ext uri="{909E8E84-426E-40DD-AFC4-6F175D3DCCD1}">
+              <a14:hiddenFill xmlns:a14="http://schemas.microsoft.com/office/drawing/2010/main">
+                <a:solidFill>
+                  <a:schemeClr val="accent1"/>
+                </a:solidFill>
+              </a14:hiddenFill>
+            </a:ext>
+            <a:ext uri="{91240B29-F687-4F45-9708-019B960494DF}">
+              <a14:hiddenLine xmlns:a14="http://schemas.microsoft.com/office/drawing/2010/main" w="9525">
+                <a:solidFill>
+                  <a:schemeClr val="tx1"/>
+                </a:solidFill>
+                <a:miter lim="800000"/>
+                <a:headEnd/>
+                <a:tailEnd/>
+              </a14:hiddenLine>
+            </a:ext>
+            <a:ext uri="{AF507438-7753-43E0-B8FC-AC1667EBCBE1}">
+              <a14:hiddenEffects xmlns:a14="http://schemas.microsoft.com/office/drawing/2010/main">
+                <a:effectLst>
+                  <a:outerShdw dist="35921" dir="2700000" algn="ctr" rotWithShape="0">
+                    <a:schemeClr val="bg2"/>
+                  </a:outerShdw>
+                </a:effectLst>
+              </a14:hiddenEffects>
+            </a:ext>
+          </a:extLst>
+        </p:spPr>
+      </p:pic>
+      <p:sp>
+        <p:nvSpPr>
+          <p:cNvPr id="7" name="Subtitle 2"/>
+          <p:cNvSpPr>
+            <a:spLocks noGrp="1"/>
+          </p:cNvSpPr>
+          <p:nvPr>
+            <p:ph type="subTitle" idx="1"/>
+          </p:nvPr>
+        </p:nvSpPr>
+        <p:spPr>
+          <a:xfrm>
+            <a:off x="2443163" y="5715000"/>
+            <a:ext cx="4795837" cy="619429"/>
+          </a:xfrm>
+        </p:spPr>
+        <p:txBody>
+          <a:bodyPr/>
+          <a:lstStyle/>
+          <a:p>
+            <a:r>
+              <a:rPr lang="en-US" dirty="0" smtClean="0"/>
+              <a:t>Testing = Documentation!</a:t>
+            </a:r>
+            <a:endParaRPr lang="en-US" dirty="0"/>
+          </a:p>
+        </p:txBody>
+      </p:sp>
+    </p:spTree>
+    <p:extLst>
+      <p:ext uri="{BB962C8B-B14F-4D97-AF65-F5344CB8AC3E}">
+        <p14:creationId xmlns:p14="http://schemas.microsoft.com/office/powerpoint/2010/main" val="438932138"/>
+      </p:ext>
+    </p:extLst>
+  </p:cSld>
+  <p:clrMapOvr>
+    <a:masterClrMapping/>
+  </p:clrMapOvr>
+  <p:timing>
+    <p:tnLst>
+      <p:par>
+        <p:cTn id="1" dur="indefinite" restart="never" nodeType="tmRoot"/>
+      </p:par>
+    </p:tnLst>
+  </p:timing>
+</p:sld>
+</file>
+
+<file path=ppt/slides/slide35.xml><?xml version="1.0" encoding="utf-8"?>
+<p:sld xmlns:a="http://schemas.openxmlformats.org/drawingml/2006/main" xmlns:r="http://schemas.openxmlformats.org/officeDocument/2006/relationships" xmlns:p="http://schemas.openxmlformats.org/presentationml/2006/main">
+  <p:cSld>
+    <p:spTree>
+      <p:nvGrpSpPr>
+        <p:cNvPr id="1" name=""/>
+        <p:cNvGrpSpPr/>
+        <p:nvPr/>
+      </p:nvGrpSpPr>
+      <p:grpSpPr>
+        <a:xfrm>
+          <a:off x="0" y="0"/>
+          <a:ext cx="0" cy="0"/>
+          <a:chOff x="0" y="0"/>
+          <a:chExt cx="0" cy="0"/>
+        </a:xfrm>
+      </p:grpSpPr>
+      <p:sp>
+        <p:nvSpPr>
+          <p:cNvPr id="2" name="Title 1"/>
+          <p:cNvSpPr>
+            <a:spLocks noGrp="1"/>
+          </p:cNvSpPr>
+          <p:nvPr>
+            <p:ph type="ctrTitle"/>
+          </p:nvPr>
+        </p:nvSpPr>
+        <p:spPr/>
+        <p:txBody>
+          <a:bodyPr/>
+          <a:lstStyle/>
+          <a:p>
+            <a:endParaRPr lang="en-US" dirty="0"/>
+          </a:p>
+        </p:txBody>
+      </p:sp>
+      <p:sp>
+        <p:nvSpPr>
+          <p:cNvPr id="3" name="Subtitle 2"/>
+          <p:cNvSpPr>
+            <a:spLocks noGrp="1"/>
+          </p:cNvSpPr>
+          <p:nvPr>
+            <p:ph type="subTitle" idx="1"/>
+          </p:nvPr>
+        </p:nvSpPr>
+        <p:spPr/>
+        <p:txBody>
+          <a:bodyPr/>
+          <a:lstStyle/>
+          <a:p>
+            <a:endParaRPr lang="en-US" dirty="0"/>
+          </a:p>
+        </p:txBody>
+      </p:sp>
+    </p:spTree>
+    <p:extLst>
+      <p:ext uri="{BB962C8B-B14F-4D97-AF65-F5344CB8AC3E}">
+        <p14:creationId xmlns:p14="http://schemas.microsoft.com/office/powerpoint/2010/main" val="1211231472"/>
+      </p:ext>
+    </p:extLst>
+  </p:cSld>
+  <p:clrMapOvr>
+    <a:masterClrMapping/>
+  </p:clrMapOvr>
+  <p:timing>
+    <p:tnLst>
+      <p:par>
+        <p:cTn id="1" dur="indefinite" restart="never" nodeType="tmRoot"/>
+      </p:par>
+    </p:tnLst>
+  </p:timing>
 </p:sld>
 </file>
 

</xml_diff>

<commit_message>
working on javascript testing presentation
</commit_message>
<xml_diff>
--- a/testing-javascript/testing-javascript.pptx
+++ b/testing-javascript/testing-javascript.pptx
@@ -7,16 +7,16 @@
   <p:sldIdLst>
     <p:sldId id="256" r:id="rId2"/>
     <p:sldId id="257" r:id="rId3"/>
-    <p:sldId id="258" r:id="rId4"/>
-    <p:sldId id="265" r:id="rId5"/>
-    <p:sldId id="266" r:id="rId6"/>
+    <p:sldId id="265" r:id="rId4"/>
+    <p:sldId id="266" r:id="rId5"/>
+    <p:sldId id="305" r:id="rId6"/>
     <p:sldId id="259" r:id="rId7"/>
     <p:sldId id="261" r:id="rId8"/>
     <p:sldId id="260" r:id="rId9"/>
     <p:sldId id="262" r:id="rId10"/>
     <p:sldId id="263" r:id="rId11"/>
     <p:sldId id="264" r:id="rId12"/>
-    <p:sldId id="267" r:id="rId13"/>
+    <p:sldId id="306" r:id="rId13"/>
     <p:sldId id="268" r:id="rId14"/>
     <p:sldId id="269" r:id="rId15"/>
     <p:sldId id="270" r:id="rId16"/>
@@ -25,21 +25,20 @@
     <p:sldId id="273" r:id="rId19"/>
     <p:sldId id="274" r:id="rId20"/>
     <p:sldId id="275" r:id="rId21"/>
-    <p:sldId id="277" r:id="rId22"/>
-    <p:sldId id="278" r:id="rId23"/>
-    <p:sldId id="279" r:id="rId24"/>
-    <p:sldId id="280" r:id="rId25"/>
-    <p:sldId id="281" r:id="rId26"/>
-    <p:sldId id="283" r:id="rId27"/>
-    <p:sldId id="282" r:id="rId28"/>
-    <p:sldId id="297" r:id="rId29"/>
-    <p:sldId id="298" r:id="rId30"/>
-    <p:sldId id="299" r:id="rId31"/>
-    <p:sldId id="300" r:id="rId32"/>
-    <p:sldId id="301" r:id="rId33"/>
-    <p:sldId id="302" r:id="rId34"/>
-    <p:sldId id="303" r:id="rId35"/>
-    <p:sldId id="296" r:id="rId36"/>
+    <p:sldId id="308" r:id="rId22"/>
+    <p:sldId id="307" r:id="rId23"/>
+    <p:sldId id="278" r:id="rId24"/>
+    <p:sldId id="279" r:id="rId25"/>
+    <p:sldId id="280" r:id="rId26"/>
+    <p:sldId id="297" r:id="rId27"/>
+    <p:sldId id="298" r:id="rId28"/>
+    <p:sldId id="309" r:id="rId29"/>
+    <p:sldId id="299" r:id="rId30"/>
+    <p:sldId id="300" r:id="rId31"/>
+    <p:sldId id="301" r:id="rId32"/>
+    <p:sldId id="302" r:id="rId33"/>
+    <p:sldId id="303" r:id="rId34"/>
+    <p:sldId id="296" r:id="rId35"/>
   </p:sldIdLst>
   <p:sldSz cx="9144000" cy="6858000" type="screen4x3"/>
   <p:notesSz cx="6858000" cy="9144000"/>
@@ -3139,966 +3138,9 @@
           </a:p>
         </p:txBody>
       </p:sp>
-    </p:spTree>
-    <p:extLst>
-      <p:ext uri="{BB962C8B-B14F-4D97-AF65-F5344CB8AC3E}">
-        <p14:creationId xmlns:p14="http://schemas.microsoft.com/office/powerpoint/2010/main" val="1958276867"/>
-      </p:ext>
-    </p:extLst>
-  </p:cSld>
-  <p:clrMapOvr>
-    <a:masterClrMapping/>
-  </p:clrMapOvr>
-</p:sld>
-</file>
-
-<file path=ppt/slides/slide10.xml><?xml version="1.0" encoding="utf-8"?>
-<p:sld xmlns:a="http://schemas.openxmlformats.org/drawingml/2006/main" xmlns:r="http://schemas.openxmlformats.org/officeDocument/2006/relationships" xmlns:p="http://schemas.openxmlformats.org/presentationml/2006/main">
-  <p:cSld>
-    <p:spTree>
-      <p:nvGrpSpPr>
-        <p:cNvPr id="1" name=""/>
-        <p:cNvGrpSpPr/>
-        <p:nvPr/>
-      </p:nvGrpSpPr>
-      <p:grpSpPr>
-        <a:xfrm>
-          <a:off x="0" y="0"/>
-          <a:ext cx="0" cy="0"/>
-          <a:chOff x="0" y="0"/>
-          <a:chExt cx="0" cy="0"/>
-        </a:xfrm>
-      </p:grpSpPr>
-      <p:sp>
-        <p:nvSpPr>
-          <p:cNvPr id="2" name="Title 1"/>
-          <p:cNvSpPr>
-            <a:spLocks noGrp="1"/>
-          </p:cNvSpPr>
-          <p:nvPr>
-            <p:ph type="ctrTitle"/>
-          </p:nvPr>
-        </p:nvSpPr>
-        <p:spPr/>
-        <p:txBody>
-          <a:bodyPr/>
-          <a:lstStyle/>
-          <a:p>
-            <a:r>
-              <a:rPr lang="en-US" dirty="0" smtClean="0"/>
-              <a:t>and refactor our JavaScript code</a:t>
-            </a:r>
-            <a:endParaRPr lang="en-US" dirty="0"/>
-          </a:p>
-        </p:txBody>
-      </p:sp>
-      <p:sp>
-        <p:nvSpPr>
-          <p:cNvPr id="3" name="Subtitle 2"/>
-          <p:cNvSpPr>
-            <a:spLocks noGrp="1"/>
-          </p:cNvSpPr>
-          <p:nvPr>
-            <p:ph type="subTitle" idx="1"/>
-          </p:nvPr>
-        </p:nvSpPr>
-        <p:spPr/>
-        <p:txBody>
-          <a:bodyPr/>
-          <a:lstStyle/>
-          <a:p>
-            <a:endParaRPr lang="en-US" dirty="0"/>
-          </a:p>
-        </p:txBody>
-      </p:sp>
-    </p:spTree>
-    <p:extLst>
-      <p:ext uri="{BB962C8B-B14F-4D97-AF65-F5344CB8AC3E}">
-        <p14:creationId xmlns:p14="http://schemas.microsoft.com/office/powerpoint/2010/main" val="2476654709"/>
-      </p:ext>
-    </p:extLst>
-  </p:cSld>
-  <p:clrMapOvr>
-    <a:masterClrMapping/>
-  </p:clrMapOvr>
-</p:sld>
-</file>
-
-<file path=ppt/slides/slide11.xml><?xml version="1.0" encoding="utf-8"?>
-<p:sld xmlns:a="http://schemas.openxmlformats.org/drawingml/2006/main" xmlns:r="http://schemas.openxmlformats.org/officeDocument/2006/relationships" xmlns:p="http://schemas.openxmlformats.org/presentationml/2006/main">
-  <p:cSld>
-    <p:spTree>
-      <p:nvGrpSpPr>
-        <p:cNvPr id="1" name=""/>
-        <p:cNvGrpSpPr/>
-        <p:nvPr/>
-      </p:nvGrpSpPr>
-      <p:grpSpPr>
-        <a:xfrm>
-          <a:off x="0" y="0"/>
-          <a:ext cx="0" cy="0"/>
-          <a:chOff x="0" y="0"/>
-          <a:chExt cx="0" cy="0"/>
-        </a:xfrm>
-      </p:grpSpPr>
-      <p:sp>
-        <p:nvSpPr>
-          <p:cNvPr id="2" name="Title 1"/>
-          <p:cNvSpPr>
-            <a:spLocks noGrp="1"/>
-          </p:cNvSpPr>
-          <p:nvPr>
-            <p:ph type="ctrTitle"/>
-          </p:nvPr>
-        </p:nvSpPr>
-        <p:spPr/>
-        <p:txBody>
-          <a:bodyPr/>
-          <a:lstStyle/>
-          <a:p>
-            <a:r>
-              <a:rPr lang="en-US" dirty="0" smtClean="0"/>
-              <a:t>Without fear of breaking something</a:t>
-            </a:r>
-            <a:endParaRPr lang="en-US" dirty="0"/>
-          </a:p>
-        </p:txBody>
-      </p:sp>
-      <p:sp>
-        <p:nvSpPr>
-          <p:cNvPr id="3" name="Subtitle 2"/>
-          <p:cNvSpPr>
-            <a:spLocks noGrp="1"/>
-          </p:cNvSpPr>
-          <p:nvPr>
-            <p:ph type="subTitle" idx="1"/>
-          </p:nvPr>
-        </p:nvSpPr>
-        <p:spPr/>
-        <p:txBody>
-          <a:bodyPr/>
-          <a:lstStyle/>
-          <a:p>
-            <a:endParaRPr lang="en-US" dirty="0"/>
-          </a:p>
-        </p:txBody>
-      </p:sp>
-    </p:spTree>
-    <p:extLst>
-      <p:ext uri="{BB962C8B-B14F-4D97-AF65-F5344CB8AC3E}">
-        <p14:creationId xmlns:p14="http://schemas.microsoft.com/office/powerpoint/2010/main" val="1696791544"/>
-      </p:ext>
-    </p:extLst>
-  </p:cSld>
-  <p:clrMapOvr>
-    <a:masterClrMapping/>
-  </p:clrMapOvr>
-</p:sld>
-</file>
-
-<file path=ppt/slides/slide12.xml><?xml version="1.0" encoding="utf-8"?>
-<p:sld xmlns:a="http://schemas.openxmlformats.org/drawingml/2006/main" xmlns:r="http://schemas.openxmlformats.org/officeDocument/2006/relationships" xmlns:p="http://schemas.openxmlformats.org/presentationml/2006/main">
-  <p:cSld>
-    <p:spTree>
-      <p:nvGrpSpPr>
-        <p:cNvPr id="1" name=""/>
-        <p:cNvGrpSpPr/>
-        <p:nvPr/>
-      </p:nvGrpSpPr>
-      <p:grpSpPr>
-        <a:xfrm>
-          <a:off x="0" y="0"/>
-          <a:ext cx="0" cy="0"/>
-          <a:chOff x="0" y="0"/>
-          <a:chExt cx="0" cy="0"/>
-        </a:xfrm>
-      </p:grpSpPr>
-      <p:sp>
-        <p:nvSpPr>
-          <p:cNvPr id="2" name="Title 1"/>
-          <p:cNvSpPr>
-            <a:spLocks noGrp="1"/>
-          </p:cNvSpPr>
-          <p:nvPr>
-            <p:ph type="ctrTitle"/>
-          </p:nvPr>
-        </p:nvSpPr>
-        <p:spPr/>
-        <p:txBody>
-          <a:bodyPr>
-            <a:normAutofit fontScale="90000"/>
-          </a:bodyPr>
-          <a:lstStyle/>
-          <a:p>
-            <a:r>
-              <a:rPr lang="en-US" dirty="0" smtClean="0"/>
-              <a:t>Testing is especially important when external factors can affect how our code functions</a:t>
-            </a:r>
-            <a:endParaRPr lang="en-US" dirty="0"/>
-          </a:p>
-        </p:txBody>
-      </p:sp>
-      <p:sp>
-        <p:nvSpPr>
-          <p:cNvPr id="3" name="Subtitle 2"/>
-          <p:cNvSpPr>
-            <a:spLocks noGrp="1"/>
-          </p:cNvSpPr>
-          <p:nvPr>
-            <p:ph type="subTitle" idx="1"/>
-          </p:nvPr>
-        </p:nvSpPr>
-        <p:spPr/>
-        <p:txBody>
-          <a:bodyPr/>
-          <a:lstStyle/>
-          <a:p>
-            <a:endParaRPr lang="en-US" dirty="0"/>
-          </a:p>
-        </p:txBody>
-      </p:sp>
-    </p:spTree>
-    <p:extLst>
-      <p:ext uri="{BB962C8B-B14F-4D97-AF65-F5344CB8AC3E}">
-        <p14:creationId xmlns:p14="http://schemas.microsoft.com/office/powerpoint/2010/main" val="1785471728"/>
-      </p:ext>
-    </p:extLst>
-  </p:cSld>
-  <p:clrMapOvr>
-    <a:masterClrMapping/>
-  </p:clrMapOvr>
-</p:sld>
-</file>
-
-<file path=ppt/slides/slide13.xml><?xml version="1.0" encoding="utf-8"?>
-<p:sld xmlns:a="http://schemas.openxmlformats.org/drawingml/2006/main" xmlns:r="http://schemas.openxmlformats.org/officeDocument/2006/relationships" xmlns:p="http://schemas.openxmlformats.org/presentationml/2006/main">
-  <p:cSld>
-    <p:spTree>
-      <p:nvGrpSpPr>
-        <p:cNvPr id="1" name=""/>
-        <p:cNvGrpSpPr/>
-        <p:nvPr/>
-      </p:nvGrpSpPr>
-      <p:grpSpPr>
-        <a:xfrm>
-          <a:off x="0" y="0"/>
-          <a:ext cx="0" cy="0"/>
-          <a:chOff x="0" y="0"/>
-          <a:chExt cx="0" cy="0"/>
-        </a:xfrm>
-      </p:grpSpPr>
-      <p:sp>
-        <p:nvSpPr>
-          <p:cNvPr id="2" name="Title 1"/>
-          <p:cNvSpPr>
-            <a:spLocks noGrp="1"/>
-          </p:cNvSpPr>
-          <p:nvPr>
-            <p:ph type="ctrTitle"/>
-          </p:nvPr>
-        </p:nvSpPr>
-        <p:spPr/>
-        <p:txBody>
-          <a:bodyPr/>
-          <a:lstStyle/>
-          <a:p>
-            <a:r>
-              <a:rPr lang="en-US" dirty="0" smtClean="0"/>
-              <a:t>What makes a good test?</a:t>
-            </a:r>
-            <a:endParaRPr lang="en-US" dirty="0"/>
-          </a:p>
-        </p:txBody>
-      </p:sp>
-      <p:sp>
-        <p:nvSpPr>
-          <p:cNvPr id="3" name="Subtitle 2"/>
-          <p:cNvSpPr>
-            <a:spLocks noGrp="1"/>
-          </p:cNvSpPr>
-          <p:nvPr>
-            <p:ph type="subTitle" idx="1"/>
-          </p:nvPr>
-        </p:nvSpPr>
-        <p:spPr/>
-        <p:txBody>
-          <a:bodyPr/>
-          <a:lstStyle/>
-          <a:p>
-            <a:endParaRPr lang="en-US" dirty="0"/>
-          </a:p>
-        </p:txBody>
-      </p:sp>
-    </p:spTree>
-    <p:extLst>
-      <p:ext uri="{BB962C8B-B14F-4D97-AF65-F5344CB8AC3E}">
-        <p14:creationId xmlns:p14="http://schemas.microsoft.com/office/powerpoint/2010/main" val="3896509134"/>
-      </p:ext>
-    </p:extLst>
-  </p:cSld>
-  <p:clrMapOvr>
-    <a:masterClrMapping/>
-  </p:clrMapOvr>
-</p:sld>
-</file>
-
-<file path=ppt/slides/slide14.xml><?xml version="1.0" encoding="utf-8"?>
-<p:sld xmlns:a="http://schemas.openxmlformats.org/drawingml/2006/main" xmlns:r="http://schemas.openxmlformats.org/officeDocument/2006/relationships" xmlns:p="http://schemas.openxmlformats.org/presentationml/2006/main">
-  <p:cSld>
-    <p:spTree>
-      <p:nvGrpSpPr>
-        <p:cNvPr id="1" name=""/>
-        <p:cNvGrpSpPr/>
-        <p:nvPr/>
-      </p:nvGrpSpPr>
-      <p:grpSpPr>
-        <a:xfrm>
-          <a:off x="0" y="0"/>
-          <a:ext cx="0" cy="0"/>
-          <a:chOff x="0" y="0"/>
-          <a:chExt cx="0" cy="0"/>
-        </a:xfrm>
-      </p:grpSpPr>
-      <p:sp>
-        <p:nvSpPr>
-          <p:cNvPr id="2" name="Title 1"/>
-          <p:cNvSpPr>
-            <a:spLocks noGrp="1"/>
-          </p:cNvSpPr>
-          <p:nvPr>
-            <p:ph type="ctrTitle"/>
-          </p:nvPr>
-        </p:nvSpPr>
-        <p:spPr/>
-        <p:txBody>
-          <a:bodyPr/>
-          <a:lstStyle/>
-          <a:p>
-            <a:r>
-              <a:rPr lang="en-US" dirty="0" smtClean="0"/>
-              <a:t>Think F.I.R.S.T</a:t>
-            </a:r>
-            <a:endParaRPr lang="en-US" dirty="0"/>
-          </a:p>
-        </p:txBody>
-      </p:sp>
-      <p:sp>
-        <p:nvSpPr>
-          <p:cNvPr id="3" name="Subtitle 2"/>
-          <p:cNvSpPr>
-            <a:spLocks noGrp="1"/>
-          </p:cNvSpPr>
-          <p:nvPr>
-            <p:ph type="subTitle" idx="1"/>
-          </p:nvPr>
-        </p:nvSpPr>
-        <p:spPr/>
-        <p:txBody>
-          <a:bodyPr/>
-          <a:lstStyle/>
-          <a:p>
-            <a:endParaRPr lang="en-US" dirty="0"/>
-          </a:p>
-        </p:txBody>
-      </p:sp>
-    </p:spTree>
-    <p:extLst>
-      <p:ext uri="{BB962C8B-B14F-4D97-AF65-F5344CB8AC3E}">
-        <p14:creationId xmlns:p14="http://schemas.microsoft.com/office/powerpoint/2010/main" val="3909524467"/>
-      </p:ext>
-    </p:extLst>
-  </p:cSld>
-  <p:clrMapOvr>
-    <a:masterClrMapping/>
-  </p:clrMapOvr>
-</p:sld>
-</file>
-
-<file path=ppt/slides/slide15.xml><?xml version="1.0" encoding="utf-8"?>
-<p:sld xmlns:a="http://schemas.openxmlformats.org/drawingml/2006/main" xmlns:r="http://schemas.openxmlformats.org/officeDocument/2006/relationships" xmlns:p="http://schemas.openxmlformats.org/presentationml/2006/main">
-  <p:cSld>
-    <p:spTree>
-      <p:nvGrpSpPr>
-        <p:cNvPr id="1" name=""/>
-        <p:cNvGrpSpPr/>
-        <p:nvPr/>
-      </p:nvGrpSpPr>
-      <p:grpSpPr>
-        <a:xfrm>
-          <a:off x="0" y="0"/>
-          <a:ext cx="0" cy="0"/>
-          <a:chOff x="0" y="0"/>
-          <a:chExt cx="0" cy="0"/>
-        </a:xfrm>
-      </p:grpSpPr>
-      <p:sp>
-        <p:nvSpPr>
-          <p:cNvPr id="2" name="Title 1"/>
-          <p:cNvSpPr>
-            <a:spLocks noGrp="1"/>
-          </p:cNvSpPr>
-          <p:nvPr>
-            <p:ph type="ctrTitle"/>
-          </p:nvPr>
-        </p:nvSpPr>
-        <p:spPr/>
-        <p:txBody>
-          <a:bodyPr/>
-          <a:lstStyle/>
-          <a:p>
-            <a:r>
-              <a:rPr lang="en-US" dirty="0" smtClean="0"/>
-              <a:t>Fast</a:t>
-            </a:r>
-            <a:endParaRPr lang="en-US" dirty="0"/>
-          </a:p>
-        </p:txBody>
-      </p:sp>
-      <p:sp>
-        <p:nvSpPr>
-          <p:cNvPr id="3" name="Subtitle 2"/>
-          <p:cNvSpPr>
-            <a:spLocks noGrp="1"/>
-          </p:cNvSpPr>
-          <p:nvPr>
-            <p:ph type="subTitle" idx="1"/>
-          </p:nvPr>
-        </p:nvSpPr>
-        <p:spPr/>
-        <p:txBody>
-          <a:bodyPr/>
-          <a:lstStyle/>
-          <a:p>
-            <a:endParaRPr lang="en-US" dirty="0"/>
-          </a:p>
-        </p:txBody>
-      </p:sp>
-    </p:spTree>
-    <p:extLst>
-      <p:ext uri="{BB962C8B-B14F-4D97-AF65-F5344CB8AC3E}">
-        <p14:creationId xmlns:p14="http://schemas.microsoft.com/office/powerpoint/2010/main" val="3498782803"/>
-      </p:ext>
-    </p:extLst>
-  </p:cSld>
-  <p:clrMapOvr>
-    <a:masterClrMapping/>
-  </p:clrMapOvr>
-</p:sld>
-</file>
-
-<file path=ppt/slides/slide16.xml><?xml version="1.0" encoding="utf-8"?>
-<p:sld xmlns:a="http://schemas.openxmlformats.org/drawingml/2006/main" xmlns:r="http://schemas.openxmlformats.org/officeDocument/2006/relationships" xmlns:p="http://schemas.openxmlformats.org/presentationml/2006/main">
-  <p:cSld>
-    <p:spTree>
-      <p:nvGrpSpPr>
-        <p:cNvPr id="1" name=""/>
-        <p:cNvGrpSpPr/>
-        <p:nvPr/>
-      </p:nvGrpSpPr>
-      <p:grpSpPr>
-        <a:xfrm>
-          <a:off x="0" y="0"/>
-          <a:ext cx="0" cy="0"/>
-          <a:chOff x="0" y="0"/>
-          <a:chExt cx="0" cy="0"/>
-        </a:xfrm>
-      </p:grpSpPr>
-      <p:sp>
-        <p:nvSpPr>
-          <p:cNvPr id="2" name="Title 1"/>
-          <p:cNvSpPr>
-            <a:spLocks noGrp="1"/>
-          </p:cNvSpPr>
-          <p:nvPr>
-            <p:ph type="ctrTitle"/>
-          </p:nvPr>
-        </p:nvSpPr>
-        <p:spPr/>
-        <p:txBody>
-          <a:bodyPr/>
-          <a:lstStyle/>
-          <a:p>
-            <a:r>
-              <a:rPr lang="en-US" dirty="0" smtClean="0"/>
-              <a:t>Independent</a:t>
-            </a:r>
-            <a:endParaRPr lang="en-US" dirty="0"/>
-          </a:p>
-        </p:txBody>
-      </p:sp>
-      <p:sp>
-        <p:nvSpPr>
-          <p:cNvPr id="3" name="Subtitle 2"/>
-          <p:cNvSpPr>
-            <a:spLocks noGrp="1"/>
-          </p:cNvSpPr>
-          <p:nvPr>
-            <p:ph type="subTitle" idx="1"/>
-          </p:nvPr>
-        </p:nvSpPr>
-        <p:spPr/>
-        <p:txBody>
-          <a:bodyPr/>
-          <a:lstStyle/>
-          <a:p>
-            <a:r>
-              <a:rPr lang="en-US" dirty="0" smtClean="0"/>
-              <a:t>Tests should not depend on each other.</a:t>
-            </a:r>
-            <a:endParaRPr lang="en-US" dirty="0"/>
-          </a:p>
-        </p:txBody>
-      </p:sp>
-    </p:spTree>
-    <p:extLst>
-      <p:ext uri="{BB962C8B-B14F-4D97-AF65-F5344CB8AC3E}">
-        <p14:creationId xmlns:p14="http://schemas.microsoft.com/office/powerpoint/2010/main" val="29289338"/>
-      </p:ext>
-    </p:extLst>
-  </p:cSld>
-  <p:clrMapOvr>
-    <a:masterClrMapping/>
-  </p:clrMapOvr>
-</p:sld>
-</file>
-
-<file path=ppt/slides/slide17.xml><?xml version="1.0" encoding="utf-8"?>
-<p:sld xmlns:a="http://schemas.openxmlformats.org/drawingml/2006/main" xmlns:r="http://schemas.openxmlformats.org/officeDocument/2006/relationships" xmlns:p="http://schemas.openxmlformats.org/presentationml/2006/main">
-  <p:cSld>
-    <p:spTree>
-      <p:nvGrpSpPr>
-        <p:cNvPr id="1" name=""/>
-        <p:cNvGrpSpPr/>
-        <p:nvPr/>
-      </p:nvGrpSpPr>
-      <p:grpSpPr>
-        <a:xfrm>
-          <a:off x="0" y="0"/>
-          <a:ext cx="0" cy="0"/>
-          <a:chOff x="0" y="0"/>
-          <a:chExt cx="0" cy="0"/>
-        </a:xfrm>
-      </p:grpSpPr>
-      <p:sp>
-        <p:nvSpPr>
-          <p:cNvPr id="2" name="Title 1"/>
-          <p:cNvSpPr>
-            <a:spLocks noGrp="1"/>
-          </p:cNvSpPr>
-          <p:nvPr>
-            <p:ph type="ctrTitle"/>
-          </p:nvPr>
-        </p:nvSpPr>
-        <p:spPr/>
-        <p:txBody>
-          <a:bodyPr/>
-          <a:lstStyle/>
-          <a:p>
-            <a:r>
-              <a:rPr lang="en-US" dirty="0" smtClean="0"/>
-              <a:t>Repeatable</a:t>
-            </a:r>
-            <a:endParaRPr lang="en-US" dirty="0"/>
-          </a:p>
-        </p:txBody>
-      </p:sp>
-      <p:sp>
-        <p:nvSpPr>
-          <p:cNvPr id="3" name="Subtitle 2"/>
-          <p:cNvSpPr>
-            <a:spLocks noGrp="1"/>
-          </p:cNvSpPr>
-          <p:nvPr>
-            <p:ph type="subTitle" idx="1"/>
-          </p:nvPr>
-        </p:nvSpPr>
-        <p:spPr/>
-        <p:txBody>
-          <a:bodyPr/>
-          <a:lstStyle/>
-          <a:p>
-            <a:r>
-              <a:rPr lang="en-US" dirty="0" smtClean="0"/>
-              <a:t>Always the same results, regardless of environment.</a:t>
-            </a:r>
-            <a:endParaRPr lang="en-US" dirty="0"/>
-          </a:p>
-        </p:txBody>
-      </p:sp>
-    </p:spTree>
-    <p:extLst>
-      <p:ext uri="{BB962C8B-B14F-4D97-AF65-F5344CB8AC3E}">
-        <p14:creationId xmlns:p14="http://schemas.microsoft.com/office/powerpoint/2010/main" val="29289338"/>
-      </p:ext>
-    </p:extLst>
-  </p:cSld>
-  <p:clrMapOvr>
-    <a:masterClrMapping/>
-  </p:clrMapOvr>
-</p:sld>
-</file>
-
-<file path=ppt/slides/slide18.xml><?xml version="1.0" encoding="utf-8"?>
-<p:sld xmlns:a="http://schemas.openxmlformats.org/drawingml/2006/main" xmlns:r="http://schemas.openxmlformats.org/officeDocument/2006/relationships" xmlns:p="http://schemas.openxmlformats.org/presentationml/2006/main">
-  <p:cSld>
-    <p:spTree>
-      <p:nvGrpSpPr>
-        <p:cNvPr id="1" name=""/>
-        <p:cNvGrpSpPr/>
-        <p:nvPr/>
-      </p:nvGrpSpPr>
-      <p:grpSpPr>
-        <a:xfrm>
-          <a:off x="0" y="0"/>
-          <a:ext cx="0" cy="0"/>
-          <a:chOff x="0" y="0"/>
-          <a:chExt cx="0" cy="0"/>
-        </a:xfrm>
-      </p:grpSpPr>
-      <p:sp>
-        <p:nvSpPr>
-          <p:cNvPr id="2" name="Title 1"/>
-          <p:cNvSpPr>
-            <a:spLocks noGrp="1"/>
-          </p:cNvSpPr>
-          <p:nvPr>
-            <p:ph type="ctrTitle"/>
-          </p:nvPr>
-        </p:nvSpPr>
-        <p:spPr/>
-        <p:txBody>
-          <a:bodyPr/>
-          <a:lstStyle/>
-          <a:p>
-            <a:r>
-              <a:rPr lang="en-US" dirty="0" smtClean="0"/>
-              <a:t>Self-Validating</a:t>
-            </a:r>
-            <a:endParaRPr lang="en-US" dirty="0"/>
-          </a:p>
-        </p:txBody>
-      </p:sp>
-      <p:sp>
-        <p:nvSpPr>
-          <p:cNvPr id="3" name="Subtitle 2"/>
-          <p:cNvSpPr>
-            <a:spLocks noGrp="1"/>
-          </p:cNvSpPr>
-          <p:nvPr>
-            <p:ph type="subTitle" idx="1"/>
-          </p:nvPr>
-        </p:nvSpPr>
-        <p:spPr/>
-        <p:txBody>
-          <a:bodyPr/>
-          <a:lstStyle/>
-          <a:p>
-            <a:r>
-              <a:rPr lang="en-US" dirty="0" smtClean="0"/>
-              <a:t>Pass or Fail</a:t>
-            </a:r>
-          </a:p>
-          <a:p>
-            <a:r>
-              <a:rPr lang="en-US" dirty="0" smtClean="0"/>
-              <a:t>No manual </a:t>
-            </a:r>
-            <a:r>
-              <a:rPr lang="en-US" dirty="0" err="1" smtClean="0"/>
-              <a:t>evalutation</a:t>
-            </a:r>
-            <a:r>
-              <a:rPr lang="en-US" dirty="0" smtClean="0"/>
-              <a:t>.</a:t>
-            </a:r>
-            <a:endParaRPr lang="en-US" dirty="0"/>
-          </a:p>
-        </p:txBody>
-      </p:sp>
-    </p:spTree>
-    <p:extLst>
-      <p:ext uri="{BB962C8B-B14F-4D97-AF65-F5344CB8AC3E}">
-        <p14:creationId xmlns:p14="http://schemas.microsoft.com/office/powerpoint/2010/main" val="29289338"/>
-      </p:ext>
-    </p:extLst>
-  </p:cSld>
-  <p:clrMapOvr>
-    <a:masterClrMapping/>
-  </p:clrMapOvr>
-</p:sld>
-</file>
-
-<file path=ppt/slides/slide19.xml><?xml version="1.0" encoding="utf-8"?>
-<p:sld xmlns:a="http://schemas.openxmlformats.org/drawingml/2006/main" xmlns:r="http://schemas.openxmlformats.org/officeDocument/2006/relationships" xmlns:p="http://schemas.openxmlformats.org/presentationml/2006/main">
-  <p:cSld>
-    <p:spTree>
-      <p:nvGrpSpPr>
-        <p:cNvPr id="1" name=""/>
-        <p:cNvGrpSpPr/>
-        <p:nvPr/>
-      </p:nvGrpSpPr>
-      <p:grpSpPr>
-        <a:xfrm>
-          <a:off x="0" y="0"/>
-          <a:ext cx="0" cy="0"/>
-          <a:chOff x="0" y="0"/>
-          <a:chExt cx="0" cy="0"/>
-        </a:xfrm>
-      </p:grpSpPr>
-      <p:sp>
-        <p:nvSpPr>
-          <p:cNvPr id="2" name="Title 1"/>
-          <p:cNvSpPr>
-            <a:spLocks noGrp="1"/>
-          </p:cNvSpPr>
-          <p:nvPr>
-            <p:ph type="ctrTitle"/>
-          </p:nvPr>
-        </p:nvSpPr>
-        <p:spPr/>
-        <p:txBody>
-          <a:bodyPr/>
-          <a:lstStyle/>
-          <a:p>
-            <a:r>
-              <a:rPr lang="en-US" dirty="0" smtClean="0"/>
-              <a:t>Timely</a:t>
-            </a:r>
-            <a:endParaRPr lang="en-US" dirty="0"/>
-          </a:p>
-        </p:txBody>
-      </p:sp>
-      <p:sp>
-        <p:nvSpPr>
-          <p:cNvPr id="3" name="Subtitle 2"/>
-          <p:cNvSpPr>
-            <a:spLocks noGrp="1"/>
-          </p:cNvSpPr>
-          <p:nvPr>
-            <p:ph type="subTitle" idx="1"/>
-          </p:nvPr>
-        </p:nvSpPr>
-        <p:spPr/>
-        <p:txBody>
-          <a:bodyPr/>
-          <a:lstStyle/>
-          <a:p>
-            <a:r>
-              <a:rPr lang="en-US" dirty="0" smtClean="0"/>
-              <a:t>Write tests </a:t>
-            </a:r>
-            <a:r>
-              <a:rPr lang="en-US" i="1" dirty="0" smtClean="0"/>
-              <a:t>before</a:t>
-            </a:r>
-            <a:r>
-              <a:rPr lang="en-US" dirty="0" smtClean="0"/>
-              <a:t> production code.</a:t>
-            </a:r>
-            <a:endParaRPr lang="en-US" dirty="0"/>
-          </a:p>
-        </p:txBody>
-      </p:sp>
-    </p:spTree>
-    <p:extLst>
-      <p:ext uri="{BB962C8B-B14F-4D97-AF65-F5344CB8AC3E}">
-        <p14:creationId xmlns:p14="http://schemas.microsoft.com/office/powerpoint/2010/main" val="29289338"/>
-      </p:ext>
-    </p:extLst>
-  </p:cSld>
-  <p:clrMapOvr>
-    <a:masterClrMapping/>
-  </p:clrMapOvr>
-</p:sld>
-</file>
-
-<file path=ppt/slides/slide2.xml><?xml version="1.0" encoding="utf-8"?>
-<p:sld xmlns:a="http://schemas.openxmlformats.org/drawingml/2006/main" xmlns:r="http://schemas.openxmlformats.org/officeDocument/2006/relationships" xmlns:p="http://schemas.openxmlformats.org/presentationml/2006/main">
-  <p:cSld>
-    <p:spTree>
-      <p:nvGrpSpPr>
-        <p:cNvPr id="1" name=""/>
-        <p:cNvGrpSpPr/>
-        <p:nvPr/>
-      </p:nvGrpSpPr>
-      <p:grpSpPr>
-        <a:xfrm>
-          <a:off x="0" y="0"/>
-          <a:ext cx="0" cy="0"/>
-          <a:chOff x="0" y="0"/>
-          <a:chExt cx="0" cy="0"/>
-        </a:xfrm>
-      </p:grpSpPr>
-      <p:sp>
-        <p:nvSpPr>
-          <p:cNvPr id="2" name="Title 1"/>
-          <p:cNvSpPr>
-            <a:spLocks noGrp="1"/>
-          </p:cNvSpPr>
-          <p:nvPr>
-            <p:ph type="ctrTitle"/>
-          </p:nvPr>
-        </p:nvSpPr>
-        <p:spPr/>
-        <p:txBody>
-          <a:bodyPr/>
-          <a:lstStyle/>
-          <a:p>
-            <a:r>
-              <a:rPr lang="en-US" dirty="0" smtClean="0"/>
-              <a:t>Why should we test JavaScript?</a:t>
-            </a:r>
-            <a:endParaRPr lang="en-US" dirty="0"/>
-          </a:p>
-        </p:txBody>
-      </p:sp>
-      <p:sp>
-        <p:nvSpPr>
-          <p:cNvPr id="3" name="Subtitle 2"/>
-          <p:cNvSpPr>
-            <a:spLocks noGrp="1"/>
-          </p:cNvSpPr>
-          <p:nvPr>
-            <p:ph type="subTitle" idx="1"/>
-          </p:nvPr>
-        </p:nvSpPr>
-        <p:spPr/>
-        <p:txBody>
-          <a:bodyPr/>
-          <a:lstStyle/>
-          <a:p>
-            <a:endParaRPr lang="en-US" dirty="0"/>
-          </a:p>
-        </p:txBody>
-      </p:sp>
-    </p:spTree>
-    <p:extLst>
-      <p:ext uri="{BB962C8B-B14F-4D97-AF65-F5344CB8AC3E}">
-        <p14:creationId xmlns:p14="http://schemas.microsoft.com/office/powerpoint/2010/main" val="4246943571"/>
-      </p:ext>
-    </p:extLst>
-  </p:cSld>
-  <p:clrMapOvr>
-    <a:masterClrMapping/>
-  </p:clrMapOvr>
-</p:sld>
-</file>
-
-<file path=ppt/slides/slide20.xml><?xml version="1.0" encoding="utf-8"?>
-<p:sld xmlns:a="http://schemas.openxmlformats.org/drawingml/2006/main" xmlns:r="http://schemas.openxmlformats.org/officeDocument/2006/relationships" xmlns:p="http://schemas.openxmlformats.org/presentationml/2006/main">
-  <p:cSld>
-    <p:spTree>
-      <p:nvGrpSpPr>
-        <p:cNvPr id="1" name=""/>
-        <p:cNvGrpSpPr/>
-        <p:nvPr/>
-      </p:nvGrpSpPr>
-      <p:grpSpPr>
-        <a:xfrm>
-          <a:off x="0" y="0"/>
-          <a:ext cx="0" cy="0"/>
-          <a:chOff x="0" y="0"/>
-          <a:chExt cx="0" cy="0"/>
-        </a:xfrm>
-      </p:grpSpPr>
-      <p:sp>
-        <p:nvSpPr>
-          <p:cNvPr id="2" name="Title 1"/>
-          <p:cNvSpPr>
-            <a:spLocks noGrp="1"/>
-          </p:cNvSpPr>
-          <p:nvPr>
-            <p:ph type="ctrTitle"/>
-          </p:nvPr>
-        </p:nvSpPr>
-        <p:spPr/>
-        <p:txBody>
-          <a:bodyPr/>
-          <a:lstStyle/>
-          <a:p>
-            <a:r>
-              <a:rPr lang="en-US" dirty="0" smtClean="0"/>
-              <a:t>Let’s look at an example.</a:t>
-            </a:r>
-            <a:endParaRPr lang="en-US" dirty="0"/>
-          </a:p>
-        </p:txBody>
-      </p:sp>
-      <p:sp>
-        <p:nvSpPr>
-          <p:cNvPr id="3" name="Subtitle 2"/>
-          <p:cNvSpPr>
-            <a:spLocks noGrp="1"/>
-          </p:cNvSpPr>
-          <p:nvPr>
-            <p:ph type="subTitle" idx="1"/>
-          </p:nvPr>
-        </p:nvSpPr>
-        <p:spPr/>
-        <p:txBody>
-          <a:bodyPr/>
-          <a:lstStyle/>
-          <a:p>
-            <a:endParaRPr lang="en-US" dirty="0"/>
-          </a:p>
-        </p:txBody>
-      </p:sp>
-    </p:spTree>
-    <p:extLst>
-      <p:ext uri="{BB962C8B-B14F-4D97-AF65-F5344CB8AC3E}">
-        <p14:creationId xmlns:p14="http://schemas.microsoft.com/office/powerpoint/2010/main" val="2521644806"/>
-      </p:ext>
-    </p:extLst>
-  </p:cSld>
-  <p:clrMapOvr>
-    <a:masterClrMapping/>
-  </p:clrMapOvr>
-</p:sld>
-</file>
-
-<file path=ppt/slides/slide21.xml><?xml version="1.0" encoding="utf-8"?>
-<p:sld xmlns:a="http://schemas.openxmlformats.org/drawingml/2006/main" xmlns:r="http://schemas.openxmlformats.org/officeDocument/2006/relationships" xmlns:p="http://schemas.openxmlformats.org/presentationml/2006/main">
-  <p:cSld>
-    <p:spTree>
-      <p:nvGrpSpPr>
-        <p:cNvPr id="1" name=""/>
-        <p:cNvGrpSpPr/>
-        <p:nvPr/>
-      </p:nvGrpSpPr>
-      <p:grpSpPr>
-        <a:xfrm>
-          <a:off x="0" y="0"/>
-          <a:ext cx="0" cy="0"/>
-          <a:chOff x="0" y="0"/>
-          <a:chExt cx="0" cy="0"/>
-        </a:xfrm>
-      </p:grpSpPr>
-      <p:sp>
-        <p:nvSpPr>
-          <p:cNvPr id="2" name="Title 1"/>
-          <p:cNvSpPr>
-            <a:spLocks noGrp="1"/>
-          </p:cNvSpPr>
-          <p:nvPr>
-            <p:ph type="ctrTitle"/>
-          </p:nvPr>
-        </p:nvSpPr>
-        <p:spPr/>
-        <p:txBody>
-          <a:bodyPr/>
-          <a:lstStyle/>
-          <a:p>
-            <a:r>
-              <a:rPr lang="en-US" dirty="0" smtClean="0"/>
-              <a:t>A function to test</a:t>
-            </a:r>
-            <a:endParaRPr lang="en-US" dirty="0"/>
-          </a:p>
-        </p:txBody>
-      </p:sp>
       <p:pic>
         <p:nvPicPr>
-          <p:cNvPr id="1028" name="Picture 4" descr="http://imgs.xkcd.com/comics/random_number.png"/>
+          <p:cNvPr id="1026" name="Picture 2"/>
           <p:cNvPicPr>
             <a:picLocks noChangeAspect="1" noChangeArrowheads="1"/>
           </p:cNvPicPr>
@@ -4119,49 +3161,8 @@
         </p:blipFill>
         <p:spPr bwMode="auto">
           <a:xfrm>
-            <a:off x="2667000" y="3733800"/>
-            <a:ext cx="3810000" cy="1371601"/>
-          </a:xfrm>
-          <a:prstGeom prst="rect">
-            <a:avLst/>
-          </a:prstGeom>
-          <a:noFill/>
-          <a:extLst>
-            <a:ext uri="{909E8E84-426E-40DD-AFC4-6F175D3DCCD1}">
-              <a14:hiddenFill xmlns:a14="http://schemas.microsoft.com/office/drawing/2010/main">
-                <a:solidFill>
-                  <a:srgbClr val="FFFFFF"/>
-                </a:solidFill>
-              </a14:hiddenFill>
-            </a:ext>
-          </a:extLst>
-        </p:spPr>
-      </p:pic>
-      <p:pic>
-        <p:nvPicPr>
-          <p:cNvPr id="1029" name="Picture 5"/>
-          <p:cNvPicPr>
-            <a:picLocks noChangeAspect="1" noChangeArrowheads="1"/>
-          </p:cNvPicPr>
-          <p:nvPr/>
-        </p:nvPicPr>
-        <p:blipFill>
-          <a:blip r:embed="rId3">
-            <a:extLst>
-              <a:ext uri="{28A0092B-C50C-407E-A947-70E740481C1C}">
-                <a14:useLocalDpi xmlns:a14="http://schemas.microsoft.com/office/drawing/2010/main" val="0"/>
-              </a:ext>
-            </a:extLst>
-          </a:blip>
-          <a:srcRect/>
-          <a:stretch>
-            <a:fillRect/>
-          </a:stretch>
-        </p:blipFill>
-        <p:spPr bwMode="auto">
-          <a:xfrm>
-            <a:off x="457200" y="304800"/>
-            <a:ext cx="2514600" cy="1016000"/>
+            <a:off x="228601" y="3962400"/>
+            <a:ext cx="2708986" cy="2781300"/>
           </a:xfrm>
           <a:prstGeom prst="rect">
             <a:avLst/>
@@ -4204,7 +3205,1082 @@
     </p:spTree>
     <p:extLst>
       <p:ext uri="{BB962C8B-B14F-4D97-AF65-F5344CB8AC3E}">
-        <p14:creationId xmlns:p14="http://schemas.microsoft.com/office/powerpoint/2010/main" val="82575994"/>
+        <p14:creationId xmlns:p14="http://schemas.microsoft.com/office/powerpoint/2010/main" val="1958276867"/>
+      </p:ext>
+    </p:extLst>
+  </p:cSld>
+  <p:clrMapOvr>
+    <a:masterClrMapping/>
+  </p:clrMapOvr>
+  <p:timing>
+    <p:tnLst>
+      <p:par>
+        <p:cTn id="1" dur="indefinite" restart="never" nodeType="tmRoot"/>
+      </p:par>
+    </p:tnLst>
+  </p:timing>
+</p:sld>
+</file>
+
+<file path=ppt/slides/slide10.xml><?xml version="1.0" encoding="utf-8"?>
+<p:sld xmlns:a="http://schemas.openxmlformats.org/drawingml/2006/main" xmlns:r="http://schemas.openxmlformats.org/officeDocument/2006/relationships" xmlns:p="http://schemas.openxmlformats.org/presentationml/2006/main">
+  <p:cSld>
+    <p:spTree>
+      <p:nvGrpSpPr>
+        <p:cNvPr id="1" name=""/>
+        <p:cNvGrpSpPr/>
+        <p:nvPr/>
+      </p:nvGrpSpPr>
+      <p:grpSpPr>
+        <a:xfrm>
+          <a:off x="0" y="0"/>
+          <a:ext cx="0" cy="0"/>
+          <a:chOff x="0" y="0"/>
+          <a:chExt cx="0" cy="0"/>
+        </a:xfrm>
+      </p:grpSpPr>
+      <p:sp>
+        <p:nvSpPr>
+          <p:cNvPr id="2" name="Title 1"/>
+          <p:cNvSpPr>
+            <a:spLocks noGrp="1"/>
+          </p:cNvSpPr>
+          <p:nvPr>
+            <p:ph type="ctrTitle"/>
+          </p:nvPr>
+        </p:nvSpPr>
+        <p:spPr/>
+        <p:txBody>
+          <a:bodyPr/>
+          <a:lstStyle/>
+          <a:p>
+            <a:r>
+              <a:rPr lang="en-US" dirty="0" smtClean="0"/>
+              <a:t>and refactor our JavaScript code</a:t>
+            </a:r>
+            <a:endParaRPr lang="en-US" dirty="0"/>
+          </a:p>
+        </p:txBody>
+      </p:sp>
+      <p:sp>
+        <p:nvSpPr>
+          <p:cNvPr id="3" name="Subtitle 2"/>
+          <p:cNvSpPr>
+            <a:spLocks noGrp="1"/>
+          </p:cNvSpPr>
+          <p:nvPr>
+            <p:ph type="subTitle" idx="1"/>
+          </p:nvPr>
+        </p:nvSpPr>
+        <p:spPr/>
+        <p:txBody>
+          <a:bodyPr/>
+          <a:lstStyle/>
+          <a:p>
+            <a:endParaRPr lang="en-US" dirty="0"/>
+          </a:p>
+        </p:txBody>
+      </p:sp>
+    </p:spTree>
+    <p:extLst>
+      <p:ext uri="{BB962C8B-B14F-4D97-AF65-F5344CB8AC3E}">
+        <p14:creationId xmlns:p14="http://schemas.microsoft.com/office/powerpoint/2010/main" val="2476654709"/>
+      </p:ext>
+    </p:extLst>
+  </p:cSld>
+  <p:clrMapOvr>
+    <a:masterClrMapping/>
+  </p:clrMapOvr>
+  <p:timing>
+    <p:tnLst>
+      <p:par>
+        <p:cTn id="1" dur="indefinite" restart="never" nodeType="tmRoot"/>
+      </p:par>
+    </p:tnLst>
+  </p:timing>
+</p:sld>
+</file>
+
+<file path=ppt/slides/slide11.xml><?xml version="1.0" encoding="utf-8"?>
+<p:sld xmlns:a="http://schemas.openxmlformats.org/drawingml/2006/main" xmlns:r="http://schemas.openxmlformats.org/officeDocument/2006/relationships" xmlns:p="http://schemas.openxmlformats.org/presentationml/2006/main">
+  <p:cSld>
+    <p:spTree>
+      <p:nvGrpSpPr>
+        <p:cNvPr id="1" name=""/>
+        <p:cNvGrpSpPr/>
+        <p:nvPr/>
+      </p:nvGrpSpPr>
+      <p:grpSpPr>
+        <a:xfrm>
+          <a:off x="0" y="0"/>
+          <a:ext cx="0" cy="0"/>
+          <a:chOff x="0" y="0"/>
+          <a:chExt cx="0" cy="0"/>
+        </a:xfrm>
+      </p:grpSpPr>
+      <p:sp>
+        <p:nvSpPr>
+          <p:cNvPr id="2" name="Title 1"/>
+          <p:cNvSpPr>
+            <a:spLocks noGrp="1"/>
+          </p:cNvSpPr>
+          <p:nvPr>
+            <p:ph type="ctrTitle"/>
+          </p:nvPr>
+        </p:nvSpPr>
+        <p:spPr/>
+        <p:txBody>
+          <a:bodyPr/>
+          <a:lstStyle/>
+          <a:p>
+            <a:r>
+              <a:rPr lang="en-US" dirty="0" smtClean="0"/>
+              <a:t>Without fear of breaking something</a:t>
+            </a:r>
+            <a:endParaRPr lang="en-US" dirty="0"/>
+          </a:p>
+        </p:txBody>
+      </p:sp>
+      <p:sp>
+        <p:nvSpPr>
+          <p:cNvPr id="3" name="Subtitle 2"/>
+          <p:cNvSpPr>
+            <a:spLocks noGrp="1"/>
+          </p:cNvSpPr>
+          <p:nvPr>
+            <p:ph type="subTitle" idx="1"/>
+          </p:nvPr>
+        </p:nvSpPr>
+        <p:spPr/>
+        <p:txBody>
+          <a:bodyPr/>
+          <a:lstStyle/>
+          <a:p>
+            <a:endParaRPr lang="en-US" dirty="0"/>
+          </a:p>
+        </p:txBody>
+      </p:sp>
+    </p:spTree>
+    <p:extLst>
+      <p:ext uri="{BB962C8B-B14F-4D97-AF65-F5344CB8AC3E}">
+        <p14:creationId xmlns:p14="http://schemas.microsoft.com/office/powerpoint/2010/main" val="1696791544"/>
+      </p:ext>
+    </p:extLst>
+  </p:cSld>
+  <p:clrMapOvr>
+    <a:masterClrMapping/>
+  </p:clrMapOvr>
+  <p:timing>
+    <p:tnLst>
+      <p:par>
+        <p:cTn id="1" dur="indefinite" restart="never" nodeType="tmRoot"/>
+      </p:par>
+    </p:tnLst>
+  </p:timing>
+</p:sld>
+</file>
+
+<file path=ppt/slides/slide12.xml><?xml version="1.0" encoding="utf-8"?>
+<p:sld xmlns:a="http://schemas.openxmlformats.org/drawingml/2006/main" xmlns:r="http://schemas.openxmlformats.org/officeDocument/2006/relationships" xmlns:p="http://schemas.openxmlformats.org/presentationml/2006/main">
+  <p:cSld>
+    <p:spTree>
+      <p:nvGrpSpPr>
+        <p:cNvPr id="1" name=""/>
+        <p:cNvGrpSpPr/>
+        <p:nvPr/>
+      </p:nvGrpSpPr>
+      <p:grpSpPr>
+        <a:xfrm>
+          <a:off x="0" y="0"/>
+          <a:ext cx="0" cy="0"/>
+          <a:chOff x="0" y="0"/>
+          <a:chExt cx="0" cy="0"/>
+        </a:xfrm>
+      </p:grpSpPr>
+      <p:sp>
+        <p:nvSpPr>
+          <p:cNvPr id="2" name="Title 1"/>
+          <p:cNvSpPr>
+            <a:spLocks noGrp="1"/>
+          </p:cNvSpPr>
+          <p:nvPr>
+            <p:ph type="ctrTitle"/>
+          </p:nvPr>
+        </p:nvSpPr>
+        <p:spPr/>
+        <p:txBody>
+          <a:bodyPr>
+            <a:normAutofit fontScale="90000"/>
+          </a:bodyPr>
+          <a:lstStyle/>
+          <a:p>
+            <a:r>
+              <a:rPr lang="en-US" dirty="0" smtClean="0"/>
+              <a:t>Testing is especially important when external factors can affect how our code functions</a:t>
+            </a:r>
+            <a:endParaRPr lang="en-US" dirty="0"/>
+          </a:p>
+        </p:txBody>
+      </p:sp>
+      <p:sp>
+        <p:nvSpPr>
+          <p:cNvPr id="3" name="Subtitle 2"/>
+          <p:cNvSpPr>
+            <a:spLocks noGrp="1"/>
+          </p:cNvSpPr>
+          <p:nvPr>
+            <p:ph type="subTitle" idx="1"/>
+          </p:nvPr>
+        </p:nvSpPr>
+        <p:spPr/>
+        <p:txBody>
+          <a:bodyPr/>
+          <a:lstStyle/>
+          <a:p>
+            <a:endParaRPr lang="en-US" dirty="0"/>
+          </a:p>
+        </p:txBody>
+      </p:sp>
+    </p:spTree>
+    <p:extLst>
+      <p:ext uri="{BB962C8B-B14F-4D97-AF65-F5344CB8AC3E}">
+        <p14:creationId xmlns:p14="http://schemas.microsoft.com/office/powerpoint/2010/main" val="594524472"/>
+      </p:ext>
+    </p:extLst>
+  </p:cSld>
+  <p:clrMapOvr>
+    <a:masterClrMapping/>
+  </p:clrMapOvr>
+  <p:timing>
+    <p:tnLst>
+      <p:par>
+        <p:cTn id="1" dur="indefinite" restart="never" nodeType="tmRoot"/>
+      </p:par>
+    </p:tnLst>
+  </p:timing>
+</p:sld>
+</file>
+
+<file path=ppt/slides/slide13.xml><?xml version="1.0" encoding="utf-8"?>
+<p:sld xmlns:a="http://schemas.openxmlformats.org/drawingml/2006/main" xmlns:r="http://schemas.openxmlformats.org/officeDocument/2006/relationships" xmlns:p="http://schemas.openxmlformats.org/presentationml/2006/main">
+  <p:cSld>
+    <p:spTree>
+      <p:nvGrpSpPr>
+        <p:cNvPr id="1" name=""/>
+        <p:cNvGrpSpPr/>
+        <p:nvPr/>
+      </p:nvGrpSpPr>
+      <p:grpSpPr>
+        <a:xfrm>
+          <a:off x="0" y="0"/>
+          <a:ext cx="0" cy="0"/>
+          <a:chOff x="0" y="0"/>
+          <a:chExt cx="0" cy="0"/>
+        </a:xfrm>
+      </p:grpSpPr>
+      <p:sp>
+        <p:nvSpPr>
+          <p:cNvPr id="2" name="Title 1"/>
+          <p:cNvSpPr>
+            <a:spLocks noGrp="1"/>
+          </p:cNvSpPr>
+          <p:nvPr>
+            <p:ph type="ctrTitle"/>
+          </p:nvPr>
+        </p:nvSpPr>
+        <p:spPr/>
+        <p:txBody>
+          <a:bodyPr/>
+          <a:lstStyle/>
+          <a:p>
+            <a:r>
+              <a:rPr lang="en-US" dirty="0" smtClean="0"/>
+              <a:t>What makes a good test?</a:t>
+            </a:r>
+            <a:endParaRPr lang="en-US" dirty="0"/>
+          </a:p>
+        </p:txBody>
+      </p:sp>
+      <p:sp>
+        <p:nvSpPr>
+          <p:cNvPr id="3" name="Subtitle 2"/>
+          <p:cNvSpPr>
+            <a:spLocks noGrp="1"/>
+          </p:cNvSpPr>
+          <p:nvPr>
+            <p:ph type="subTitle" idx="1"/>
+          </p:nvPr>
+        </p:nvSpPr>
+        <p:spPr/>
+        <p:txBody>
+          <a:bodyPr/>
+          <a:lstStyle/>
+          <a:p>
+            <a:endParaRPr lang="en-US" dirty="0"/>
+          </a:p>
+        </p:txBody>
+      </p:sp>
+    </p:spTree>
+    <p:extLst>
+      <p:ext uri="{BB962C8B-B14F-4D97-AF65-F5344CB8AC3E}">
+        <p14:creationId xmlns:p14="http://schemas.microsoft.com/office/powerpoint/2010/main" val="3896509134"/>
+      </p:ext>
+    </p:extLst>
+  </p:cSld>
+  <p:clrMapOvr>
+    <a:masterClrMapping/>
+  </p:clrMapOvr>
+  <p:timing>
+    <p:tnLst>
+      <p:par>
+        <p:cTn id="1" dur="indefinite" restart="never" nodeType="tmRoot"/>
+      </p:par>
+    </p:tnLst>
+  </p:timing>
+</p:sld>
+</file>
+
+<file path=ppt/slides/slide14.xml><?xml version="1.0" encoding="utf-8"?>
+<p:sld xmlns:a="http://schemas.openxmlformats.org/drawingml/2006/main" xmlns:r="http://schemas.openxmlformats.org/officeDocument/2006/relationships" xmlns:p="http://schemas.openxmlformats.org/presentationml/2006/main">
+  <p:cSld>
+    <p:spTree>
+      <p:nvGrpSpPr>
+        <p:cNvPr id="1" name=""/>
+        <p:cNvGrpSpPr/>
+        <p:nvPr/>
+      </p:nvGrpSpPr>
+      <p:grpSpPr>
+        <a:xfrm>
+          <a:off x="0" y="0"/>
+          <a:ext cx="0" cy="0"/>
+          <a:chOff x="0" y="0"/>
+          <a:chExt cx="0" cy="0"/>
+        </a:xfrm>
+      </p:grpSpPr>
+      <p:sp>
+        <p:nvSpPr>
+          <p:cNvPr id="2" name="Title 1"/>
+          <p:cNvSpPr>
+            <a:spLocks noGrp="1"/>
+          </p:cNvSpPr>
+          <p:nvPr>
+            <p:ph type="ctrTitle"/>
+          </p:nvPr>
+        </p:nvSpPr>
+        <p:spPr/>
+        <p:txBody>
+          <a:bodyPr/>
+          <a:lstStyle/>
+          <a:p>
+            <a:r>
+              <a:rPr lang="en-US" dirty="0" smtClean="0"/>
+              <a:t>Think </a:t>
+            </a:r>
+            <a:r>
+              <a:rPr lang="en-US" b="1" dirty="0" smtClean="0"/>
+              <a:t>F.I.R.S.T</a:t>
+            </a:r>
+            <a:endParaRPr lang="en-US" b="1" dirty="0"/>
+          </a:p>
+        </p:txBody>
+      </p:sp>
+      <p:sp>
+        <p:nvSpPr>
+          <p:cNvPr id="3" name="Subtitle 2"/>
+          <p:cNvSpPr>
+            <a:spLocks noGrp="1"/>
+          </p:cNvSpPr>
+          <p:nvPr>
+            <p:ph type="subTitle" idx="1"/>
+          </p:nvPr>
+        </p:nvSpPr>
+        <p:spPr/>
+        <p:txBody>
+          <a:bodyPr/>
+          <a:lstStyle/>
+          <a:p>
+            <a:endParaRPr lang="en-US" dirty="0"/>
+          </a:p>
+        </p:txBody>
+      </p:sp>
+    </p:spTree>
+    <p:extLst>
+      <p:ext uri="{BB962C8B-B14F-4D97-AF65-F5344CB8AC3E}">
+        <p14:creationId xmlns:p14="http://schemas.microsoft.com/office/powerpoint/2010/main" val="3909524467"/>
+      </p:ext>
+    </p:extLst>
+  </p:cSld>
+  <p:clrMapOvr>
+    <a:masterClrMapping/>
+  </p:clrMapOvr>
+  <p:timing>
+    <p:tnLst>
+      <p:par>
+        <p:cTn id="1" dur="indefinite" restart="never" nodeType="tmRoot"/>
+      </p:par>
+    </p:tnLst>
+  </p:timing>
+</p:sld>
+</file>
+
+<file path=ppt/slides/slide15.xml><?xml version="1.0" encoding="utf-8"?>
+<p:sld xmlns:a="http://schemas.openxmlformats.org/drawingml/2006/main" xmlns:r="http://schemas.openxmlformats.org/officeDocument/2006/relationships" xmlns:p="http://schemas.openxmlformats.org/presentationml/2006/main">
+  <p:cSld>
+    <p:spTree>
+      <p:nvGrpSpPr>
+        <p:cNvPr id="1" name=""/>
+        <p:cNvGrpSpPr/>
+        <p:nvPr/>
+      </p:nvGrpSpPr>
+      <p:grpSpPr>
+        <a:xfrm>
+          <a:off x="0" y="0"/>
+          <a:ext cx="0" cy="0"/>
+          <a:chOff x="0" y="0"/>
+          <a:chExt cx="0" cy="0"/>
+        </a:xfrm>
+      </p:grpSpPr>
+      <p:sp>
+        <p:nvSpPr>
+          <p:cNvPr id="2" name="Title 1"/>
+          <p:cNvSpPr>
+            <a:spLocks noGrp="1"/>
+          </p:cNvSpPr>
+          <p:nvPr>
+            <p:ph type="ctrTitle"/>
+          </p:nvPr>
+        </p:nvSpPr>
+        <p:spPr/>
+        <p:txBody>
+          <a:bodyPr/>
+          <a:lstStyle/>
+          <a:p>
+            <a:r>
+              <a:rPr lang="en-US" dirty="0" smtClean="0"/>
+              <a:t>Fast</a:t>
+            </a:r>
+            <a:endParaRPr lang="en-US" dirty="0"/>
+          </a:p>
+        </p:txBody>
+      </p:sp>
+      <p:sp>
+        <p:nvSpPr>
+          <p:cNvPr id="3" name="Subtitle 2"/>
+          <p:cNvSpPr>
+            <a:spLocks noGrp="1"/>
+          </p:cNvSpPr>
+          <p:nvPr>
+            <p:ph type="subTitle" idx="1"/>
+          </p:nvPr>
+        </p:nvSpPr>
+        <p:spPr/>
+        <p:txBody>
+          <a:bodyPr/>
+          <a:lstStyle/>
+          <a:p>
+            <a:endParaRPr lang="en-US" dirty="0"/>
+          </a:p>
+        </p:txBody>
+      </p:sp>
+    </p:spTree>
+    <p:extLst>
+      <p:ext uri="{BB962C8B-B14F-4D97-AF65-F5344CB8AC3E}">
+        <p14:creationId xmlns:p14="http://schemas.microsoft.com/office/powerpoint/2010/main" val="3498782803"/>
+      </p:ext>
+    </p:extLst>
+  </p:cSld>
+  <p:clrMapOvr>
+    <a:masterClrMapping/>
+  </p:clrMapOvr>
+  <p:timing>
+    <p:tnLst>
+      <p:par>
+        <p:cTn id="1" dur="indefinite" restart="never" nodeType="tmRoot"/>
+      </p:par>
+    </p:tnLst>
+  </p:timing>
+</p:sld>
+</file>
+
+<file path=ppt/slides/slide16.xml><?xml version="1.0" encoding="utf-8"?>
+<p:sld xmlns:a="http://schemas.openxmlformats.org/drawingml/2006/main" xmlns:r="http://schemas.openxmlformats.org/officeDocument/2006/relationships" xmlns:p="http://schemas.openxmlformats.org/presentationml/2006/main">
+  <p:cSld>
+    <p:spTree>
+      <p:nvGrpSpPr>
+        <p:cNvPr id="1" name=""/>
+        <p:cNvGrpSpPr/>
+        <p:nvPr/>
+      </p:nvGrpSpPr>
+      <p:grpSpPr>
+        <a:xfrm>
+          <a:off x="0" y="0"/>
+          <a:ext cx="0" cy="0"/>
+          <a:chOff x="0" y="0"/>
+          <a:chExt cx="0" cy="0"/>
+        </a:xfrm>
+      </p:grpSpPr>
+      <p:sp>
+        <p:nvSpPr>
+          <p:cNvPr id="2" name="Title 1"/>
+          <p:cNvSpPr>
+            <a:spLocks noGrp="1"/>
+          </p:cNvSpPr>
+          <p:nvPr>
+            <p:ph type="ctrTitle"/>
+          </p:nvPr>
+        </p:nvSpPr>
+        <p:spPr/>
+        <p:txBody>
+          <a:bodyPr/>
+          <a:lstStyle/>
+          <a:p>
+            <a:r>
+              <a:rPr lang="en-US" dirty="0" smtClean="0"/>
+              <a:t>Independent</a:t>
+            </a:r>
+            <a:endParaRPr lang="en-US" dirty="0"/>
+          </a:p>
+        </p:txBody>
+      </p:sp>
+      <p:sp>
+        <p:nvSpPr>
+          <p:cNvPr id="3" name="Subtitle 2"/>
+          <p:cNvSpPr>
+            <a:spLocks noGrp="1"/>
+          </p:cNvSpPr>
+          <p:nvPr>
+            <p:ph type="subTitle" idx="1"/>
+          </p:nvPr>
+        </p:nvSpPr>
+        <p:spPr/>
+        <p:txBody>
+          <a:bodyPr/>
+          <a:lstStyle/>
+          <a:p>
+            <a:r>
+              <a:rPr lang="en-US" dirty="0" smtClean="0"/>
+              <a:t>Tests should not depend on each other.</a:t>
+            </a:r>
+            <a:endParaRPr lang="en-US" dirty="0"/>
+          </a:p>
+        </p:txBody>
+      </p:sp>
+    </p:spTree>
+    <p:extLst>
+      <p:ext uri="{BB962C8B-B14F-4D97-AF65-F5344CB8AC3E}">
+        <p14:creationId xmlns:p14="http://schemas.microsoft.com/office/powerpoint/2010/main" val="29289338"/>
+      </p:ext>
+    </p:extLst>
+  </p:cSld>
+  <p:clrMapOvr>
+    <a:masterClrMapping/>
+  </p:clrMapOvr>
+  <p:timing>
+    <p:tnLst>
+      <p:par>
+        <p:cTn id="1" dur="indefinite" restart="never" nodeType="tmRoot"/>
+      </p:par>
+    </p:tnLst>
+  </p:timing>
+</p:sld>
+</file>
+
+<file path=ppt/slides/slide17.xml><?xml version="1.0" encoding="utf-8"?>
+<p:sld xmlns:a="http://schemas.openxmlformats.org/drawingml/2006/main" xmlns:r="http://schemas.openxmlformats.org/officeDocument/2006/relationships" xmlns:p="http://schemas.openxmlformats.org/presentationml/2006/main">
+  <p:cSld>
+    <p:spTree>
+      <p:nvGrpSpPr>
+        <p:cNvPr id="1" name=""/>
+        <p:cNvGrpSpPr/>
+        <p:nvPr/>
+      </p:nvGrpSpPr>
+      <p:grpSpPr>
+        <a:xfrm>
+          <a:off x="0" y="0"/>
+          <a:ext cx="0" cy="0"/>
+          <a:chOff x="0" y="0"/>
+          <a:chExt cx="0" cy="0"/>
+        </a:xfrm>
+      </p:grpSpPr>
+      <p:sp>
+        <p:nvSpPr>
+          <p:cNvPr id="2" name="Title 1"/>
+          <p:cNvSpPr>
+            <a:spLocks noGrp="1"/>
+          </p:cNvSpPr>
+          <p:nvPr>
+            <p:ph type="ctrTitle"/>
+          </p:nvPr>
+        </p:nvSpPr>
+        <p:spPr/>
+        <p:txBody>
+          <a:bodyPr/>
+          <a:lstStyle/>
+          <a:p>
+            <a:r>
+              <a:rPr lang="en-US" dirty="0" smtClean="0"/>
+              <a:t>Repeatable</a:t>
+            </a:r>
+            <a:endParaRPr lang="en-US" dirty="0"/>
+          </a:p>
+        </p:txBody>
+      </p:sp>
+      <p:sp>
+        <p:nvSpPr>
+          <p:cNvPr id="3" name="Subtitle 2"/>
+          <p:cNvSpPr>
+            <a:spLocks noGrp="1"/>
+          </p:cNvSpPr>
+          <p:nvPr>
+            <p:ph type="subTitle" idx="1"/>
+          </p:nvPr>
+        </p:nvSpPr>
+        <p:spPr/>
+        <p:txBody>
+          <a:bodyPr/>
+          <a:lstStyle/>
+          <a:p>
+            <a:r>
+              <a:rPr lang="en-US" dirty="0" smtClean="0"/>
+              <a:t>Always the same results, regardless of environment.</a:t>
+            </a:r>
+            <a:endParaRPr lang="en-US" dirty="0"/>
+          </a:p>
+        </p:txBody>
+      </p:sp>
+    </p:spTree>
+    <p:extLst>
+      <p:ext uri="{BB962C8B-B14F-4D97-AF65-F5344CB8AC3E}">
+        <p14:creationId xmlns:p14="http://schemas.microsoft.com/office/powerpoint/2010/main" val="29289338"/>
+      </p:ext>
+    </p:extLst>
+  </p:cSld>
+  <p:clrMapOvr>
+    <a:masterClrMapping/>
+  </p:clrMapOvr>
+  <p:timing>
+    <p:tnLst>
+      <p:par>
+        <p:cTn id="1" dur="indefinite" restart="never" nodeType="tmRoot"/>
+      </p:par>
+    </p:tnLst>
+  </p:timing>
+</p:sld>
+</file>
+
+<file path=ppt/slides/slide18.xml><?xml version="1.0" encoding="utf-8"?>
+<p:sld xmlns:a="http://schemas.openxmlformats.org/drawingml/2006/main" xmlns:r="http://schemas.openxmlformats.org/officeDocument/2006/relationships" xmlns:p="http://schemas.openxmlformats.org/presentationml/2006/main">
+  <p:cSld>
+    <p:spTree>
+      <p:nvGrpSpPr>
+        <p:cNvPr id="1" name=""/>
+        <p:cNvGrpSpPr/>
+        <p:nvPr/>
+      </p:nvGrpSpPr>
+      <p:grpSpPr>
+        <a:xfrm>
+          <a:off x="0" y="0"/>
+          <a:ext cx="0" cy="0"/>
+          <a:chOff x="0" y="0"/>
+          <a:chExt cx="0" cy="0"/>
+        </a:xfrm>
+      </p:grpSpPr>
+      <p:sp>
+        <p:nvSpPr>
+          <p:cNvPr id="2" name="Title 1"/>
+          <p:cNvSpPr>
+            <a:spLocks noGrp="1"/>
+          </p:cNvSpPr>
+          <p:nvPr>
+            <p:ph type="ctrTitle"/>
+          </p:nvPr>
+        </p:nvSpPr>
+        <p:spPr/>
+        <p:txBody>
+          <a:bodyPr/>
+          <a:lstStyle/>
+          <a:p>
+            <a:r>
+              <a:rPr lang="en-US" dirty="0" smtClean="0"/>
+              <a:t>Self-Validating</a:t>
+            </a:r>
+            <a:endParaRPr lang="en-US" dirty="0"/>
+          </a:p>
+        </p:txBody>
+      </p:sp>
+      <p:sp>
+        <p:nvSpPr>
+          <p:cNvPr id="3" name="Subtitle 2"/>
+          <p:cNvSpPr>
+            <a:spLocks noGrp="1"/>
+          </p:cNvSpPr>
+          <p:nvPr>
+            <p:ph type="subTitle" idx="1"/>
+          </p:nvPr>
+        </p:nvSpPr>
+        <p:spPr/>
+        <p:txBody>
+          <a:bodyPr/>
+          <a:lstStyle/>
+          <a:p>
+            <a:r>
+              <a:rPr lang="en-US" dirty="0" smtClean="0"/>
+              <a:t>Pass or Fail</a:t>
+            </a:r>
+          </a:p>
+          <a:p>
+            <a:r>
+              <a:rPr lang="en-US" dirty="0" smtClean="0"/>
+              <a:t>No manual </a:t>
+            </a:r>
+            <a:r>
+              <a:rPr lang="en-US" dirty="0" err="1" smtClean="0"/>
+              <a:t>evalutation</a:t>
+            </a:r>
+            <a:r>
+              <a:rPr lang="en-US" dirty="0" smtClean="0"/>
+              <a:t>.</a:t>
+            </a:r>
+            <a:endParaRPr lang="en-US" dirty="0"/>
+          </a:p>
+        </p:txBody>
+      </p:sp>
+    </p:spTree>
+    <p:extLst>
+      <p:ext uri="{BB962C8B-B14F-4D97-AF65-F5344CB8AC3E}">
+        <p14:creationId xmlns:p14="http://schemas.microsoft.com/office/powerpoint/2010/main" val="29289338"/>
+      </p:ext>
+    </p:extLst>
+  </p:cSld>
+  <p:clrMapOvr>
+    <a:masterClrMapping/>
+  </p:clrMapOvr>
+  <p:timing>
+    <p:tnLst>
+      <p:par>
+        <p:cTn id="1" dur="indefinite" restart="never" nodeType="tmRoot"/>
+      </p:par>
+    </p:tnLst>
+  </p:timing>
+</p:sld>
+</file>
+
+<file path=ppt/slides/slide19.xml><?xml version="1.0" encoding="utf-8"?>
+<p:sld xmlns:a="http://schemas.openxmlformats.org/drawingml/2006/main" xmlns:r="http://schemas.openxmlformats.org/officeDocument/2006/relationships" xmlns:p="http://schemas.openxmlformats.org/presentationml/2006/main">
+  <p:cSld>
+    <p:spTree>
+      <p:nvGrpSpPr>
+        <p:cNvPr id="1" name=""/>
+        <p:cNvGrpSpPr/>
+        <p:nvPr/>
+      </p:nvGrpSpPr>
+      <p:grpSpPr>
+        <a:xfrm>
+          <a:off x="0" y="0"/>
+          <a:ext cx="0" cy="0"/>
+          <a:chOff x="0" y="0"/>
+          <a:chExt cx="0" cy="0"/>
+        </a:xfrm>
+      </p:grpSpPr>
+      <p:sp>
+        <p:nvSpPr>
+          <p:cNvPr id="2" name="Title 1"/>
+          <p:cNvSpPr>
+            <a:spLocks noGrp="1"/>
+          </p:cNvSpPr>
+          <p:nvPr>
+            <p:ph type="ctrTitle"/>
+          </p:nvPr>
+        </p:nvSpPr>
+        <p:spPr/>
+        <p:txBody>
+          <a:bodyPr/>
+          <a:lstStyle/>
+          <a:p>
+            <a:r>
+              <a:rPr lang="en-US" dirty="0" smtClean="0"/>
+              <a:t>Timely</a:t>
+            </a:r>
+            <a:endParaRPr lang="en-US" dirty="0"/>
+          </a:p>
+        </p:txBody>
+      </p:sp>
+      <p:sp>
+        <p:nvSpPr>
+          <p:cNvPr id="3" name="Subtitle 2"/>
+          <p:cNvSpPr>
+            <a:spLocks noGrp="1"/>
+          </p:cNvSpPr>
+          <p:nvPr>
+            <p:ph type="subTitle" idx="1"/>
+          </p:nvPr>
+        </p:nvSpPr>
+        <p:spPr/>
+        <p:txBody>
+          <a:bodyPr/>
+          <a:lstStyle/>
+          <a:p>
+            <a:r>
+              <a:rPr lang="en-US" dirty="0" smtClean="0"/>
+              <a:t>Write tests </a:t>
+            </a:r>
+            <a:r>
+              <a:rPr lang="en-US" i="1" dirty="0" smtClean="0"/>
+              <a:t>before</a:t>
+            </a:r>
+            <a:r>
+              <a:rPr lang="en-US" dirty="0" smtClean="0"/>
+              <a:t> production code.</a:t>
+            </a:r>
+            <a:endParaRPr lang="en-US" dirty="0"/>
+          </a:p>
+        </p:txBody>
+      </p:sp>
+    </p:spTree>
+    <p:extLst>
+      <p:ext uri="{BB962C8B-B14F-4D97-AF65-F5344CB8AC3E}">
+        <p14:creationId xmlns:p14="http://schemas.microsoft.com/office/powerpoint/2010/main" val="29289338"/>
+      </p:ext>
+    </p:extLst>
+  </p:cSld>
+  <p:clrMapOvr>
+    <a:masterClrMapping/>
+  </p:clrMapOvr>
+  <p:timing>
+    <p:tnLst>
+      <p:par>
+        <p:cTn id="1" dur="indefinite" restart="never" nodeType="tmRoot"/>
+      </p:par>
+    </p:tnLst>
+  </p:timing>
+</p:sld>
+</file>
+
+<file path=ppt/slides/slide2.xml><?xml version="1.0" encoding="utf-8"?>
+<p:sld xmlns:a="http://schemas.openxmlformats.org/drawingml/2006/main" xmlns:r="http://schemas.openxmlformats.org/officeDocument/2006/relationships" xmlns:p="http://schemas.openxmlformats.org/presentationml/2006/main">
+  <p:cSld>
+    <p:spTree>
+      <p:nvGrpSpPr>
+        <p:cNvPr id="1" name=""/>
+        <p:cNvGrpSpPr/>
+        <p:nvPr/>
+      </p:nvGrpSpPr>
+      <p:grpSpPr>
+        <a:xfrm>
+          <a:off x="0" y="0"/>
+          <a:ext cx="0" cy="0"/>
+          <a:chOff x="0" y="0"/>
+          <a:chExt cx="0" cy="0"/>
+        </a:xfrm>
+      </p:grpSpPr>
+      <p:sp>
+        <p:nvSpPr>
+          <p:cNvPr id="2" name="Title 1"/>
+          <p:cNvSpPr>
+            <a:spLocks noGrp="1"/>
+          </p:cNvSpPr>
+          <p:nvPr>
+            <p:ph type="ctrTitle"/>
+          </p:nvPr>
+        </p:nvSpPr>
+        <p:spPr/>
+        <p:txBody>
+          <a:bodyPr/>
+          <a:lstStyle/>
+          <a:p>
+            <a:r>
+              <a:rPr lang="en-US" dirty="0" smtClean="0"/>
+              <a:t>Why should we test JavaScript?</a:t>
+            </a:r>
+            <a:endParaRPr lang="en-US" dirty="0"/>
+          </a:p>
+        </p:txBody>
+      </p:sp>
+      <p:sp>
+        <p:nvSpPr>
+          <p:cNvPr id="3" name="Subtitle 2"/>
+          <p:cNvSpPr>
+            <a:spLocks noGrp="1"/>
+          </p:cNvSpPr>
+          <p:nvPr>
+            <p:ph type="subTitle" idx="1"/>
+          </p:nvPr>
+        </p:nvSpPr>
+        <p:spPr/>
+        <p:txBody>
+          <a:bodyPr/>
+          <a:lstStyle/>
+          <a:p>
+            <a:endParaRPr lang="en-US" dirty="0"/>
+          </a:p>
+        </p:txBody>
+      </p:sp>
+    </p:spTree>
+    <p:extLst>
+      <p:ext uri="{BB962C8B-B14F-4D97-AF65-F5344CB8AC3E}">
+        <p14:creationId xmlns:p14="http://schemas.microsoft.com/office/powerpoint/2010/main" val="4246943571"/>
+      </p:ext>
+    </p:extLst>
+  </p:cSld>
+  <p:clrMapOvr>
+    <a:masterClrMapping/>
+  </p:clrMapOvr>
+  <p:timing>
+    <p:tnLst>
+      <p:par>
+        <p:cTn id="1" dur="indefinite" restart="never" nodeType="tmRoot"/>
+      </p:par>
+    </p:tnLst>
+  </p:timing>
+</p:sld>
+</file>
+
+<file path=ppt/slides/slide20.xml><?xml version="1.0" encoding="utf-8"?>
+<p:sld xmlns:a="http://schemas.openxmlformats.org/drawingml/2006/main" xmlns:r="http://schemas.openxmlformats.org/officeDocument/2006/relationships" xmlns:p="http://schemas.openxmlformats.org/presentationml/2006/main">
+  <p:cSld>
+    <p:spTree>
+      <p:nvGrpSpPr>
+        <p:cNvPr id="1" name=""/>
+        <p:cNvGrpSpPr/>
+        <p:nvPr/>
+      </p:nvGrpSpPr>
+      <p:grpSpPr>
+        <a:xfrm>
+          <a:off x="0" y="0"/>
+          <a:ext cx="0" cy="0"/>
+          <a:chOff x="0" y="0"/>
+          <a:chExt cx="0" cy="0"/>
+        </a:xfrm>
+      </p:grpSpPr>
+      <p:sp>
+        <p:nvSpPr>
+          <p:cNvPr id="2" name="Title 1"/>
+          <p:cNvSpPr>
+            <a:spLocks noGrp="1"/>
+          </p:cNvSpPr>
+          <p:nvPr>
+            <p:ph type="ctrTitle"/>
+          </p:nvPr>
+        </p:nvSpPr>
+        <p:spPr/>
+        <p:txBody>
+          <a:bodyPr/>
+          <a:lstStyle/>
+          <a:p>
+            <a:r>
+              <a:rPr lang="en-US" dirty="0" smtClean="0"/>
+              <a:t>Let’s look at an example.</a:t>
+            </a:r>
+            <a:endParaRPr lang="en-US" dirty="0"/>
+          </a:p>
+        </p:txBody>
+      </p:sp>
+      <p:sp>
+        <p:nvSpPr>
+          <p:cNvPr id="3" name="Subtitle 2"/>
+          <p:cNvSpPr>
+            <a:spLocks noGrp="1"/>
+          </p:cNvSpPr>
+          <p:nvPr>
+            <p:ph type="subTitle" idx="1"/>
+          </p:nvPr>
+        </p:nvSpPr>
+        <p:spPr/>
+        <p:txBody>
+          <a:bodyPr/>
+          <a:lstStyle/>
+          <a:p>
+            <a:r>
+              <a:rPr lang="en-US" dirty="0" smtClean="0"/>
+              <a:t>A random function for rolling a die.</a:t>
+            </a:r>
+            <a:endParaRPr lang="en-US" dirty="0"/>
+          </a:p>
+        </p:txBody>
+      </p:sp>
+    </p:spTree>
+    <p:extLst>
+      <p:ext uri="{BB962C8B-B14F-4D97-AF65-F5344CB8AC3E}">
+        <p14:creationId xmlns:p14="http://schemas.microsoft.com/office/powerpoint/2010/main" val="2521644806"/>
+      </p:ext>
+    </p:extLst>
+  </p:cSld>
+  <p:clrMapOvr>
+    <a:masterClrMapping/>
+  </p:clrMapOvr>
+  <p:timing>
+    <p:tnLst>
+      <p:par>
+        <p:cTn id="1" dur="indefinite" restart="never" nodeType="tmRoot"/>
+      </p:par>
+    </p:tnLst>
+  </p:timing>
+</p:sld>
+</file>
+
+<file path=ppt/slides/slide21.xml><?xml version="1.0" encoding="utf-8"?>
+<p:sld xmlns:a="http://schemas.openxmlformats.org/drawingml/2006/main" xmlns:r="http://schemas.openxmlformats.org/officeDocument/2006/relationships" xmlns:p="http://schemas.openxmlformats.org/presentationml/2006/main">
+  <p:cSld>
+    <p:spTree>
+      <p:nvGrpSpPr>
+        <p:cNvPr id="1" name=""/>
+        <p:cNvGrpSpPr/>
+        <p:nvPr/>
+      </p:nvGrpSpPr>
+      <p:grpSpPr>
+        <a:xfrm>
+          <a:off x="0" y="0"/>
+          <a:ext cx="0" cy="0"/>
+          <a:chOff x="0" y="0"/>
+          <a:chExt cx="0" cy="0"/>
+        </a:xfrm>
+      </p:grpSpPr>
+      <p:sp>
+        <p:nvSpPr>
+          <p:cNvPr id="2" name="Title 1"/>
+          <p:cNvSpPr>
+            <a:spLocks noGrp="1"/>
+          </p:cNvSpPr>
+          <p:nvPr>
+            <p:ph type="ctrTitle"/>
+          </p:nvPr>
+        </p:nvSpPr>
+        <p:spPr/>
+        <p:txBody>
+          <a:bodyPr/>
+          <a:lstStyle/>
+          <a:p>
+            <a:r>
+              <a:rPr lang="en-US" dirty="0" smtClean="0"/>
+              <a:t>What’s wrong here?</a:t>
+            </a:r>
+            <a:endParaRPr lang="en-US" dirty="0"/>
+          </a:p>
+        </p:txBody>
+      </p:sp>
+      <p:sp>
+        <p:nvSpPr>
+          <p:cNvPr id="3" name="Subtitle 2"/>
+          <p:cNvSpPr>
+            <a:spLocks noGrp="1"/>
+          </p:cNvSpPr>
+          <p:nvPr>
+            <p:ph type="subTitle" idx="1"/>
+          </p:nvPr>
+        </p:nvSpPr>
+        <p:spPr/>
+        <p:txBody>
+          <a:bodyPr/>
+          <a:lstStyle/>
+          <a:p>
+            <a:endParaRPr lang="en-US" dirty="0"/>
+          </a:p>
+        </p:txBody>
+      </p:sp>
+    </p:spTree>
+    <p:extLst>
+      <p:ext uri="{BB962C8B-B14F-4D97-AF65-F5344CB8AC3E}">
+        <p14:creationId xmlns:p14="http://schemas.microsoft.com/office/powerpoint/2010/main" val="2420139913"/>
       </p:ext>
     </p:extLst>
   </p:cSld>
@@ -4240,7 +4316,7 @@
       </p:grpSpPr>
       <p:sp>
         <p:nvSpPr>
-          <p:cNvPr id="2" name="Title 1"/>
+          <p:cNvPr id="4" name="Title 1"/>
           <p:cNvSpPr>
             <a:spLocks noGrp="1"/>
           </p:cNvSpPr>
@@ -4248,46 +4324,92 @@
             <p:ph type="ctrTitle"/>
           </p:nvPr>
         </p:nvSpPr>
-        <p:spPr/>
+        <p:spPr>
+          <a:xfrm>
+            <a:off x="685006" y="304800"/>
+            <a:ext cx="7772400" cy="1470025"/>
+          </a:xfrm>
+        </p:spPr>
         <p:txBody>
           <a:bodyPr/>
           <a:lstStyle/>
           <a:p>
             <a:r>
               <a:rPr lang="en-US" dirty="0" smtClean="0"/>
-              <a:t>Fail!!</a:t>
-            </a:r>
-            <a:endParaRPr lang="en-US" dirty="0"/>
-          </a:p>
-        </p:txBody>
-      </p:sp>
-      <p:sp>
-        <p:nvSpPr>
-          <p:cNvPr id="3" name="Subtitle 2"/>
-          <p:cNvSpPr>
-            <a:spLocks noGrp="1"/>
-          </p:cNvSpPr>
-          <p:nvPr>
-            <p:ph type="subTitle" idx="1"/>
-          </p:nvPr>
-        </p:nvSpPr>
-        <p:spPr/>
-        <p:txBody>
-          <a:bodyPr/>
-          <a:lstStyle/>
-          <a:p>
-            <a:r>
-              <a:rPr lang="en-US" dirty="0" smtClean="0"/>
-              <a:t>Alert()</a:t>
-            </a:r>
-            <a:endParaRPr lang="en-US" dirty="0"/>
-          </a:p>
-        </p:txBody>
-      </p:sp>
+              <a:t>Buggy code</a:t>
+            </a:r>
+            <a:endParaRPr lang="en-US" dirty="0"/>
+          </a:p>
+        </p:txBody>
+      </p:sp>
+      <p:pic>
+        <p:nvPicPr>
+          <p:cNvPr id="2051" name="Picture 3"/>
+          <p:cNvPicPr>
+            <a:picLocks noChangeAspect="1" noChangeArrowheads="1"/>
+          </p:cNvPicPr>
+          <p:nvPr/>
+        </p:nvPicPr>
+        <p:blipFill>
+          <a:blip r:embed="rId2">
+            <a:extLst>
+              <a:ext uri="{28A0092B-C50C-407E-A947-70E740481C1C}">
+                <a14:useLocalDpi xmlns:a14="http://schemas.microsoft.com/office/drawing/2010/main" val="0"/>
+              </a:ext>
+            </a:extLst>
+          </a:blip>
+          <a:srcRect/>
+          <a:stretch>
+            <a:fillRect/>
+          </a:stretch>
+        </p:blipFill>
+        <p:spPr bwMode="auto">
+          <a:xfrm>
+            <a:off x="285750" y="2076450"/>
+            <a:ext cx="8570913" cy="2705100"/>
+          </a:xfrm>
+          <a:prstGeom prst="rect">
+            <a:avLst/>
+          </a:prstGeom>
+          <a:noFill/>
+          <a:ln>
+            <a:noFill/>
+          </a:ln>
+          <a:effectLst/>
+          <a:extLst>
+            <a:ext uri="{909E8E84-426E-40DD-AFC4-6F175D3DCCD1}">
+              <a14:hiddenFill xmlns:a14="http://schemas.microsoft.com/office/drawing/2010/main">
+                <a:solidFill>
+                  <a:schemeClr val="accent1"/>
+                </a:solidFill>
+              </a14:hiddenFill>
+            </a:ext>
+            <a:ext uri="{91240B29-F687-4F45-9708-019B960494DF}">
+              <a14:hiddenLine xmlns:a14="http://schemas.microsoft.com/office/drawing/2010/main" w="9525">
+                <a:solidFill>
+                  <a:schemeClr val="tx1"/>
+                </a:solidFill>
+                <a:miter lim="800000"/>
+                <a:headEnd/>
+                <a:tailEnd/>
+              </a14:hiddenLine>
+            </a:ext>
+            <a:ext uri="{AF507438-7753-43E0-B8FC-AC1667EBCBE1}">
+              <a14:hiddenEffects xmlns:a14="http://schemas.microsoft.com/office/drawing/2010/main">
+                <a:effectLst>
+                  <a:outerShdw dist="35921" dir="2700000" algn="ctr" rotWithShape="0">
+                    <a:schemeClr val="bg2"/>
+                  </a:outerShdw>
+                </a:effectLst>
+              </a14:hiddenEffects>
+            </a:ext>
+          </a:extLst>
+        </p:spPr>
+      </p:pic>
     </p:spTree>
     <p:extLst>
       <p:ext uri="{BB962C8B-B14F-4D97-AF65-F5344CB8AC3E}">
-        <p14:creationId xmlns:p14="http://schemas.microsoft.com/office/powerpoint/2010/main" val="82575994"/>
+        <p14:creationId xmlns:p14="http://schemas.microsoft.com/office/powerpoint/2010/main" val="334353746"/>
       </p:ext>
     </p:extLst>
   </p:cSld>
@@ -4338,7 +4460,7 @@
           <a:p>
             <a:r>
               <a:rPr lang="en-US" dirty="0" smtClean="0"/>
-              <a:t>When you find yourself wanting to use alert()</a:t>
+              <a:t>Fail!!</a:t>
             </a:r>
             <a:endParaRPr lang="en-US" dirty="0"/>
           </a:p>
@@ -4359,6 +4481,10 @@
           <a:bodyPr/>
           <a:lstStyle/>
           <a:p>
+            <a:r>
+              <a:rPr lang="en-US" dirty="0" smtClean="0"/>
+              <a:t>Alert()</a:t>
+            </a:r>
             <a:endParaRPr lang="en-US" dirty="0"/>
           </a:p>
         </p:txBody>
@@ -4417,7 +4543,7 @@
           <a:p>
             <a:r>
               <a:rPr lang="en-US" dirty="0" smtClean="0"/>
-              <a:t>Write a test!</a:t>
+              <a:t>When you find yourself wanting to use alert()</a:t>
             </a:r>
             <a:endParaRPr lang="en-US" dirty="0"/>
           </a:p>
@@ -4452,6 +4578,13 @@
   <p:clrMapOvr>
     <a:masterClrMapping/>
   </p:clrMapOvr>
+  <p:timing>
+    <p:tnLst>
+      <p:par>
+        <p:cTn id="1" dur="indefinite" restart="never" nodeType="tmRoot"/>
+      </p:par>
+    </p:tnLst>
+  </p:timing>
 </p:sld>
 </file>
 
@@ -4489,7 +4622,7 @@
           <a:p>
             <a:r>
               <a:rPr lang="en-US" dirty="0" smtClean="0"/>
-              <a:t>Fix the random function</a:t>
+              <a:t>Write a test!</a:t>
             </a:r>
             <a:endParaRPr lang="en-US" dirty="0"/>
           </a:p>
@@ -4528,172 +4661,6 @@
 </file>
 
 <file path=ppt/slides/slide26.xml><?xml version="1.0" encoding="utf-8"?>
-<p:sld xmlns:a="http://schemas.openxmlformats.org/drawingml/2006/main" xmlns:r="http://schemas.openxmlformats.org/officeDocument/2006/relationships" xmlns:p="http://schemas.openxmlformats.org/presentationml/2006/main">
-  <p:cSld>
-    <p:spTree>
-      <p:nvGrpSpPr>
-        <p:cNvPr id="1" name=""/>
-        <p:cNvGrpSpPr/>
-        <p:nvPr/>
-      </p:nvGrpSpPr>
-      <p:grpSpPr>
-        <a:xfrm>
-          <a:off x="0" y="0"/>
-          <a:ext cx="0" cy="0"/>
-          <a:chOff x="0" y="0"/>
-          <a:chExt cx="0" cy="0"/>
-        </a:xfrm>
-      </p:grpSpPr>
-      <p:sp>
-        <p:nvSpPr>
-          <p:cNvPr id="2" name="Title 1"/>
-          <p:cNvSpPr>
-            <a:spLocks noGrp="1"/>
-          </p:cNvSpPr>
-          <p:nvPr>
-            <p:ph type="ctrTitle"/>
-          </p:nvPr>
-        </p:nvSpPr>
-        <p:spPr/>
-        <p:txBody>
-          <a:bodyPr/>
-          <a:lstStyle/>
-          <a:p>
-            <a:r>
-              <a:rPr lang="en-US" dirty="0" smtClean="0"/>
-              <a:t>Set Up</a:t>
-            </a:r>
-            <a:endParaRPr lang="en-US" dirty="0"/>
-          </a:p>
-        </p:txBody>
-      </p:sp>
-      <p:sp>
-        <p:nvSpPr>
-          <p:cNvPr id="3" name="Subtitle 2"/>
-          <p:cNvSpPr>
-            <a:spLocks noGrp="1"/>
-          </p:cNvSpPr>
-          <p:nvPr>
-            <p:ph type="subTitle" idx="1"/>
-          </p:nvPr>
-        </p:nvSpPr>
-        <p:spPr/>
-        <p:txBody>
-          <a:bodyPr/>
-          <a:lstStyle/>
-          <a:p>
-            <a:endParaRPr lang="en-US" dirty="0"/>
-          </a:p>
-        </p:txBody>
-      </p:sp>
-    </p:spTree>
-    <p:extLst>
-      <p:ext uri="{BB962C8B-B14F-4D97-AF65-F5344CB8AC3E}">
-        <p14:creationId xmlns:p14="http://schemas.microsoft.com/office/powerpoint/2010/main" val="771909954"/>
-      </p:ext>
-    </p:extLst>
-  </p:cSld>
-  <p:clrMapOvr>
-    <a:masterClrMapping/>
-  </p:clrMapOvr>
-  <p:timing>
-    <p:tnLst>
-      <p:par>
-        <p:cTn id="1" dur="indefinite" restart="never" nodeType="tmRoot"/>
-      </p:par>
-    </p:tnLst>
-  </p:timing>
-</p:sld>
-</file>
-
-<file path=ppt/slides/slide27.xml><?xml version="1.0" encoding="utf-8"?>
-<p:sld xmlns:a="http://schemas.openxmlformats.org/drawingml/2006/main" xmlns:r="http://schemas.openxmlformats.org/officeDocument/2006/relationships" xmlns:p="http://schemas.openxmlformats.org/presentationml/2006/main">
-  <p:cSld>
-    <p:spTree>
-      <p:nvGrpSpPr>
-        <p:cNvPr id="1" name=""/>
-        <p:cNvGrpSpPr/>
-        <p:nvPr/>
-      </p:nvGrpSpPr>
-      <p:grpSpPr>
-        <a:xfrm>
-          <a:off x="0" y="0"/>
-          <a:ext cx="0" cy="0"/>
-          <a:chOff x="0" y="0"/>
-          <a:chExt cx="0" cy="0"/>
-        </a:xfrm>
-      </p:grpSpPr>
-      <p:sp>
-        <p:nvSpPr>
-          <p:cNvPr id="2" name="Title 1"/>
-          <p:cNvSpPr>
-            <a:spLocks noGrp="1"/>
-          </p:cNvSpPr>
-          <p:nvPr>
-            <p:ph type="ctrTitle"/>
-          </p:nvPr>
-        </p:nvSpPr>
-        <p:spPr/>
-        <p:txBody>
-          <a:bodyPr/>
-          <a:lstStyle/>
-          <a:p>
-            <a:r>
-              <a:rPr lang="en-US" dirty="0" err="1" smtClean="0"/>
-              <a:t>SpecRunner</a:t>
-            </a:r>
-            <a:r>
-              <a:rPr lang="en-US" dirty="0" smtClean="0"/>
-              <a:t> stuff here</a:t>
-            </a:r>
-            <a:endParaRPr lang="en-US" dirty="0"/>
-          </a:p>
-        </p:txBody>
-      </p:sp>
-      <p:sp>
-        <p:nvSpPr>
-          <p:cNvPr id="3" name="Subtitle 2"/>
-          <p:cNvSpPr>
-            <a:spLocks noGrp="1"/>
-          </p:cNvSpPr>
-          <p:nvPr>
-            <p:ph type="subTitle" idx="1"/>
-          </p:nvPr>
-        </p:nvSpPr>
-        <p:spPr/>
-        <p:txBody>
-          <a:bodyPr/>
-          <a:lstStyle/>
-          <a:p>
-            <a:r>
-              <a:rPr lang="en-US" dirty="0" smtClean="0"/>
-              <a:t>TODO</a:t>
-            </a:r>
-            <a:endParaRPr lang="en-US" dirty="0"/>
-          </a:p>
-        </p:txBody>
-      </p:sp>
-    </p:spTree>
-    <p:extLst>
-      <p:ext uri="{BB962C8B-B14F-4D97-AF65-F5344CB8AC3E}">
-        <p14:creationId xmlns:p14="http://schemas.microsoft.com/office/powerpoint/2010/main" val="82575994"/>
-      </p:ext>
-    </p:extLst>
-  </p:cSld>
-  <p:clrMapOvr>
-    <a:masterClrMapping/>
-  </p:clrMapOvr>
-  <p:timing>
-    <p:tnLst>
-      <p:par>
-        <p:cTn id="1" dur="indefinite" restart="never" nodeType="tmRoot"/>
-      </p:par>
-    </p:tnLst>
-  </p:timing>
-</p:sld>
-</file>
-
-<file path=ppt/slides/slide28.xml><?xml version="1.0" encoding="utf-8"?>
 <p:sld xmlns:a="http://schemas.openxmlformats.org/drawingml/2006/main" xmlns:r="http://schemas.openxmlformats.org/officeDocument/2006/relationships" xmlns:p="http://schemas.openxmlformats.org/presentationml/2006/main">
   <p:cSld>
     <p:spTree>
@@ -4822,7 +4789,7 @@
 </p:sld>
 </file>
 
-<file path=ppt/slides/slide29.xml><?xml version="1.0" encoding="utf-8"?>
+<file path=ppt/slides/slide27.xml><?xml version="1.0" encoding="utf-8"?>
 <p:sld xmlns:a="http://schemas.openxmlformats.org/drawingml/2006/main" xmlns:r="http://schemas.openxmlformats.org/officeDocument/2006/relationships" xmlns:p="http://schemas.openxmlformats.org/presentationml/2006/main">
   <p:cSld>
     <p:spTree>
@@ -4951,7 +4918,7 @@
 </p:sld>
 </file>
 
-<file path=ppt/slides/slide3.xml><?xml version="1.0" encoding="utf-8"?>
+<file path=ppt/slides/slide28.xml><?xml version="1.0" encoding="utf-8"?>
 <p:sld xmlns:a="http://schemas.openxmlformats.org/drawingml/2006/main" xmlns:r="http://schemas.openxmlformats.org/officeDocument/2006/relationships" xmlns:p="http://schemas.openxmlformats.org/presentationml/2006/main">
   <p:cSld>
     <p:spTree>
@@ -4968,9 +4935,73 @@
           <a:chExt cx="0" cy="0"/>
         </a:xfrm>
       </p:grpSpPr>
-      <p:sp>
-        <p:nvSpPr>
-          <p:cNvPr id="2" name="Title 1"/>
+      <p:pic>
+        <p:nvPicPr>
+          <p:cNvPr id="3074" name="Picture 2"/>
+          <p:cNvPicPr>
+            <a:picLocks noChangeAspect="1" noChangeArrowheads="1"/>
+          </p:cNvPicPr>
+          <p:nvPr/>
+        </p:nvPicPr>
+        <p:blipFill>
+          <a:blip r:embed="rId2">
+            <a:extLst>
+              <a:ext uri="{28A0092B-C50C-407E-A947-70E740481C1C}">
+                <a14:useLocalDpi xmlns:a14="http://schemas.microsoft.com/office/drawing/2010/main" val="0"/>
+              </a:ext>
+            </a:extLst>
+          </a:blip>
+          <a:srcRect/>
+          <a:stretch>
+            <a:fillRect/>
+          </a:stretch>
+        </p:blipFill>
+        <p:spPr bwMode="auto">
+          <a:xfrm>
+            <a:off x="-21771" y="304800"/>
+            <a:ext cx="9144000" cy="6448425"/>
+          </a:xfrm>
+          <a:prstGeom prst="rect">
+            <a:avLst/>
+          </a:prstGeom>
+          <a:noFill/>
+          <a:ln>
+            <a:noFill/>
+          </a:ln>
+          <a:effectLst/>
+          <a:extLst>
+            <a:ext uri="{909E8E84-426E-40DD-AFC4-6F175D3DCCD1}">
+              <a14:hiddenFill xmlns:a14="http://schemas.microsoft.com/office/drawing/2010/main">
+                <a:solidFill>
+                  <a:schemeClr val="accent1"/>
+                </a:solidFill>
+              </a14:hiddenFill>
+            </a:ext>
+            <a:ext uri="{91240B29-F687-4F45-9708-019B960494DF}">
+              <a14:hiddenLine xmlns:a14="http://schemas.microsoft.com/office/drawing/2010/main" w="9525">
+                <a:solidFill>
+                  <a:schemeClr val="tx1"/>
+                </a:solidFill>
+                <a:miter lim="800000"/>
+                <a:headEnd/>
+                <a:tailEnd/>
+              </a14:hiddenLine>
+            </a:ext>
+            <a:ext uri="{AF507438-7753-43E0-B8FC-AC1667EBCBE1}">
+              <a14:hiddenEffects xmlns:a14="http://schemas.microsoft.com/office/drawing/2010/main">
+                <a:effectLst>
+                  <a:outerShdw dist="35921" dir="2700000" algn="ctr" rotWithShape="0">
+                    <a:schemeClr val="bg2"/>
+                  </a:outerShdw>
+                </a:effectLst>
+              </a14:hiddenEffects>
+            </a:ext>
+          </a:extLst>
+        </p:spPr>
+      </p:pic>
+      <p:sp>
+        <p:nvSpPr>
+          <p:cNvPr id="4" name="Title 1"/>
           <p:cNvSpPr>
             <a:spLocks noGrp="1"/>
           </p:cNvSpPr>
@@ -4978,52 +5009,137 @@
             <p:ph type="ctrTitle"/>
           </p:nvPr>
         </p:nvSpPr>
-        <p:spPr/>
+        <p:spPr>
+          <a:xfrm>
+            <a:off x="2743200" y="5616575"/>
+            <a:ext cx="7772400" cy="1470025"/>
+          </a:xfrm>
+        </p:spPr>
         <p:txBody>
           <a:bodyPr/>
           <a:lstStyle/>
           <a:p>
             <a:r>
               <a:rPr lang="en-US" dirty="0" smtClean="0"/>
-              <a:t>JavaScript = Production Code!</a:t>
-            </a:r>
-            <a:endParaRPr lang="en-US" dirty="0"/>
-          </a:p>
-        </p:txBody>
-      </p:sp>
-      <p:sp>
-        <p:nvSpPr>
-          <p:cNvPr id="3" name="Subtitle 2"/>
-          <p:cNvSpPr>
-            <a:spLocks noGrp="1"/>
-          </p:cNvSpPr>
-          <p:nvPr>
-            <p:ph type="subTitle" idx="1"/>
-          </p:nvPr>
-        </p:nvSpPr>
-        <p:spPr/>
-        <p:txBody>
-          <a:bodyPr/>
-          <a:lstStyle/>
-          <a:p>
-            <a:endParaRPr lang="en-US" dirty="0"/>
+              <a:t>SpecRunner.html</a:t>
+            </a:r>
+            <a:endParaRPr lang="en-US" dirty="0"/>
+          </a:p>
+        </p:txBody>
+      </p:sp>
+      <p:sp>
+        <p:nvSpPr>
+          <p:cNvPr id="2" name="Oval 1"/>
+          <p:cNvSpPr/>
+          <p:nvPr/>
+        </p:nvSpPr>
+        <p:spPr>
+          <a:xfrm>
+            <a:off x="3657600" y="3581400"/>
+            <a:ext cx="2895600" cy="457200"/>
+          </a:xfrm>
+          <a:prstGeom prst="ellipse">
+            <a:avLst/>
+          </a:prstGeom>
+          <a:noFill/>
+          <a:ln>
+            <a:solidFill>
+              <a:srgbClr val="FF0000"/>
+            </a:solidFill>
+          </a:ln>
+        </p:spPr>
+        <p:style>
+          <a:lnRef idx="2">
+            <a:schemeClr val="accent1">
+              <a:shade val="50000"/>
+            </a:schemeClr>
+          </a:lnRef>
+          <a:fillRef idx="1">
+            <a:schemeClr val="accent1"/>
+          </a:fillRef>
+          <a:effectRef idx="0">
+            <a:schemeClr val="accent1"/>
+          </a:effectRef>
+          <a:fontRef idx="minor">
+            <a:schemeClr val="lt1"/>
+          </a:fontRef>
+        </p:style>
+        <p:txBody>
+          <a:bodyPr rtlCol="0" anchor="ctr"/>
+          <a:lstStyle/>
+          <a:p>
+            <a:pPr algn="ctr"/>
+            <a:endParaRPr lang="en-US"/>
+          </a:p>
+        </p:txBody>
+      </p:sp>
+      <p:sp>
+        <p:nvSpPr>
+          <p:cNvPr id="6" name="Oval 5"/>
+          <p:cNvSpPr/>
+          <p:nvPr/>
+        </p:nvSpPr>
+        <p:spPr>
+          <a:xfrm>
+            <a:off x="3581400" y="2819400"/>
+            <a:ext cx="2438400" cy="457200"/>
+          </a:xfrm>
+          <a:prstGeom prst="ellipse">
+            <a:avLst/>
+          </a:prstGeom>
+          <a:noFill/>
+          <a:ln>
+            <a:solidFill>
+              <a:srgbClr val="FF0000"/>
+            </a:solidFill>
+          </a:ln>
+        </p:spPr>
+        <p:style>
+          <a:lnRef idx="2">
+            <a:schemeClr val="accent1">
+              <a:shade val="50000"/>
+            </a:schemeClr>
+          </a:lnRef>
+          <a:fillRef idx="1">
+            <a:schemeClr val="accent1"/>
+          </a:fillRef>
+          <a:effectRef idx="0">
+            <a:schemeClr val="accent1"/>
+          </a:effectRef>
+          <a:fontRef idx="minor">
+            <a:schemeClr val="lt1"/>
+          </a:fontRef>
+        </p:style>
+        <p:txBody>
+          <a:bodyPr rtlCol="0" anchor="ctr"/>
+          <a:lstStyle/>
+          <a:p>
+            <a:pPr algn="ctr"/>
+            <a:endParaRPr lang="en-US"/>
           </a:p>
         </p:txBody>
       </p:sp>
     </p:spTree>
     <p:extLst>
       <p:ext uri="{BB962C8B-B14F-4D97-AF65-F5344CB8AC3E}">
-        <p14:creationId xmlns:p14="http://schemas.microsoft.com/office/powerpoint/2010/main" val="4246943571"/>
+        <p14:creationId xmlns:p14="http://schemas.microsoft.com/office/powerpoint/2010/main" val="2194151595"/>
       </p:ext>
     </p:extLst>
   </p:cSld>
   <p:clrMapOvr>
     <a:masterClrMapping/>
   </p:clrMapOvr>
+  <p:timing>
+    <p:tnLst>
+      <p:par>
+        <p:cTn id="1" dur="indefinite" restart="never" nodeType="tmRoot"/>
+      </p:par>
+    </p:tnLst>
+  </p:timing>
 </p:sld>
 </file>
 
-<file path=ppt/slides/slide30.xml><?xml version="1.0" encoding="utf-8"?>
+<file path=ppt/slides/slide29.xml><?xml version="1.0" encoding="utf-8"?>
 <p:sld xmlns:a="http://schemas.openxmlformats.org/drawingml/2006/main" xmlns:r="http://schemas.openxmlformats.org/officeDocument/2006/relationships" xmlns:p="http://schemas.openxmlformats.org/presentationml/2006/main">
   <p:cSld>
     <p:spTree>
@@ -5152,7 +5268,86 @@
 </p:sld>
 </file>
 
-<file path=ppt/slides/slide31.xml><?xml version="1.0" encoding="utf-8"?>
+<file path=ppt/slides/slide3.xml><?xml version="1.0" encoding="utf-8"?>
+<p:sld xmlns:a="http://schemas.openxmlformats.org/drawingml/2006/main" xmlns:r="http://schemas.openxmlformats.org/officeDocument/2006/relationships" xmlns:p="http://schemas.openxmlformats.org/presentationml/2006/main">
+  <p:cSld>
+    <p:spTree>
+      <p:nvGrpSpPr>
+        <p:cNvPr id="1" name=""/>
+        <p:cNvGrpSpPr/>
+        <p:nvPr/>
+      </p:nvGrpSpPr>
+      <p:grpSpPr>
+        <a:xfrm>
+          <a:off x="0" y="0"/>
+          <a:ext cx="0" cy="0"/>
+          <a:chOff x="0" y="0"/>
+          <a:chExt cx="0" cy="0"/>
+        </a:xfrm>
+      </p:grpSpPr>
+      <p:sp>
+        <p:nvSpPr>
+          <p:cNvPr id="2" name="Title 1"/>
+          <p:cNvSpPr>
+            <a:spLocks noGrp="1"/>
+          </p:cNvSpPr>
+          <p:nvPr>
+            <p:ph type="ctrTitle"/>
+          </p:nvPr>
+        </p:nvSpPr>
+        <p:spPr/>
+        <p:txBody>
+          <a:bodyPr/>
+          <a:lstStyle/>
+          <a:p>
+            <a:r>
+              <a:rPr lang="en-US" dirty="0" smtClean="0"/>
+              <a:t>How many times have you changed something in JavaScript</a:t>
+            </a:r>
+            <a:endParaRPr lang="en-US" dirty="0"/>
+          </a:p>
+        </p:txBody>
+      </p:sp>
+      <p:sp>
+        <p:nvSpPr>
+          <p:cNvPr id="3" name="Subtitle 2"/>
+          <p:cNvSpPr>
+            <a:spLocks noGrp="1"/>
+          </p:cNvSpPr>
+          <p:nvPr>
+            <p:ph type="subTitle" idx="1"/>
+          </p:nvPr>
+        </p:nvSpPr>
+        <p:spPr/>
+        <p:txBody>
+          <a:bodyPr/>
+          <a:lstStyle/>
+          <a:p>
+            <a:endParaRPr lang="en-US" dirty="0"/>
+          </a:p>
+        </p:txBody>
+      </p:sp>
+    </p:spTree>
+    <p:extLst>
+      <p:ext uri="{BB962C8B-B14F-4D97-AF65-F5344CB8AC3E}">
+        <p14:creationId xmlns:p14="http://schemas.microsoft.com/office/powerpoint/2010/main" val="3481480292"/>
+      </p:ext>
+    </p:extLst>
+  </p:cSld>
+  <p:clrMapOvr>
+    <a:masterClrMapping/>
+  </p:clrMapOvr>
+  <p:timing>
+    <p:tnLst>
+      <p:par>
+        <p:cTn id="1" dur="indefinite" restart="never" nodeType="tmRoot"/>
+      </p:par>
+    </p:tnLst>
+  </p:timing>
+</p:sld>
+</file>
+
+<file path=ppt/slides/slide30.xml><?xml version="1.0" encoding="utf-8"?>
 <p:sld xmlns:a="http://schemas.openxmlformats.org/drawingml/2006/main" xmlns:r="http://schemas.openxmlformats.org/officeDocument/2006/relationships" xmlns:p="http://schemas.openxmlformats.org/presentationml/2006/main">
   <p:cSld>
     <p:spTree>
@@ -5281,7 +5476,7 @@
 </p:sld>
 </file>
 
-<file path=ppt/slides/slide32.xml><?xml version="1.0" encoding="utf-8"?>
+<file path=ppt/slides/slide31.xml><?xml version="1.0" encoding="utf-8"?>
 <p:sld xmlns:a="http://schemas.openxmlformats.org/drawingml/2006/main" xmlns:r="http://schemas.openxmlformats.org/officeDocument/2006/relationships" xmlns:p="http://schemas.openxmlformats.org/presentationml/2006/main">
   <p:cSld>
     <p:spTree>
@@ -5410,7 +5605,7 @@
 </p:sld>
 </file>
 
-<file path=ppt/slides/slide33.xml><?xml version="1.0" encoding="utf-8"?>
+<file path=ppt/slides/slide32.xml><?xml version="1.0" encoding="utf-8"?>
 <p:sld xmlns:a="http://schemas.openxmlformats.org/drawingml/2006/main" xmlns:r="http://schemas.openxmlformats.org/officeDocument/2006/relationships" xmlns:p="http://schemas.openxmlformats.org/presentationml/2006/main">
   <p:cSld>
     <p:spTree>
@@ -5539,7 +5734,7 @@
 </p:sld>
 </file>
 
-<file path=ppt/slides/slide34.xml><?xml version="1.0" encoding="utf-8"?>
+<file path=ppt/slides/slide33.xml><?xml version="1.0" encoding="utf-8"?>
 <p:sld xmlns:a="http://schemas.openxmlformats.org/drawingml/2006/main" xmlns:r="http://schemas.openxmlformats.org/officeDocument/2006/relationships" xmlns:p="http://schemas.openxmlformats.org/presentationml/2006/main">
   <p:cSld>
     <p:spTree>
@@ -5760,7 +5955,7 @@
 </p:sld>
 </file>
 
-<file path=ppt/slides/slide35.xml><?xml version="1.0" encoding="utf-8"?>
+<file path=ppt/slides/slide34.xml><?xml version="1.0" encoding="utf-8"?>
 <p:sld xmlns:a="http://schemas.openxmlformats.org/drawingml/2006/main" xmlns:r="http://schemas.openxmlformats.org/officeDocument/2006/relationships" xmlns:p="http://schemas.openxmlformats.org/presentationml/2006/main">
   <p:cSld>
     <p:spTree>
@@ -5869,41 +6064,97 @@
           <a:p>
             <a:r>
               <a:rPr lang="en-US" dirty="0" smtClean="0"/>
-              <a:t>How many times have you changed something in JavaScript</a:t>
-            </a:r>
-            <a:endParaRPr lang="en-US" dirty="0"/>
-          </a:p>
-        </p:txBody>
-      </p:sp>
-      <p:sp>
-        <p:nvSpPr>
-          <p:cNvPr id="3" name="Subtitle 2"/>
-          <p:cNvSpPr>
-            <a:spLocks noGrp="1"/>
-          </p:cNvSpPr>
-          <p:nvPr>
-            <p:ph type="subTitle" idx="1"/>
-          </p:nvPr>
-        </p:nvSpPr>
-        <p:spPr/>
-        <p:txBody>
-          <a:bodyPr/>
-          <a:lstStyle/>
-          <a:p>
-            <a:endParaRPr lang="en-US" dirty="0"/>
-          </a:p>
-        </p:txBody>
-      </p:sp>
+              <a:t>Only to break something </a:t>
+            </a:r>
+            <a:r>
+              <a:rPr lang="en-US" dirty="0" smtClean="0"/>
+              <a:t>else?</a:t>
+            </a:r>
+            <a:endParaRPr lang="en-US" dirty="0"/>
+          </a:p>
+        </p:txBody>
+      </p:sp>
+      <p:pic>
+        <p:nvPicPr>
+          <p:cNvPr id="2050" name="Picture 2"/>
+          <p:cNvPicPr>
+            <a:picLocks noChangeAspect="1" noChangeArrowheads="1"/>
+          </p:cNvPicPr>
+          <p:nvPr/>
+        </p:nvPicPr>
+        <p:blipFill>
+          <a:blip r:embed="rId2">
+            <a:extLst>
+              <a:ext uri="{28A0092B-C50C-407E-A947-70E740481C1C}">
+                <a14:useLocalDpi xmlns:a14="http://schemas.microsoft.com/office/drawing/2010/main" val="0"/>
+              </a:ext>
+            </a:extLst>
+          </a:blip>
+          <a:srcRect/>
+          <a:stretch>
+            <a:fillRect/>
+          </a:stretch>
+        </p:blipFill>
+        <p:spPr bwMode="auto">
+          <a:xfrm>
+            <a:off x="3581400" y="3810000"/>
+            <a:ext cx="2286000" cy="2476500"/>
+          </a:xfrm>
+          <a:prstGeom prst="rect">
+            <a:avLst/>
+          </a:prstGeom>
+          <a:noFill/>
+          <a:ln>
+            <a:noFill/>
+          </a:ln>
+          <a:effectLst/>
+          <a:extLst>
+            <a:ext uri="{909E8E84-426E-40DD-AFC4-6F175D3DCCD1}">
+              <a14:hiddenFill xmlns:a14="http://schemas.microsoft.com/office/drawing/2010/main">
+                <a:solidFill>
+                  <a:schemeClr val="accent1"/>
+                </a:solidFill>
+              </a14:hiddenFill>
+            </a:ext>
+            <a:ext uri="{91240B29-F687-4F45-9708-019B960494DF}">
+              <a14:hiddenLine xmlns:a14="http://schemas.microsoft.com/office/drawing/2010/main" w="9525">
+                <a:solidFill>
+                  <a:schemeClr val="tx1"/>
+                </a:solidFill>
+                <a:miter lim="800000"/>
+                <a:headEnd/>
+                <a:tailEnd/>
+              </a14:hiddenLine>
+            </a:ext>
+            <a:ext uri="{AF507438-7753-43E0-B8FC-AC1667EBCBE1}">
+              <a14:hiddenEffects xmlns:a14="http://schemas.microsoft.com/office/drawing/2010/main">
+                <a:effectLst>
+                  <a:outerShdw dist="35921" dir="2700000" algn="ctr" rotWithShape="0">
+                    <a:schemeClr val="bg2"/>
+                  </a:outerShdw>
+                </a:effectLst>
+              </a14:hiddenEffects>
+            </a:ext>
+          </a:extLst>
+        </p:spPr>
+      </p:pic>
     </p:spTree>
     <p:extLst>
       <p:ext uri="{BB962C8B-B14F-4D97-AF65-F5344CB8AC3E}">
-        <p14:creationId xmlns:p14="http://schemas.microsoft.com/office/powerpoint/2010/main" val="3481480292"/>
+        <p14:creationId xmlns:p14="http://schemas.microsoft.com/office/powerpoint/2010/main" val="4155733590"/>
       </p:ext>
     </p:extLst>
   </p:cSld>
   <p:clrMapOvr>
     <a:masterClrMapping/>
   </p:clrMapOvr>
+  <p:timing>
+    <p:tnLst>
+      <p:par>
+        <p:cTn id="1" dur="indefinite" restart="never" nodeType="tmRoot"/>
+      </p:par>
+    </p:tnLst>
+  </p:timing>
 </p:sld>
 </file>
 
@@ -5941,7 +6192,7 @@
           <a:p>
             <a:r>
               <a:rPr lang="en-US" dirty="0" smtClean="0"/>
-              <a:t>Only to break something else un-related?</a:t>
+              <a:t>JavaScript = Production Code!</a:t>
             </a:r>
             <a:endParaRPr lang="en-US" dirty="0"/>
           </a:p>
@@ -5969,13 +6220,20 @@
     </p:spTree>
     <p:extLst>
       <p:ext uri="{BB962C8B-B14F-4D97-AF65-F5344CB8AC3E}">
-        <p14:creationId xmlns:p14="http://schemas.microsoft.com/office/powerpoint/2010/main" val="4155733590"/>
+        <p14:creationId xmlns:p14="http://schemas.microsoft.com/office/powerpoint/2010/main" val="2612721222"/>
       </p:ext>
     </p:extLst>
   </p:cSld>
   <p:clrMapOvr>
     <a:masterClrMapping/>
   </p:clrMapOvr>
+  <p:timing>
+    <p:tnLst>
+      <p:par>
+        <p:cTn id="1" dur="indefinite" restart="never" nodeType="tmRoot"/>
+      </p:par>
+    </p:tnLst>
+  </p:timing>
 </p:sld>
 </file>
 
@@ -6048,6 +6306,13 @@
   <p:clrMapOvr>
     <a:masterClrMapping/>
   </p:clrMapOvr>
+  <p:timing>
+    <p:tnLst>
+      <p:par>
+        <p:cTn id="1" dur="indefinite" restart="never" nodeType="tmRoot"/>
+      </p:par>
+    </p:tnLst>
+  </p:timing>
 </p:sld>
 </file>
 
@@ -6120,6 +6385,13 @@
   <p:clrMapOvr>
     <a:masterClrMapping/>
   </p:clrMapOvr>
+  <p:timing>
+    <p:tnLst>
+      <p:par>
+        <p:cTn id="1" dur="indefinite" restart="never" nodeType="tmRoot"/>
+      </p:par>
+    </p:tnLst>
+  </p:timing>
 </p:sld>
 </file>
 
@@ -6192,6 +6464,13 @@
   <p:clrMapOvr>
     <a:masterClrMapping/>
   </p:clrMapOvr>
+  <p:timing>
+    <p:tnLst>
+      <p:par>
+        <p:cTn id="1" dur="indefinite" restart="never" nodeType="tmRoot"/>
+      </p:par>
+    </p:tnLst>
+  </p:timing>
 </p:sld>
 </file>
 
@@ -6264,6 +6543,13 @@
   <p:clrMapOvr>
     <a:masterClrMapping/>
   </p:clrMapOvr>
+  <p:timing>
+    <p:tnLst>
+      <p:par>
+        <p:cTn id="1" dur="indefinite" restart="never" nodeType="tmRoot"/>
+      </p:par>
+    </p:tnLst>
+  </p:timing>
 </p:sld>
 </file>
 

</xml_diff>

<commit_message>
finalizing presentation details for javascript testing.
</commit_message>
<xml_diff>
--- a/testing-javascript/testing-javascript.pptx
+++ b/testing-javascript/testing-javascript.pptx
@@ -25,12 +25,12 @@
     <p:sldId id="273" r:id="rId19"/>
     <p:sldId id="274" r:id="rId20"/>
     <p:sldId id="275" r:id="rId21"/>
-    <p:sldId id="308" r:id="rId22"/>
-    <p:sldId id="307" r:id="rId23"/>
-    <p:sldId id="278" r:id="rId24"/>
-    <p:sldId id="279" r:id="rId25"/>
-    <p:sldId id="280" r:id="rId26"/>
-    <p:sldId id="297" r:id="rId27"/>
+    <p:sldId id="307" r:id="rId22"/>
+    <p:sldId id="310" r:id="rId23"/>
+    <p:sldId id="317" r:id="rId24"/>
+    <p:sldId id="318" r:id="rId25"/>
+    <p:sldId id="297" r:id="rId26"/>
+    <p:sldId id="319" r:id="rId27"/>
     <p:sldId id="298" r:id="rId28"/>
     <p:sldId id="309" r:id="rId29"/>
     <p:sldId id="299" r:id="rId30"/>
@@ -38,7 +38,10 @@
     <p:sldId id="301" r:id="rId32"/>
     <p:sldId id="302" r:id="rId33"/>
     <p:sldId id="303" r:id="rId34"/>
-    <p:sldId id="296" r:id="rId35"/>
+    <p:sldId id="315" r:id="rId35"/>
+    <p:sldId id="313" r:id="rId36"/>
+    <p:sldId id="314" r:id="rId37"/>
+    <p:sldId id="316" r:id="rId38"/>
   </p:sldIdLst>
   <p:sldSz cx="9144000" cy="6858000" type="screen4x3"/>
   <p:notesSz cx="6858000" cy="9144000"/>
@@ -3138,70 +3141,6 @@
           </a:p>
         </p:txBody>
       </p:sp>
-      <p:pic>
-        <p:nvPicPr>
-          <p:cNvPr id="1026" name="Picture 2"/>
-          <p:cNvPicPr>
-            <a:picLocks noChangeAspect="1" noChangeArrowheads="1"/>
-          </p:cNvPicPr>
-          <p:nvPr/>
-        </p:nvPicPr>
-        <p:blipFill>
-          <a:blip r:embed="rId2">
-            <a:extLst>
-              <a:ext uri="{28A0092B-C50C-407E-A947-70E740481C1C}">
-                <a14:useLocalDpi xmlns:a14="http://schemas.microsoft.com/office/drawing/2010/main" val="0"/>
-              </a:ext>
-            </a:extLst>
-          </a:blip>
-          <a:srcRect/>
-          <a:stretch>
-            <a:fillRect/>
-          </a:stretch>
-        </p:blipFill>
-        <p:spPr bwMode="auto">
-          <a:xfrm>
-            <a:off x="228601" y="3962400"/>
-            <a:ext cx="2708986" cy="2781300"/>
-          </a:xfrm>
-          <a:prstGeom prst="rect">
-            <a:avLst/>
-          </a:prstGeom>
-          <a:noFill/>
-          <a:ln>
-            <a:noFill/>
-          </a:ln>
-          <a:effectLst/>
-          <a:extLst>
-            <a:ext uri="{909E8E84-426E-40DD-AFC4-6F175D3DCCD1}">
-              <a14:hiddenFill xmlns:a14="http://schemas.microsoft.com/office/drawing/2010/main">
-                <a:solidFill>
-                  <a:schemeClr val="accent1"/>
-                </a:solidFill>
-              </a14:hiddenFill>
-            </a:ext>
-            <a:ext uri="{91240B29-F687-4F45-9708-019B960494DF}">
-              <a14:hiddenLine xmlns:a14="http://schemas.microsoft.com/office/drawing/2010/main" w="9525">
-                <a:solidFill>
-                  <a:schemeClr val="tx1"/>
-                </a:solidFill>
-                <a:miter lim="800000"/>
-                <a:headEnd/>
-                <a:tailEnd/>
-              </a14:hiddenLine>
-            </a:ext>
-            <a:ext uri="{AF507438-7753-43E0-B8FC-AC1667EBCBE1}">
-              <a14:hiddenEffects xmlns:a14="http://schemas.microsoft.com/office/drawing/2010/main">
-                <a:effectLst>
-                  <a:outerShdw dist="35921" dir="2700000" algn="ctr" rotWithShape="0">
-                    <a:schemeClr val="bg2"/>
-                  </a:outerShdw>
-                </a:effectLst>
-              </a14:hiddenEffects>
-            </a:ext>
-          </a:extLst>
-        </p:spPr>
-      </p:pic>
     </p:spTree>
     <p:extLst>
       <p:ext uri="{BB962C8B-B14F-4D97-AF65-F5344CB8AC3E}">
@@ -4237,85 +4176,6 @@
       </p:grpSpPr>
       <p:sp>
         <p:nvSpPr>
-          <p:cNvPr id="2" name="Title 1"/>
-          <p:cNvSpPr>
-            <a:spLocks noGrp="1"/>
-          </p:cNvSpPr>
-          <p:nvPr>
-            <p:ph type="ctrTitle"/>
-          </p:nvPr>
-        </p:nvSpPr>
-        <p:spPr/>
-        <p:txBody>
-          <a:bodyPr/>
-          <a:lstStyle/>
-          <a:p>
-            <a:r>
-              <a:rPr lang="en-US" dirty="0" smtClean="0"/>
-              <a:t>What’s wrong here?</a:t>
-            </a:r>
-            <a:endParaRPr lang="en-US" dirty="0"/>
-          </a:p>
-        </p:txBody>
-      </p:sp>
-      <p:sp>
-        <p:nvSpPr>
-          <p:cNvPr id="3" name="Subtitle 2"/>
-          <p:cNvSpPr>
-            <a:spLocks noGrp="1"/>
-          </p:cNvSpPr>
-          <p:nvPr>
-            <p:ph type="subTitle" idx="1"/>
-          </p:nvPr>
-        </p:nvSpPr>
-        <p:spPr/>
-        <p:txBody>
-          <a:bodyPr/>
-          <a:lstStyle/>
-          <a:p>
-            <a:endParaRPr lang="en-US" dirty="0"/>
-          </a:p>
-        </p:txBody>
-      </p:sp>
-    </p:spTree>
-    <p:extLst>
-      <p:ext uri="{BB962C8B-B14F-4D97-AF65-F5344CB8AC3E}">
-        <p14:creationId xmlns:p14="http://schemas.microsoft.com/office/powerpoint/2010/main" val="2420139913"/>
-      </p:ext>
-    </p:extLst>
-  </p:cSld>
-  <p:clrMapOvr>
-    <a:masterClrMapping/>
-  </p:clrMapOvr>
-  <p:timing>
-    <p:tnLst>
-      <p:par>
-        <p:cTn id="1" dur="indefinite" restart="never" nodeType="tmRoot"/>
-      </p:par>
-    </p:tnLst>
-  </p:timing>
-</p:sld>
-</file>
-
-<file path=ppt/slides/slide22.xml><?xml version="1.0" encoding="utf-8"?>
-<p:sld xmlns:a="http://schemas.openxmlformats.org/drawingml/2006/main" xmlns:r="http://schemas.openxmlformats.org/officeDocument/2006/relationships" xmlns:p="http://schemas.openxmlformats.org/presentationml/2006/main">
-  <p:cSld>
-    <p:spTree>
-      <p:nvGrpSpPr>
-        <p:cNvPr id="1" name=""/>
-        <p:cNvGrpSpPr/>
-        <p:nvPr/>
-      </p:nvGrpSpPr>
-      <p:grpSpPr>
-        <a:xfrm>
-          <a:off x="0" y="0"/>
-          <a:ext cx="0" cy="0"/>
-          <a:chOff x="0" y="0"/>
-          <a:chExt cx="0" cy="0"/>
-        </a:xfrm>
-      </p:grpSpPr>
-      <p:sp>
-        <p:nvSpPr>
           <p:cNvPr id="4" name="Title 1"/>
           <p:cNvSpPr>
             <a:spLocks noGrp="1"/>
@@ -4336,7 +4196,7 @@
           <a:p>
             <a:r>
               <a:rPr lang="en-US" dirty="0" smtClean="0"/>
-              <a:t>Buggy code</a:t>
+              <a:t>What’s wrong here?</a:t>
             </a:r>
             <a:endParaRPr lang="en-US" dirty="0"/>
           </a:p>
@@ -4365,7 +4225,7 @@
         </p:blipFill>
         <p:spPr bwMode="auto">
           <a:xfrm>
-            <a:off x="285750" y="2076450"/>
+            <a:off x="457200" y="2895600"/>
             <a:ext cx="8570913" cy="2705100"/>
           </a:xfrm>
           <a:prstGeom prst="rect">
@@ -4426,6 +4286,185 @@
 </p:sld>
 </file>
 
+<file path=ppt/slides/slide22.xml><?xml version="1.0" encoding="utf-8"?>
+<p:sld xmlns:a="http://schemas.openxmlformats.org/drawingml/2006/main" xmlns:r="http://schemas.openxmlformats.org/officeDocument/2006/relationships" xmlns:p="http://schemas.openxmlformats.org/presentationml/2006/main">
+  <p:cSld>
+    <p:spTree>
+      <p:nvGrpSpPr>
+        <p:cNvPr id="1" name=""/>
+        <p:cNvGrpSpPr/>
+        <p:nvPr/>
+      </p:nvGrpSpPr>
+      <p:grpSpPr>
+        <a:xfrm>
+          <a:off x="0" y="0"/>
+          <a:ext cx="0" cy="0"/>
+          <a:chOff x="0" y="0"/>
+          <a:chExt cx="0" cy="0"/>
+        </a:xfrm>
+      </p:grpSpPr>
+      <p:sp>
+        <p:nvSpPr>
+          <p:cNvPr id="4" name="Title 1"/>
+          <p:cNvSpPr>
+            <a:spLocks noGrp="1"/>
+          </p:cNvSpPr>
+          <p:nvPr>
+            <p:ph type="ctrTitle"/>
+          </p:nvPr>
+        </p:nvSpPr>
+        <p:spPr>
+          <a:xfrm>
+            <a:off x="685006" y="304800"/>
+            <a:ext cx="7772400" cy="1470025"/>
+          </a:xfrm>
+        </p:spPr>
+        <p:txBody>
+          <a:bodyPr/>
+          <a:lstStyle/>
+          <a:p>
+            <a:r>
+              <a:rPr lang="en-US" dirty="0" smtClean="0"/>
+              <a:t>How do we normally debug JavaScript?</a:t>
+            </a:r>
+            <a:endParaRPr lang="en-US" dirty="0"/>
+          </a:p>
+        </p:txBody>
+      </p:sp>
+      <p:pic>
+        <p:nvPicPr>
+          <p:cNvPr id="2050" name="Picture 2"/>
+          <p:cNvPicPr>
+            <a:picLocks noChangeAspect="1" noChangeArrowheads="1"/>
+          </p:cNvPicPr>
+          <p:nvPr/>
+        </p:nvPicPr>
+        <p:blipFill>
+          <a:blip r:embed="rId2">
+            <a:extLst>
+              <a:ext uri="{28A0092B-C50C-407E-A947-70E740481C1C}">
+                <a14:useLocalDpi xmlns:a14="http://schemas.microsoft.com/office/drawing/2010/main" val="0"/>
+              </a:ext>
+            </a:extLst>
+          </a:blip>
+          <a:srcRect/>
+          <a:stretch>
+            <a:fillRect/>
+          </a:stretch>
+        </p:blipFill>
+        <p:spPr bwMode="auto">
+          <a:xfrm>
+            <a:off x="1169987" y="3048000"/>
+            <a:ext cx="7669213" cy="2209800"/>
+          </a:xfrm>
+          <a:prstGeom prst="rect">
+            <a:avLst/>
+          </a:prstGeom>
+          <a:noFill/>
+          <a:ln>
+            <a:noFill/>
+          </a:ln>
+          <a:effectLst/>
+          <a:extLst>
+            <a:ext uri="{909E8E84-426E-40DD-AFC4-6F175D3DCCD1}">
+              <a14:hiddenFill xmlns:a14="http://schemas.microsoft.com/office/drawing/2010/main">
+                <a:solidFill>
+                  <a:schemeClr val="accent1"/>
+                </a:solidFill>
+              </a14:hiddenFill>
+            </a:ext>
+            <a:ext uri="{91240B29-F687-4F45-9708-019B960494DF}">
+              <a14:hiddenLine xmlns:a14="http://schemas.microsoft.com/office/drawing/2010/main" w="9525">
+                <a:solidFill>
+                  <a:schemeClr val="tx1"/>
+                </a:solidFill>
+                <a:miter lim="800000"/>
+                <a:headEnd/>
+                <a:tailEnd/>
+              </a14:hiddenLine>
+            </a:ext>
+            <a:ext uri="{AF507438-7753-43E0-B8FC-AC1667EBCBE1}">
+              <a14:hiddenEffects xmlns:a14="http://schemas.microsoft.com/office/drawing/2010/main">
+                <a:effectLst>
+                  <a:outerShdw dist="35921" dir="2700000" algn="ctr" rotWithShape="0">
+                    <a:schemeClr val="bg2"/>
+                  </a:outerShdw>
+                </a:effectLst>
+              </a14:hiddenEffects>
+            </a:ext>
+          </a:extLst>
+        </p:spPr>
+      </p:pic>
+      <p:sp>
+        <p:nvSpPr>
+          <p:cNvPr id="3" name="&quot;No&quot; Symbol 2"/>
+          <p:cNvSpPr/>
+          <p:nvPr/>
+        </p:nvSpPr>
+        <p:spPr>
+          <a:xfrm>
+            <a:off x="457200" y="1752600"/>
+            <a:ext cx="8305800" cy="4648200"/>
+          </a:xfrm>
+          <a:prstGeom prst="noSmoking">
+            <a:avLst/>
+          </a:prstGeom>
+          <a:noFill/>
+          <a:ln>
+            <a:solidFill>
+              <a:srgbClr val="FF0000"/>
+            </a:solidFill>
+          </a:ln>
+        </p:spPr>
+        <p:style>
+          <a:lnRef idx="2">
+            <a:schemeClr val="accent1">
+              <a:shade val="50000"/>
+            </a:schemeClr>
+          </a:lnRef>
+          <a:fillRef idx="1">
+            <a:schemeClr val="accent1"/>
+          </a:fillRef>
+          <a:effectRef idx="0">
+            <a:schemeClr val="accent1"/>
+          </a:effectRef>
+          <a:fontRef idx="minor">
+            <a:schemeClr val="lt1"/>
+          </a:fontRef>
+        </p:style>
+        <p:txBody>
+          <a:bodyPr rtlCol="0" anchor="ctr"/>
+          <a:lstStyle/>
+          <a:p>
+            <a:pPr algn="ctr"/>
+            <a:endParaRPr lang="en-US">
+              <a:solidFill>
+                <a:schemeClr val="tx1"/>
+              </a:solidFill>
+            </a:endParaRPr>
+          </a:p>
+        </p:txBody>
+      </p:sp>
+    </p:spTree>
+    <p:extLst>
+      <p:ext uri="{BB962C8B-B14F-4D97-AF65-F5344CB8AC3E}">
+        <p14:creationId xmlns:p14="http://schemas.microsoft.com/office/powerpoint/2010/main" val="1844274139"/>
+      </p:ext>
+    </p:extLst>
+  </p:cSld>
+  <p:clrMapOvr>
+    <a:masterClrMapping/>
+  </p:clrMapOvr>
+  <p:timing>
+    <p:tnLst>
+      <p:par>
+        <p:cTn id="1" dur="indefinite" restart="never" nodeType="tmRoot"/>
+      </p:par>
+    </p:tnLst>
+  </p:timing>
+</p:sld>
+</file>
+
 <file path=ppt/slides/slide23.xml><?xml version="1.0" encoding="utf-8"?>
 <p:sld xmlns:a="http://schemas.openxmlformats.org/drawingml/2006/main" xmlns:r="http://schemas.openxmlformats.org/officeDocument/2006/relationships" xmlns:p="http://schemas.openxmlformats.org/presentationml/2006/main">
   <p:cSld>
@@ -4445,7 +4484,7 @@
       </p:grpSpPr>
       <p:sp>
         <p:nvSpPr>
-          <p:cNvPr id="2" name="Title 1"/>
+          <p:cNvPr id="4" name="Title 1"/>
           <p:cNvSpPr>
             <a:spLocks noGrp="1"/>
           </p:cNvSpPr>
@@ -4453,46 +4492,92 @@
             <p:ph type="ctrTitle"/>
           </p:nvPr>
         </p:nvSpPr>
-        <p:spPr/>
+        <p:spPr>
+          <a:xfrm>
+            <a:off x="685006" y="304800"/>
+            <a:ext cx="7772400" cy="1470025"/>
+          </a:xfrm>
+        </p:spPr>
         <p:txBody>
           <a:bodyPr/>
           <a:lstStyle/>
           <a:p>
             <a:r>
               <a:rPr lang="en-US" dirty="0" smtClean="0"/>
-              <a:t>Fail!!</a:t>
-            </a:r>
-            <a:endParaRPr lang="en-US" dirty="0"/>
-          </a:p>
-        </p:txBody>
-      </p:sp>
-      <p:sp>
-        <p:nvSpPr>
-          <p:cNvPr id="3" name="Subtitle 2"/>
-          <p:cNvSpPr>
-            <a:spLocks noGrp="1"/>
-          </p:cNvSpPr>
-          <p:nvPr>
-            <p:ph type="subTitle" idx="1"/>
-          </p:nvPr>
-        </p:nvSpPr>
-        <p:spPr/>
-        <p:txBody>
-          <a:bodyPr/>
-          <a:lstStyle/>
-          <a:p>
-            <a:r>
-              <a:rPr lang="en-US" dirty="0" smtClean="0"/>
-              <a:t>Alert()</a:t>
-            </a:r>
-            <a:endParaRPr lang="en-US" dirty="0"/>
-          </a:p>
-        </p:txBody>
-      </p:sp>
+              <a:t>Let’s forget we even mentioned that…</a:t>
+            </a:r>
+            <a:endParaRPr lang="en-US" dirty="0"/>
+          </a:p>
+        </p:txBody>
+      </p:sp>
+      <p:pic>
+        <p:nvPicPr>
+          <p:cNvPr id="6146" name="Picture 2"/>
+          <p:cNvPicPr>
+            <a:picLocks noChangeAspect="1" noChangeArrowheads="1"/>
+          </p:cNvPicPr>
+          <p:nvPr/>
+        </p:nvPicPr>
+        <p:blipFill>
+          <a:blip r:embed="rId2">
+            <a:extLst>
+              <a:ext uri="{28A0092B-C50C-407E-A947-70E740481C1C}">
+                <a14:useLocalDpi xmlns:a14="http://schemas.microsoft.com/office/drawing/2010/main" val="0"/>
+              </a:ext>
+            </a:extLst>
+          </a:blip>
+          <a:srcRect/>
+          <a:stretch>
+            <a:fillRect/>
+          </a:stretch>
+        </p:blipFill>
+        <p:spPr bwMode="auto">
+          <a:xfrm>
+            <a:off x="2166937" y="1905000"/>
+            <a:ext cx="4810125" cy="3714750"/>
+          </a:xfrm>
+          <a:prstGeom prst="rect">
+            <a:avLst/>
+          </a:prstGeom>
+          <a:noFill/>
+          <a:ln>
+            <a:noFill/>
+          </a:ln>
+          <a:effectLst/>
+          <a:extLst>
+            <a:ext uri="{909E8E84-426E-40DD-AFC4-6F175D3DCCD1}">
+              <a14:hiddenFill xmlns:a14="http://schemas.microsoft.com/office/drawing/2010/main">
+                <a:solidFill>
+                  <a:schemeClr val="accent1"/>
+                </a:solidFill>
+              </a14:hiddenFill>
+            </a:ext>
+            <a:ext uri="{91240B29-F687-4F45-9708-019B960494DF}">
+              <a14:hiddenLine xmlns:a14="http://schemas.microsoft.com/office/drawing/2010/main" w="9525">
+                <a:solidFill>
+                  <a:schemeClr val="tx1"/>
+                </a:solidFill>
+                <a:miter lim="800000"/>
+                <a:headEnd/>
+                <a:tailEnd/>
+              </a14:hiddenLine>
+            </a:ext>
+            <a:ext uri="{AF507438-7753-43E0-B8FC-AC1667EBCBE1}">
+              <a14:hiddenEffects xmlns:a14="http://schemas.microsoft.com/office/drawing/2010/main">
+                <a:effectLst>
+                  <a:outerShdw dist="35921" dir="2700000" algn="ctr" rotWithShape="0">
+                    <a:schemeClr val="bg2"/>
+                  </a:outerShdw>
+                </a:effectLst>
+              </a14:hiddenEffects>
+            </a:ext>
+          </a:extLst>
+        </p:spPr>
+      </p:pic>
     </p:spTree>
     <p:extLst>
       <p:ext uri="{BB962C8B-B14F-4D97-AF65-F5344CB8AC3E}">
-        <p14:creationId xmlns:p14="http://schemas.microsoft.com/office/powerpoint/2010/main" val="82575994"/>
+        <p14:creationId xmlns:p14="http://schemas.microsoft.com/office/powerpoint/2010/main" val="1436074776"/>
       </p:ext>
     </p:extLst>
   </p:cSld>
@@ -4528,50 +4613,51 @@
       </p:grpSpPr>
       <p:sp>
         <p:nvSpPr>
-          <p:cNvPr id="2" name="Title 1"/>
-          <p:cNvSpPr>
-            <a:spLocks noGrp="1"/>
-          </p:cNvSpPr>
-          <p:nvPr>
-            <p:ph type="ctrTitle"/>
-          </p:nvPr>
-        </p:nvSpPr>
-        <p:spPr/>
-        <p:txBody>
-          <a:bodyPr/>
-          <a:lstStyle/>
-          <a:p>
-            <a:r>
-              <a:rPr lang="en-US" dirty="0" smtClean="0"/>
-              <a:t>When you find yourself wanting to use alert()</a:t>
-            </a:r>
-            <a:endParaRPr lang="en-US" dirty="0"/>
-          </a:p>
-        </p:txBody>
-      </p:sp>
-      <p:sp>
-        <p:nvSpPr>
-          <p:cNvPr id="3" name="Subtitle 2"/>
-          <p:cNvSpPr>
-            <a:spLocks noGrp="1"/>
-          </p:cNvSpPr>
-          <p:nvPr>
-            <p:ph type="subTitle" idx="1"/>
-          </p:nvPr>
-        </p:nvSpPr>
-        <p:spPr/>
-        <p:txBody>
-          <a:bodyPr/>
-          <a:lstStyle/>
-          <a:p>
-            <a:endParaRPr lang="en-US" dirty="0"/>
+          <p:cNvPr id="2" name="Rectangle 1"/>
+          <p:cNvSpPr/>
+          <p:nvPr/>
+        </p:nvSpPr>
+        <p:spPr>
+          <a:xfrm>
+            <a:off x="-533400" y="-152400"/>
+            <a:ext cx="9982200" cy="7162800"/>
+          </a:xfrm>
+          <a:prstGeom prst="rect">
+            <a:avLst/>
+          </a:prstGeom>
+          <a:solidFill>
+            <a:schemeClr val="tx1"/>
+          </a:solidFill>
+        </p:spPr>
+        <p:style>
+          <a:lnRef idx="2">
+            <a:schemeClr val="accent1">
+              <a:shade val="50000"/>
+            </a:schemeClr>
+          </a:lnRef>
+          <a:fillRef idx="1">
+            <a:schemeClr val="accent1"/>
+          </a:fillRef>
+          <a:effectRef idx="0">
+            <a:schemeClr val="accent1"/>
+          </a:effectRef>
+          <a:fontRef idx="minor">
+            <a:schemeClr val="lt1"/>
+          </a:fontRef>
+        </p:style>
+        <p:txBody>
+          <a:bodyPr rtlCol="0" anchor="ctr"/>
+          <a:lstStyle/>
+          <a:p>
+            <a:pPr algn="ctr"/>
+            <a:endParaRPr lang="en-US"/>
           </a:p>
         </p:txBody>
       </p:sp>
     </p:spTree>
     <p:extLst>
       <p:ext uri="{BB962C8B-B14F-4D97-AF65-F5344CB8AC3E}">
-        <p14:creationId xmlns:p14="http://schemas.microsoft.com/office/powerpoint/2010/main" val="82575994"/>
+        <p14:creationId xmlns:p14="http://schemas.microsoft.com/office/powerpoint/2010/main" val="2029720299"/>
       </p:ext>
     </p:extLst>
   </p:cSld>
@@ -4607,78 +4693,6 @@
       </p:grpSpPr>
       <p:sp>
         <p:nvSpPr>
-          <p:cNvPr id="2" name="Title 1"/>
-          <p:cNvSpPr>
-            <a:spLocks noGrp="1"/>
-          </p:cNvSpPr>
-          <p:nvPr>
-            <p:ph type="ctrTitle"/>
-          </p:nvPr>
-        </p:nvSpPr>
-        <p:spPr/>
-        <p:txBody>
-          <a:bodyPr/>
-          <a:lstStyle/>
-          <a:p>
-            <a:r>
-              <a:rPr lang="en-US" dirty="0" smtClean="0"/>
-              <a:t>Write a test!</a:t>
-            </a:r>
-            <a:endParaRPr lang="en-US" dirty="0"/>
-          </a:p>
-        </p:txBody>
-      </p:sp>
-      <p:sp>
-        <p:nvSpPr>
-          <p:cNvPr id="3" name="Subtitle 2"/>
-          <p:cNvSpPr>
-            <a:spLocks noGrp="1"/>
-          </p:cNvSpPr>
-          <p:nvPr>
-            <p:ph type="subTitle" idx="1"/>
-          </p:nvPr>
-        </p:nvSpPr>
-        <p:spPr/>
-        <p:txBody>
-          <a:bodyPr/>
-          <a:lstStyle/>
-          <a:p>
-            <a:endParaRPr lang="en-US" dirty="0"/>
-          </a:p>
-        </p:txBody>
-      </p:sp>
-    </p:spTree>
-    <p:extLst>
-      <p:ext uri="{BB962C8B-B14F-4D97-AF65-F5344CB8AC3E}">
-        <p14:creationId xmlns:p14="http://schemas.microsoft.com/office/powerpoint/2010/main" val="82575994"/>
-      </p:ext>
-    </p:extLst>
-  </p:cSld>
-  <p:clrMapOvr>
-    <a:masterClrMapping/>
-  </p:clrMapOvr>
-</p:sld>
-</file>
-
-<file path=ppt/slides/slide26.xml><?xml version="1.0" encoding="utf-8"?>
-<p:sld xmlns:a="http://schemas.openxmlformats.org/drawingml/2006/main" xmlns:r="http://schemas.openxmlformats.org/officeDocument/2006/relationships" xmlns:p="http://schemas.openxmlformats.org/presentationml/2006/main">
-  <p:cSld>
-    <p:spTree>
-      <p:nvGrpSpPr>
-        <p:cNvPr id="1" name=""/>
-        <p:cNvGrpSpPr/>
-        <p:nvPr/>
-      </p:nvGrpSpPr>
-      <p:grpSpPr>
-        <a:xfrm>
-          <a:off x="0" y="0"/>
-          <a:ext cx="0" cy="0"/>
-          <a:chOff x="0" y="0"/>
-          <a:chExt cx="0" cy="0"/>
-        </a:xfrm>
-      </p:grpSpPr>
-      <p:sp>
-        <p:nvSpPr>
           <p:cNvPr id="4" name="Title 1"/>
           <p:cNvSpPr>
             <a:spLocks noGrp="1"/>
@@ -4699,7 +4713,7 @@
           <a:p>
             <a:r>
               <a:rPr lang="en-US" dirty="0" smtClean="0"/>
-              <a:t>Buggy code</a:t>
+              <a:t>So… we have this buggy code.</a:t>
             </a:r>
             <a:endParaRPr lang="en-US" dirty="0"/>
           </a:p>
@@ -4728,7 +4742,7 @@
         </p:blipFill>
         <p:spPr bwMode="auto">
           <a:xfrm>
-            <a:off x="285750" y="2076450"/>
+            <a:off x="457200" y="2857500"/>
             <a:ext cx="8570913" cy="2705100"/>
           </a:xfrm>
           <a:prstGeom prst="rect">
@@ -4789,6 +4803,135 @@
 </p:sld>
 </file>
 
+<file path=ppt/slides/slide26.xml><?xml version="1.0" encoding="utf-8"?>
+<p:sld xmlns:a="http://schemas.openxmlformats.org/drawingml/2006/main" xmlns:r="http://schemas.openxmlformats.org/officeDocument/2006/relationships" xmlns:p="http://schemas.openxmlformats.org/presentationml/2006/main">
+  <p:cSld>
+    <p:spTree>
+      <p:nvGrpSpPr>
+        <p:cNvPr id="1" name=""/>
+        <p:cNvGrpSpPr/>
+        <p:nvPr/>
+      </p:nvGrpSpPr>
+      <p:grpSpPr>
+        <a:xfrm>
+          <a:off x="0" y="0"/>
+          <a:ext cx="0" cy="0"/>
+          <a:chOff x="0" y="0"/>
+          <a:chExt cx="0" cy="0"/>
+        </a:xfrm>
+      </p:grpSpPr>
+      <p:sp>
+        <p:nvSpPr>
+          <p:cNvPr id="4" name="Title 1"/>
+          <p:cNvSpPr>
+            <a:spLocks noGrp="1"/>
+          </p:cNvSpPr>
+          <p:nvPr>
+            <p:ph type="ctrTitle"/>
+          </p:nvPr>
+        </p:nvSpPr>
+        <p:spPr>
+          <a:xfrm>
+            <a:off x="685006" y="304800"/>
+            <a:ext cx="7772400" cy="1470025"/>
+          </a:xfrm>
+        </p:spPr>
+        <p:txBody>
+          <a:bodyPr/>
+          <a:lstStyle/>
+          <a:p>
+            <a:r>
+              <a:rPr lang="en-US" dirty="0" smtClean="0"/>
+              <a:t>What do we do about it?</a:t>
+            </a:r>
+            <a:endParaRPr lang="en-US" dirty="0"/>
+          </a:p>
+        </p:txBody>
+      </p:sp>
+      <p:pic>
+        <p:nvPicPr>
+          <p:cNvPr id="7170" name="Picture 2"/>
+          <p:cNvPicPr>
+            <a:picLocks noChangeAspect="1" noChangeArrowheads="1"/>
+          </p:cNvPicPr>
+          <p:nvPr/>
+        </p:nvPicPr>
+        <p:blipFill>
+          <a:blip r:embed="rId2">
+            <a:extLst>
+              <a:ext uri="{28A0092B-C50C-407E-A947-70E740481C1C}">
+                <a14:useLocalDpi xmlns:a14="http://schemas.microsoft.com/office/drawing/2010/main" val="0"/>
+              </a:ext>
+            </a:extLst>
+          </a:blip>
+          <a:srcRect/>
+          <a:stretch>
+            <a:fillRect/>
+          </a:stretch>
+        </p:blipFill>
+        <p:spPr bwMode="auto">
+          <a:xfrm>
+            <a:off x="3143250" y="2266950"/>
+            <a:ext cx="2857500" cy="2324100"/>
+          </a:xfrm>
+          <a:prstGeom prst="rect">
+            <a:avLst/>
+          </a:prstGeom>
+          <a:noFill/>
+          <a:ln>
+            <a:noFill/>
+          </a:ln>
+          <a:effectLst/>
+          <a:extLst>
+            <a:ext uri="{909E8E84-426E-40DD-AFC4-6F175D3DCCD1}">
+              <a14:hiddenFill xmlns:a14="http://schemas.microsoft.com/office/drawing/2010/main">
+                <a:solidFill>
+                  <a:schemeClr val="accent1"/>
+                </a:solidFill>
+              </a14:hiddenFill>
+            </a:ext>
+            <a:ext uri="{91240B29-F687-4F45-9708-019B960494DF}">
+              <a14:hiddenLine xmlns:a14="http://schemas.microsoft.com/office/drawing/2010/main" w="9525">
+                <a:solidFill>
+                  <a:schemeClr val="tx1"/>
+                </a:solidFill>
+                <a:miter lim="800000"/>
+                <a:headEnd/>
+                <a:tailEnd/>
+              </a14:hiddenLine>
+            </a:ext>
+            <a:ext uri="{AF507438-7753-43E0-B8FC-AC1667EBCBE1}">
+              <a14:hiddenEffects xmlns:a14="http://schemas.microsoft.com/office/drawing/2010/main">
+                <a:effectLst>
+                  <a:outerShdw dist="35921" dir="2700000" algn="ctr" rotWithShape="0">
+                    <a:schemeClr val="bg2"/>
+                  </a:outerShdw>
+                </a:effectLst>
+              </a14:hiddenEffects>
+            </a:ext>
+          </a:extLst>
+        </p:spPr>
+      </p:pic>
+    </p:spTree>
+    <p:extLst>
+      <p:ext uri="{BB962C8B-B14F-4D97-AF65-F5344CB8AC3E}">
+        <p14:creationId xmlns:p14="http://schemas.microsoft.com/office/powerpoint/2010/main" val="2132468853"/>
+      </p:ext>
+    </p:extLst>
+  </p:cSld>
+  <p:clrMapOvr>
+    <a:masterClrMapping/>
+  </p:clrMapOvr>
+  <p:timing>
+    <p:tnLst>
+      <p:par>
+        <p:cTn id="1" dur="indefinite" restart="never" nodeType="tmRoot"/>
+      </p:par>
+    </p:tnLst>
+  </p:timing>
+</p:sld>
+</file>
+
 <file path=ppt/slides/slide27.xml><?xml version="1.0" encoding="utf-8"?>
 <p:sld xmlns:a="http://schemas.openxmlformats.org/drawingml/2006/main" xmlns:r="http://schemas.openxmlformats.org/officeDocument/2006/relationships" xmlns:p="http://schemas.openxmlformats.org/presentationml/2006/main">
   <p:cSld>
@@ -4857,7 +5000,7 @@
         </p:blipFill>
         <p:spPr bwMode="auto">
           <a:xfrm>
-            <a:off x="200025" y="2152650"/>
+            <a:off x="200025" y="2857500"/>
             <a:ext cx="8743950" cy="2552700"/>
           </a:xfrm>
           <a:prstGeom prst="rect">
@@ -5415,7 +5558,7 @@
         </p:blipFill>
         <p:spPr bwMode="auto">
           <a:xfrm>
-            <a:off x="228600" y="1936750"/>
+            <a:off x="228600" y="2362200"/>
             <a:ext cx="8685213" cy="2984500"/>
           </a:xfrm>
           <a:prstGeom prst="rect">
@@ -5673,7 +5816,7 @@
         </p:blipFill>
         <p:spPr bwMode="auto">
           <a:xfrm>
-            <a:off x="376238" y="1600200"/>
+            <a:off x="376238" y="2209800"/>
             <a:ext cx="8391525" cy="3657600"/>
           </a:xfrm>
           <a:prstGeom prst="rect">
@@ -5974,7 +6117,7 @@
       </p:grpSpPr>
       <p:sp>
         <p:nvSpPr>
-          <p:cNvPr id="2" name="Title 1"/>
+          <p:cNvPr id="4" name="Title 1"/>
           <p:cNvSpPr>
             <a:spLocks noGrp="1"/>
           </p:cNvSpPr>
@@ -5982,38 +6125,609 @@
             <p:ph type="ctrTitle"/>
           </p:nvPr>
         </p:nvSpPr>
-        <p:spPr/>
-        <p:txBody>
-          <a:bodyPr/>
-          <a:lstStyle/>
-          <a:p>
-            <a:endParaRPr lang="en-US" dirty="0"/>
-          </a:p>
-        </p:txBody>
-      </p:sp>
-      <p:sp>
-        <p:nvSpPr>
-          <p:cNvPr id="3" name="Subtitle 2"/>
-          <p:cNvSpPr>
-            <a:spLocks noGrp="1"/>
-          </p:cNvSpPr>
-          <p:nvPr>
-            <p:ph type="subTitle" idx="1"/>
-          </p:nvPr>
-        </p:nvSpPr>
-        <p:spPr/>
-        <p:txBody>
-          <a:bodyPr/>
-          <a:lstStyle/>
-          <a:p>
-            <a:endParaRPr lang="en-US" dirty="0"/>
-          </a:p>
-        </p:txBody>
-      </p:sp>
+        <p:spPr>
+          <a:xfrm>
+            <a:off x="685006" y="304800"/>
+            <a:ext cx="7772400" cy="1470025"/>
+          </a:xfrm>
+          <a:noFill/>
+        </p:spPr>
+        <p:txBody>
+          <a:bodyPr/>
+          <a:lstStyle/>
+          <a:p>
+            <a:r>
+              <a:rPr lang="en-US" dirty="0" smtClean="0"/>
+              <a:t>Remember…</a:t>
+            </a:r>
+            <a:endParaRPr lang="en-US" dirty="0"/>
+          </a:p>
+        </p:txBody>
+      </p:sp>
+      <p:pic>
+        <p:nvPicPr>
+          <p:cNvPr id="5123" name="Picture 3"/>
+          <p:cNvPicPr>
+            <a:picLocks noChangeAspect="1" noChangeArrowheads="1"/>
+          </p:cNvPicPr>
+          <p:nvPr/>
+        </p:nvPicPr>
+        <p:blipFill>
+          <a:blip r:embed="rId2">
+            <a:extLst>
+              <a:ext uri="{28A0092B-C50C-407E-A947-70E740481C1C}">
+                <a14:useLocalDpi xmlns:a14="http://schemas.microsoft.com/office/drawing/2010/main" val="0"/>
+              </a:ext>
+            </a:extLst>
+          </a:blip>
+          <a:srcRect/>
+          <a:stretch>
+            <a:fillRect/>
+          </a:stretch>
+        </p:blipFill>
+        <p:spPr bwMode="auto">
+          <a:xfrm>
+            <a:off x="2224088" y="2066925"/>
+            <a:ext cx="4695825" cy="3190875"/>
+          </a:xfrm>
+          <a:prstGeom prst="rect">
+            <a:avLst/>
+          </a:prstGeom>
+          <a:noFill/>
+          <a:ln>
+            <a:noFill/>
+          </a:ln>
+          <a:effectLst/>
+          <a:extLst>
+            <a:ext uri="{909E8E84-426E-40DD-AFC4-6F175D3DCCD1}">
+              <a14:hiddenFill xmlns:a14="http://schemas.microsoft.com/office/drawing/2010/main">
+                <a:solidFill>
+                  <a:schemeClr val="accent1"/>
+                </a:solidFill>
+              </a14:hiddenFill>
+            </a:ext>
+            <a:ext uri="{91240B29-F687-4F45-9708-019B960494DF}">
+              <a14:hiddenLine xmlns:a14="http://schemas.microsoft.com/office/drawing/2010/main" w="9525">
+                <a:solidFill>
+                  <a:schemeClr val="tx1"/>
+                </a:solidFill>
+                <a:miter lim="800000"/>
+                <a:headEnd/>
+                <a:tailEnd/>
+              </a14:hiddenLine>
+            </a:ext>
+            <a:ext uri="{AF507438-7753-43E0-B8FC-AC1667EBCBE1}">
+              <a14:hiddenEffects xmlns:a14="http://schemas.microsoft.com/office/drawing/2010/main">
+                <a:effectLst>
+                  <a:outerShdw dist="35921" dir="2700000" algn="ctr" rotWithShape="0">
+                    <a:schemeClr val="bg2"/>
+                  </a:outerShdw>
+                </a:effectLst>
+              </a14:hiddenEffects>
+            </a:ext>
+          </a:extLst>
+        </p:spPr>
+      </p:pic>
     </p:spTree>
     <p:extLst>
       <p:ext uri="{BB962C8B-B14F-4D97-AF65-F5344CB8AC3E}">
-        <p14:creationId xmlns:p14="http://schemas.microsoft.com/office/powerpoint/2010/main" val="1211231472"/>
+        <p14:creationId xmlns:p14="http://schemas.microsoft.com/office/powerpoint/2010/main" val="877197035"/>
+      </p:ext>
+    </p:extLst>
+  </p:cSld>
+  <p:clrMapOvr>
+    <a:masterClrMapping/>
+  </p:clrMapOvr>
+  <p:timing>
+    <p:tnLst>
+      <p:par>
+        <p:cTn id="1" dur="indefinite" restart="never" nodeType="tmRoot"/>
+      </p:par>
+    </p:tnLst>
+  </p:timing>
+</p:sld>
+</file>
+
+<file path=ppt/slides/slide35.xml><?xml version="1.0" encoding="utf-8"?>
+<p:sld xmlns:a="http://schemas.openxmlformats.org/drawingml/2006/main" xmlns:r="http://schemas.openxmlformats.org/officeDocument/2006/relationships" xmlns:p="http://schemas.openxmlformats.org/presentationml/2006/main">
+  <p:cSld>
+    <p:spTree>
+      <p:nvGrpSpPr>
+        <p:cNvPr id="1" name=""/>
+        <p:cNvGrpSpPr/>
+        <p:nvPr/>
+      </p:nvGrpSpPr>
+      <p:grpSpPr>
+        <a:xfrm>
+          <a:off x="0" y="0"/>
+          <a:ext cx="0" cy="0"/>
+          <a:chOff x="0" y="0"/>
+          <a:chExt cx="0" cy="0"/>
+        </a:xfrm>
+      </p:grpSpPr>
+      <p:sp>
+        <p:nvSpPr>
+          <p:cNvPr id="4" name="Title 1"/>
+          <p:cNvSpPr>
+            <a:spLocks noGrp="1"/>
+          </p:cNvSpPr>
+          <p:nvPr>
+            <p:ph type="ctrTitle"/>
+          </p:nvPr>
+        </p:nvSpPr>
+        <p:spPr>
+          <a:xfrm>
+            <a:off x="685006" y="304800"/>
+            <a:ext cx="7772400" cy="1470025"/>
+          </a:xfrm>
+        </p:spPr>
+        <p:txBody>
+          <a:bodyPr/>
+          <a:lstStyle/>
+          <a:p>
+            <a:r>
+              <a:rPr lang="en-US" dirty="0"/>
+              <a:t>When you find yourself wanting to do this.</a:t>
+            </a:r>
+            <a:endParaRPr lang="en-US" dirty="0"/>
+          </a:p>
+        </p:txBody>
+      </p:sp>
+      <p:pic>
+        <p:nvPicPr>
+          <p:cNvPr id="5" name="Picture 2"/>
+          <p:cNvPicPr>
+            <a:picLocks noChangeAspect="1" noChangeArrowheads="1"/>
+          </p:cNvPicPr>
+          <p:nvPr/>
+        </p:nvPicPr>
+        <p:blipFill>
+          <a:blip r:embed="rId2">
+            <a:extLst>
+              <a:ext uri="{28A0092B-C50C-407E-A947-70E740481C1C}">
+                <a14:useLocalDpi xmlns:a14="http://schemas.microsoft.com/office/drawing/2010/main" val="0"/>
+              </a:ext>
+            </a:extLst>
+          </a:blip>
+          <a:srcRect/>
+          <a:stretch>
+            <a:fillRect/>
+          </a:stretch>
+        </p:blipFill>
+        <p:spPr bwMode="auto">
+          <a:xfrm>
+            <a:off x="838200" y="2895600"/>
+            <a:ext cx="7669213" cy="2209800"/>
+          </a:xfrm>
+          <a:prstGeom prst="rect">
+            <a:avLst/>
+          </a:prstGeom>
+          <a:noFill/>
+          <a:ln>
+            <a:noFill/>
+          </a:ln>
+          <a:effectLst/>
+          <a:extLst>
+            <a:ext uri="{909E8E84-426E-40DD-AFC4-6F175D3DCCD1}">
+              <a14:hiddenFill xmlns:a14="http://schemas.microsoft.com/office/drawing/2010/main">
+                <a:solidFill>
+                  <a:schemeClr val="accent1"/>
+                </a:solidFill>
+              </a14:hiddenFill>
+            </a:ext>
+            <a:ext uri="{91240B29-F687-4F45-9708-019B960494DF}">
+              <a14:hiddenLine xmlns:a14="http://schemas.microsoft.com/office/drawing/2010/main" w="9525">
+                <a:solidFill>
+                  <a:schemeClr val="tx1"/>
+                </a:solidFill>
+                <a:miter lim="800000"/>
+                <a:headEnd/>
+                <a:tailEnd/>
+              </a14:hiddenLine>
+            </a:ext>
+            <a:ext uri="{AF507438-7753-43E0-B8FC-AC1667EBCBE1}">
+              <a14:hiddenEffects xmlns:a14="http://schemas.microsoft.com/office/drawing/2010/main">
+                <a:effectLst>
+                  <a:outerShdw dist="35921" dir="2700000" algn="ctr" rotWithShape="0">
+                    <a:schemeClr val="bg2"/>
+                  </a:outerShdw>
+                </a:effectLst>
+              </a14:hiddenEffects>
+            </a:ext>
+          </a:extLst>
+        </p:spPr>
+      </p:pic>
+      <p:pic>
+        <p:nvPicPr>
+          <p:cNvPr id="3074" name="Picture 2"/>
+          <p:cNvPicPr>
+            <a:picLocks noChangeAspect="1" noChangeArrowheads="1"/>
+          </p:cNvPicPr>
+          <p:nvPr/>
+        </p:nvPicPr>
+        <p:blipFill>
+          <a:blip r:embed="rId3">
+            <a:extLst>
+              <a:ext uri="{28A0092B-C50C-407E-A947-70E740481C1C}">
+                <a14:useLocalDpi xmlns:a14="http://schemas.microsoft.com/office/drawing/2010/main" val="0"/>
+              </a:ext>
+            </a:extLst>
+          </a:blip>
+          <a:srcRect/>
+          <a:stretch>
+            <a:fillRect/>
+          </a:stretch>
+        </p:blipFill>
+        <p:spPr bwMode="auto">
+          <a:xfrm>
+            <a:off x="5657850" y="1371600"/>
+            <a:ext cx="2171700" cy="1866900"/>
+          </a:xfrm>
+          <a:prstGeom prst="rect">
+            <a:avLst/>
+          </a:prstGeom>
+          <a:noFill/>
+          <a:ln>
+            <a:noFill/>
+          </a:ln>
+          <a:effectLst/>
+          <a:extLst>
+            <a:ext uri="{909E8E84-426E-40DD-AFC4-6F175D3DCCD1}">
+              <a14:hiddenFill xmlns:a14="http://schemas.microsoft.com/office/drawing/2010/main">
+                <a:solidFill>
+                  <a:schemeClr val="accent1"/>
+                </a:solidFill>
+              </a14:hiddenFill>
+            </a:ext>
+            <a:ext uri="{91240B29-F687-4F45-9708-019B960494DF}">
+              <a14:hiddenLine xmlns:a14="http://schemas.microsoft.com/office/drawing/2010/main" w="9525">
+                <a:solidFill>
+                  <a:schemeClr val="tx1"/>
+                </a:solidFill>
+                <a:miter lim="800000"/>
+                <a:headEnd/>
+                <a:tailEnd/>
+              </a14:hiddenLine>
+            </a:ext>
+            <a:ext uri="{AF507438-7753-43E0-B8FC-AC1667EBCBE1}">
+              <a14:hiddenEffects xmlns:a14="http://schemas.microsoft.com/office/drawing/2010/main">
+                <a:effectLst>
+                  <a:outerShdw dist="35921" dir="2700000" algn="ctr" rotWithShape="0">
+                    <a:schemeClr val="bg2"/>
+                  </a:outerShdw>
+                </a:effectLst>
+              </a14:hiddenEffects>
+            </a:ext>
+          </a:extLst>
+        </p:spPr>
+      </p:pic>
+    </p:spTree>
+    <p:extLst>
+      <p:ext uri="{BB962C8B-B14F-4D97-AF65-F5344CB8AC3E}">
+        <p14:creationId xmlns:p14="http://schemas.microsoft.com/office/powerpoint/2010/main" val="475718096"/>
+      </p:ext>
+    </p:extLst>
+  </p:cSld>
+  <p:clrMapOvr>
+    <a:masterClrMapping/>
+  </p:clrMapOvr>
+  <p:timing>
+    <p:tnLst>
+      <p:par>
+        <p:cTn id="1" dur="indefinite" restart="never" nodeType="tmRoot"/>
+      </p:par>
+    </p:tnLst>
+  </p:timing>
+</p:sld>
+</file>
+
+<file path=ppt/slides/slide36.xml><?xml version="1.0" encoding="utf-8"?>
+<p:sld xmlns:a="http://schemas.openxmlformats.org/drawingml/2006/main" xmlns:r="http://schemas.openxmlformats.org/officeDocument/2006/relationships" xmlns:p="http://schemas.openxmlformats.org/presentationml/2006/main">
+  <p:cSld>
+    <p:spTree>
+      <p:nvGrpSpPr>
+        <p:cNvPr id="1" name=""/>
+        <p:cNvGrpSpPr/>
+        <p:nvPr/>
+      </p:nvGrpSpPr>
+      <p:grpSpPr>
+        <a:xfrm>
+          <a:off x="0" y="0"/>
+          <a:ext cx="0" cy="0"/>
+          <a:chOff x="0" y="0"/>
+          <a:chExt cx="0" cy="0"/>
+        </a:xfrm>
+      </p:grpSpPr>
+      <p:sp>
+        <p:nvSpPr>
+          <p:cNvPr id="4" name="Title 1"/>
+          <p:cNvSpPr>
+            <a:spLocks noGrp="1"/>
+          </p:cNvSpPr>
+          <p:nvPr>
+            <p:ph type="ctrTitle"/>
+          </p:nvPr>
+        </p:nvSpPr>
+        <p:spPr>
+          <a:xfrm>
+            <a:off x="685006" y="304800"/>
+            <a:ext cx="7772400" cy="1470025"/>
+          </a:xfrm>
+        </p:spPr>
+        <p:txBody>
+          <a:bodyPr/>
+          <a:lstStyle/>
+          <a:p>
+            <a:r>
+              <a:rPr lang="en-US" dirty="0" smtClean="0"/>
+              <a:t>Write a test instead!</a:t>
+            </a:r>
+            <a:endParaRPr lang="en-US" dirty="0"/>
+          </a:p>
+        </p:txBody>
+      </p:sp>
+      <p:pic>
+        <p:nvPicPr>
+          <p:cNvPr id="6" name="Picture 3"/>
+          <p:cNvPicPr>
+            <a:picLocks noChangeAspect="1" noChangeArrowheads="1"/>
+          </p:cNvPicPr>
+          <p:nvPr/>
+        </p:nvPicPr>
+        <p:blipFill>
+          <a:blip r:embed="rId2">
+            <a:extLst>
+              <a:ext uri="{28A0092B-C50C-407E-A947-70E740481C1C}">
+                <a14:useLocalDpi xmlns:a14="http://schemas.microsoft.com/office/drawing/2010/main" val="0"/>
+              </a:ext>
+            </a:extLst>
+          </a:blip>
+          <a:srcRect/>
+          <a:stretch>
+            <a:fillRect/>
+          </a:stretch>
+        </p:blipFill>
+        <p:spPr bwMode="auto">
+          <a:xfrm>
+            <a:off x="376238" y="2133600"/>
+            <a:ext cx="8391525" cy="3657600"/>
+          </a:xfrm>
+          <a:prstGeom prst="rect">
+            <a:avLst/>
+          </a:prstGeom>
+          <a:noFill/>
+          <a:ln>
+            <a:noFill/>
+          </a:ln>
+          <a:effectLst/>
+          <a:extLst>
+            <a:ext uri="{909E8E84-426E-40DD-AFC4-6F175D3DCCD1}">
+              <a14:hiddenFill xmlns:a14="http://schemas.microsoft.com/office/drawing/2010/main">
+                <a:solidFill>
+                  <a:schemeClr val="accent1"/>
+                </a:solidFill>
+              </a14:hiddenFill>
+            </a:ext>
+            <a:ext uri="{91240B29-F687-4F45-9708-019B960494DF}">
+              <a14:hiddenLine xmlns:a14="http://schemas.microsoft.com/office/drawing/2010/main" w="9525">
+                <a:solidFill>
+                  <a:schemeClr val="tx1"/>
+                </a:solidFill>
+                <a:miter lim="800000"/>
+                <a:headEnd/>
+                <a:tailEnd/>
+              </a14:hiddenLine>
+            </a:ext>
+            <a:ext uri="{AF507438-7753-43E0-B8FC-AC1667EBCBE1}">
+              <a14:hiddenEffects xmlns:a14="http://schemas.microsoft.com/office/drawing/2010/main">
+                <a:effectLst>
+                  <a:outerShdw dist="35921" dir="2700000" algn="ctr" rotWithShape="0">
+                    <a:schemeClr val="bg2"/>
+                  </a:outerShdw>
+                </a:effectLst>
+              </a14:hiddenEffects>
+            </a:ext>
+          </a:extLst>
+        </p:spPr>
+      </p:pic>
+      <p:pic>
+        <p:nvPicPr>
+          <p:cNvPr id="4099" name="Picture 3"/>
+          <p:cNvPicPr>
+            <a:picLocks noChangeAspect="1" noChangeArrowheads="1"/>
+          </p:cNvPicPr>
+          <p:nvPr/>
+        </p:nvPicPr>
+        <p:blipFill>
+          <a:blip r:embed="rId3">
+            <a:extLst>
+              <a:ext uri="{28A0092B-C50C-407E-A947-70E740481C1C}">
+                <a14:useLocalDpi xmlns:a14="http://schemas.microsoft.com/office/drawing/2010/main" val="0"/>
+              </a:ext>
+            </a:extLst>
+          </a:blip>
+          <a:srcRect/>
+          <a:stretch>
+            <a:fillRect/>
+          </a:stretch>
+        </p:blipFill>
+        <p:spPr bwMode="auto">
+          <a:xfrm>
+            <a:off x="7021286" y="152400"/>
+            <a:ext cx="2438400" cy="2438400"/>
+          </a:xfrm>
+          <a:prstGeom prst="rect">
+            <a:avLst/>
+          </a:prstGeom>
+          <a:noFill/>
+          <a:ln>
+            <a:noFill/>
+          </a:ln>
+          <a:effectLst/>
+          <a:extLst>
+            <a:ext uri="{909E8E84-426E-40DD-AFC4-6F175D3DCCD1}">
+              <a14:hiddenFill xmlns:a14="http://schemas.microsoft.com/office/drawing/2010/main">
+                <a:solidFill>
+                  <a:schemeClr val="accent1"/>
+                </a:solidFill>
+              </a14:hiddenFill>
+            </a:ext>
+            <a:ext uri="{91240B29-F687-4F45-9708-019B960494DF}">
+              <a14:hiddenLine xmlns:a14="http://schemas.microsoft.com/office/drawing/2010/main" w="9525">
+                <a:solidFill>
+                  <a:schemeClr val="tx1"/>
+                </a:solidFill>
+                <a:miter lim="800000"/>
+                <a:headEnd/>
+                <a:tailEnd/>
+              </a14:hiddenLine>
+            </a:ext>
+            <a:ext uri="{AF507438-7753-43E0-B8FC-AC1667EBCBE1}">
+              <a14:hiddenEffects xmlns:a14="http://schemas.microsoft.com/office/drawing/2010/main">
+                <a:effectLst>
+                  <a:outerShdw dist="35921" dir="2700000" algn="ctr" rotWithShape="0">
+                    <a:schemeClr val="bg2"/>
+                  </a:outerShdw>
+                </a:effectLst>
+              </a14:hiddenEffects>
+            </a:ext>
+          </a:extLst>
+        </p:spPr>
+      </p:pic>
+    </p:spTree>
+    <p:extLst>
+      <p:ext uri="{BB962C8B-B14F-4D97-AF65-F5344CB8AC3E}">
+        <p14:creationId xmlns:p14="http://schemas.microsoft.com/office/powerpoint/2010/main" val="1726754995"/>
+      </p:ext>
+    </p:extLst>
+  </p:cSld>
+  <p:clrMapOvr>
+    <a:masterClrMapping/>
+  </p:clrMapOvr>
+  <p:timing>
+    <p:tnLst>
+      <p:par>
+        <p:cTn id="1" dur="indefinite" restart="never" nodeType="tmRoot"/>
+      </p:par>
+    </p:tnLst>
+  </p:timing>
+</p:sld>
+</file>
+
+<file path=ppt/slides/slide37.xml><?xml version="1.0" encoding="utf-8"?>
+<p:sld xmlns:a="http://schemas.openxmlformats.org/drawingml/2006/main" xmlns:r="http://schemas.openxmlformats.org/officeDocument/2006/relationships" xmlns:p="http://schemas.openxmlformats.org/presentationml/2006/main">
+  <p:cSld>
+    <p:spTree>
+      <p:nvGrpSpPr>
+        <p:cNvPr id="1" name=""/>
+        <p:cNvGrpSpPr/>
+        <p:nvPr/>
+      </p:nvGrpSpPr>
+      <p:grpSpPr>
+        <a:xfrm>
+          <a:off x="0" y="0"/>
+          <a:ext cx="0" cy="0"/>
+          <a:chOff x="0" y="0"/>
+          <a:chExt cx="0" cy="0"/>
+        </a:xfrm>
+      </p:grpSpPr>
+      <p:sp>
+        <p:nvSpPr>
+          <p:cNvPr id="4" name="Title 1"/>
+          <p:cNvSpPr>
+            <a:spLocks noGrp="1"/>
+          </p:cNvSpPr>
+          <p:nvPr>
+            <p:ph type="ctrTitle"/>
+          </p:nvPr>
+        </p:nvSpPr>
+        <p:spPr>
+          <a:xfrm>
+            <a:off x="685006" y="304800"/>
+            <a:ext cx="7772400" cy="1470025"/>
+          </a:xfrm>
+          <a:noFill/>
+        </p:spPr>
+        <p:txBody>
+          <a:bodyPr/>
+          <a:lstStyle/>
+          <a:p>
+            <a:r>
+              <a:rPr lang="en-US" dirty="0" smtClean="0"/>
+              <a:t>Questions?</a:t>
+            </a:r>
+            <a:endParaRPr lang="en-US" dirty="0"/>
+          </a:p>
+        </p:txBody>
+      </p:sp>
+      <p:pic>
+        <p:nvPicPr>
+          <p:cNvPr id="5122" name="Picture 2"/>
+          <p:cNvPicPr>
+            <a:picLocks noChangeAspect="1" noChangeArrowheads="1"/>
+          </p:cNvPicPr>
+          <p:nvPr/>
+        </p:nvPicPr>
+        <p:blipFill>
+          <a:blip r:embed="rId2">
+            <a:extLst>
+              <a:ext uri="{28A0092B-C50C-407E-A947-70E740481C1C}">
+                <a14:useLocalDpi xmlns:a14="http://schemas.microsoft.com/office/drawing/2010/main" val="0"/>
+              </a:ext>
+            </a:extLst>
+          </a:blip>
+          <a:srcRect/>
+          <a:stretch>
+            <a:fillRect/>
+          </a:stretch>
+        </p:blipFill>
+        <p:spPr bwMode="auto">
+          <a:xfrm>
+            <a:off x="1714500" y="1828800"/>
+            <a:ext cx="5715000" cy="4286250"/>
+          </a:xfrm>
+          <a:prstGeom prst="rect">
+            <a:avLst/>
+          </a:prstGeom>
+          <a:noFill/>
+          <a:ln>
+            <a:noFill/>
+          </a:ln>
+          <a:effectLst/>
+          <a:extLst>
+            <a:ext uri="{909E8E84-426E-40DD-AFC4-6F175D3DCCD1}">
+              <a14:hiddenFill xmlns:a14="http://schemas.microsoft.com/office/drawing/2010/main">
+                <a:solidFill>
+                  <a:schemeClr val="accent1"/>
+                </a:solidFill>
+              </a14:hiddenFill>
+            </a:ext>
+            <a:ext uri="{91240B29-F687-4F45-9708-019B960494DF}">
+              <a14:hiddenLine xmlns:a14="http://schemas.microsoft.com/office/drawing/2010/main" w="9525">
+                <a:solidFill>
+                  <a:schemeClr val="tx1"/>
+                </a:solidFill>
+                <a:miter lim="800000"/>
+                <a:headEnd/>
+                <a:tailEnd/>
+              </a14:hiddenLine>
+            </a:ext>
+            <a:ext uri="{AF507438-7753-43E0-B8FC-AC1667EBCBE1}">
+              <a14:hiddenEffects xmlns:a14="http://schemas.microsoft.com/office/drawing/2010/main">
+                <a:effectLst>
+                  <a:outerShdw dist="35921" dir="2700000" algn="ctr" rotWithShape="0">
+                    <a:schemeClr val="bg2"/>
+                  </a:outerShdw>
+                </a:effectLst>
+              </a14:hiddenEffects>
+            </a:ext>
+          </a:extLst>
+        </p:spPr>
+      </p:pic>
+    </p:spTree>
+    <p:extLst>
+      <p:ext uri="{BB962C8B-B14F-4D97-AF65-F5344CB8AC3E}">
+        <p14:creationId xmlns:p14="http://schemas.microsoft.com/office/powerpoint/2010/main" val="3762846263"/>
       </p:ext>
     </p:extLst>
   </p:cSld>
@@ -6064,11 +6778,7 @@
           <a:p>
             <a:r>
               <a:rPr lang="en-US" dirty="0" smtClean="0"/>
-              <a:t>Only to break something </a:t>
-            </a:r>
-            <a:r>
-              <a:rPr lang="en-US" dirty="0" smtClean="0"/>
-              <a:t>else?</a:t>
+              <a:t>Only to break something else?</a:t>
             </a:r>
             <a:endParaRPr lang="en-US" dirty="0"/>
           </a:p>

</xml_diff>

<commit_message>
added some images to the presentation
</commit_message>
<xml_diff>
--- a/testing-javascript/testing-javascript.pptx
+++ b/testing-javascript/testing-javascript.pptx
@@ -326,7 +326,7 @@
             <a:fld id="{1D8BD707-D9CF-40AE-B4C6-C98DA3205C09}" type="datetimeFigureOut">
               <a:rPr lang="en-US" smtClean="0"/>
               <a:pPr/>
-              <a:t>11/28/2011</a:t>
+              <a:t>11/29/2011</a:t>
             </a:fld>
             <a:endParaRPr lang="en-US" dirty="0"/>
           </a:p>
@@ -493,7 +493,7 @@
             <a:fld id="{1D8BD707-D9CF-40AE-B4C6-C98DA3205C09}" type="datetimeFigureOut">
               <a:rPr lang="en-US" smtClean="0"/>
               <a:pPr/>
-              <a:t>11/28/2011</a:t>
+              <a:t>11/29/2011</a:t>
             </a:fld>
             <a:endParaRPr lang="en-US" dirty="0"/>
           </a:p>
@@ -670,7 +670,7 @@
             <a:fld id="{1D8BD707-D9CF-40AE-B4C6-C98DA3205C09}" type="datetimeFigureOut">
               <a:rPr lang="en-US" smtClean="0"/>
               <a:pPr/>
-              <a:t>11/28/2011</a:t>
+              <a:t>11/29/2011</a:t>
             </a:fld>
             <a:endParaRPr lang="en-US" dirty="0"/>
           </a:p>
@@ -837,7 +837,7 @@
             <a:fld id="{1D8BD707-D9CF-40AE-B4C6-C98DA3205C09}" type="datetimeFigureOut">
               <a:rPr lang="en-US" smtClean="0"/>
               <a:pPr/>
-              <a:t>11/28/2011</a:t>
+              <a:t>11/29/2011</a:t>
             </a:fld>
             <a:endParaRPr lang="en-US" dirty="0"/>
           </a:p>
@@ -1080,7 +1080,7 @@
             <a:fld id="{1D8BD707-D9CF-40AE-B4C6-C98DA3205C09}" type="datetimeFigureOut">
               <a:rPr lang="en-US" smtClean="0"/>
               <a:pPr/>
-              <a:t>11/28/2011</a:t>
+              <a:t>11/29/2011</a:t>
             </a:fld>
             <a:endParaRPr lang="en-US" dirty="0"/>
           </a:p>
@@ -1365,7 +1365,7 @@
             <a:fld id="{1D8BD707-D9CF-40AE-B4C6-C98DA3205C09}" type="datetimeFigureOut">
               <a:rPr lang="en-US" smtClean="0"/>
               <a:pPr/>
-              <a:t>11/28/2011</a:t>
+              <a:t>11/29/2011</a:t>
             </a:fld>
             <a:endParaRPr lang="en-US" dirty="0"/>
           </a:p>
@@ -1784,7 +1784,7 @@
             <a:fld id="{1D8BD707-D9CF-40AE-B4C6-C98DA3205C09}" type="datetimeFigureOut">
               <a:rPr lang="en-US" smtClean="0"/>
               <a:pPr/>
-              <a:t>11/28/2011</a:t>
+              <a:t>11/29/2011</a:t>
             </a:fld>
             <a:endParaRPr lang="en-US" dirty="0"/>
           </a:p>
@@ -1899,7 +1899,7 @@
             <a:fld id="{1D8BD707-D9CF-40AE-B4C6-C98DA3205C09}" type="datetimeFigureOut">
               <a:rPr lang="en-US" smtClean="0"/>
               <a:pPr/>
-              <a:t>11/28/2011</a:t>
+              <a:t>11/29/2011</a:t>
             </a:fld>
             <a:endParaRPr lang="en-US" dirty="0"/>
           </a:p>
@@ -1991,7 +1991,7 @@
             <a:fld id="{1D8BD707-D9CF-40AE-B4C6-C98DA3205C09}" type="datetimeFigureOut">
               <a:rPr lang="en-US" smtClean="0"/>
               <a:pPr/>
-              <a:t>11/28/2011</a:t>
+              <a:t>11/29/2011</a:t>
             </a:fld>
             <a:endParaRPr lang="en-US" dirty="0"/>
           </a:p>
@@ -2265,7 +2265,7 @@
             <a:fld id="{1D8BD707-D9CF-40AE-B4C6-C98DA3205C09}" type="datetimeFigureOut">
               <a:rPr lang="en-US" smtClean="0"/>
               <a:pPr/>
-              <a:t>11/28/2011</a:t>
+              <a:t>11/29/2011</a:t>
             </a:fld>
             <a:endParaRPr lang="en-US" dirty="0"/>
           </a:p>
@@ -2515,7 +2515,7 @@
             <a:fld id="{1D8BD707-D9CF-40AE-B4C6-C98DA3205C09}" type="datetimeFigureOut">
               <a:rPr lang="en-US" smtClean="0"/>
               <a:pPr/>
-              <a:t>11/28/2011</a:t>
+              <a:t>11/29/2011</a:t>
             </a:fld>
             <a:endParaRPr lang="en-US" dirty="0"/>
           </a:p>
@@ -2725,7 +2725,7 @@
             <a:fld id="{1D8BD707-D9CF-40AE-B4C6-C98DA3205C09}" type="datetimeFigureOut">
               <a:rPr lang="en-US" smtClean="0"/>
               <a:pPr/>
-              <a:t>11/28/2011</a:t>
+              <a:t>11/29/2011</a:t>
             </a:fld>
             <a:endParaRPr lang="en-US" dirty="0"/>
           </a:p>
@@ -4562,14 +4562,69 @@
           <a:lstStyle/>
           <a:p>
             <a:pPr algn="ctr"/>
-            <a:endParaRPr lang="en-US">
-              <a:solidFill>
-                <a:schemeClr val="tx1"/>
-              </a:solidFill>
+            <a:endParaRPr lang="en-US" b="1">
+              <a:ln w="18000">
+                <a:solidFill>
+                  <a:schemeClr val="accent2">
+                    <a:satMod val="140000"/>
+                  </a:schemeClr>
+                </a:solidFill>
+                <a:prstDash val="solid"/>
+                <a:miter lim="800000"/>
+              </a:ln>
+              <a:noFill/>
+              <a:effectLst>
+                <a:outerShdw blurRad="25500" dist="23000" dir="7020000" algn="tl">
+                  <a:srgbClr val="000000">
+                    <a:alpha val="50000"/>
+                  </a:srgbClr>
+                </a:outerShdw>
+              </a:effectLst>
             </a:endParaRPr>
           </a:p>
         </p:txBody>
       </p:sp>
+      <p:pic>
+        <p:nvPicPr>
+          <p:cNvPr id="1026" name="Picture 2" descr="http://blogs.infinite-x.net/images/7e1b4fb0fb0a_53C3/image_thumb.png"/>
+          <p:cNvPicPr>
+            <a:picLocks noChangeAspect="1" noChangeArrowheads="1"/>
+          </p:cNvPicPr>
+          <p:nvPr/>
+        </p:nvPicPr>
+        <p:blipFill>
+          <a:blip r:embed="rId3">
+            <a:extLst>
+              <a:ext uri="{28A0092B-C50C-407E-A947-70E740481C1C}">
+                <a14:useLocalDpi xmlns:a14="http://schemas.microsoft.com/office/drawing/2010/main" val="0"/>
+              </a:ext>
+            </a:extLst>
+          </a:blip>
+          <a:srcRect/>
+          <a:stretch>
+            <a:fillRect/>
+          </a:stretch>
+        </p:blipFill>
+        <p:spPr bwMode="auto">
+          <a:xfrm>
+            <a:off x="7239000" y="5270728"/>
+            <a:ext cx="1714500" cy="1419226"/>
+          </a:xfrm>
+          <a:prstGeom prst="rect">
+            <a:avLst/>
+          </a:prstGeom>
+          <a:noFill/>
+          <a:extLst>
+            <a:ext uri="{909E8E84-426E-40DD-AFC4-6F175D3DCCD1}">
+              <a14:hiddenFill xmlns:a14="http://schemas.microsoft.com/office/drawing/2010/main">
+                <a:solidFill>
+                  <a:srgbClr val="FFFFFF"/>
+                </a:solidFill>
+              </a14:hiddenFill>
+            </a:ext>
+          </a:extLst>
+        </p:spPr>
+      </p:pic>
     </p:spTree>
     <p:extLst>
       <p:ext uri="{BB962C8B-B14F-4D97-AF65-F5344CB8AC3E}">
@@ -4996,8 +5051,8 @@
         </p:blipFill>
         <p:spPr bwMode="auto">
           <a:xfrm>
-            <a:off x="3143250" y="2266950"/>
-            <a:ext cx="2857500" cy="2324100"/>
+            <a:off x="2057400" y="2129536"/>
+            <a:ext cx="4876800" cy="3966464"/>
           </a:xfrm>
           <a:prstGeom prst="rect">
             <a:avLst/>
@@ -7110,11 +7165,7 @@
           <a:p>
             <a:r>
               <a:rPr lang="en-US" dirty="0" smtClean="0"/>
-              <a:t>Which means, we need to </a:t>
-            </a:r>
-            <a:r>
-              <a:rPr lang="en-US" dirty="0" smtClean="0"/>
-              <a:t>treat it with respect</a:t>
+              <a:t>Which means, we need to treat it with respect</a:t>
             </a:r>
             <a:endParaRPr lang="en-US" dirty="0"/>
           </a:p>

</xml_diff>